<commit_message>
update Arduino IDE plugin.
add description about Arduino IDE.
</commit_message>
<xml_diff>
--- a/Doc/Presentation/講義形式/④環境構築の続きと動作確認.pptx
+++ b/Doc/Presentation/講義形式/④環境構築の続きと動作確認.pptx
@@ -5,10 +5,10 @@
     <p:sldMasterId id="2147483697" r:id="rId1"/>
   </p:sldMasterIdLst>
   <p:notesMasterIdLst>
-    <p:notesMasterId r:id="rId33"/>
+    <p:notesMasterId r:id="rId40"/>
   </p:notesMasterIdLst>
   <p:handoutMasterIdLst>
-    <p:handoutMasterId r:id="rId34"/>
+    <p:handoutMasterId r:id="rId41"/>
   </p:handoutMasterIdLst>
   <p:sldIdLst>
     <p:sldId id="380" r:id="rId2"/>
@@ -23,25 +23,32 @@
     <p:sldId id="560" r:id="rId11"/>
     <p:sldId id="582" r:id="rId12"/>
     <p:sldId id="561" r:id="rId13"/>
-    <p:sldId id="584" r:id="rId14"/>
-    <p:sldId id="585" r:id="rId15"/>
-    <p:sldId id="586" r:id="rId16"/>
-    <p:sldId id="587" r:id="rId17"/>
-    <p:sldId id="588" r:id="rId18"/>
-    <p:sldId id="589" r:id="rId19"/>
-    <p:sldId id="557" r:id="rId20"/>
-    <p:sldId id="564" r:id="rId21"/>
-    <p:sldId id="566" r:id="rId22"/>
-    <p:sldId id="558" r:id="rId23"/>
-    <p:sldId id="590" r:id="rId24"/>
-    <p:sldId id="593" r:id="rId25"/>
-    <p:sldId id="595" r:id="rId26"/>
-    <p:sldId id="596" r:id="rId27"/>
-    <p:sldId id="597" r:id="rId28"/>
-    <p:sldId id="598" r:id="rId29"/>
-    <p:sldId id="599" r:id="rId30"/>
-    <p:sldId id="600" r:id="rId31"/>
-    <p:sldId id="401" r:id="rId32"/>
+    <p:sldId id="604" r:id="rId14"/>
+    <p:sldId id="607" r:id="rId15"/>
+    <p:sldId id="605" r:id="rId16"/>
+    <p:sldId id="608" r:id="rId17"/>
+    <p:sldId id="601" r:id="rId18"/>
+    <p:sldId id="602" r:id="rId19"/>
+    <p:sldId id="603" r:id="rId20"/>
+    <p:sldId id="584" r:id="rId21"/>
+    <p:sldId id="585" r:id="rId22"/>
+    <p:sldId id="586" r:id="rId23"/>
+    <p:sldId id="587" r:id="rId24"/>
+    <p:sldId id="588" r:id="rId25"/>
+    <p:sldId id="589" r:id="rId26"/>
+    <p:sldId id="557" r:id="rId27"/>
+    <p:sldId id="564" r:id="rId28"/>
+    <p:sldId id="566" r:id="rId29"/>
+    <p:sldId id="558" r:id="rId30"/>
+    <p:sldId id="590" r:id="rId31"/>
+    <p:sldId id="593" r:id="rId32"/>
+    <p:sldId id="595" r:id="rId33"/>
+    <p:sldId id="596" r:id="rId34"/>
+    <p:sldId id="597" r:id="rId35"/>
+    <p:sldId id="598" r:id="rId36"/>
+    <p:sldId id="599" r:id="rId37"/>
+    <p:sldId id="600" r:id="rId38"/>
+    <p:sldId id="401" r:id="rId39"/>
   </p:sldIdLst>
   <p:sldSz cx="9144000" cy="5143500" type="screen16x9"/>
   <p:notesSz cx="6742113" cy="9872663"/>
@@ -180,8 +187,7 @@
 <file path=ppt/revisionInfo.xml><?xml version="1.0" encoding="utf-8"?>
 <p1510:revInfo xmlns:a="http://schemas.openxmlformats.org/drawingml/2006/main" xmlns:r="http://schemas.openxmlformats.org/officeDocument/2006/relationships" xmlns:p1510="http://schemas.microsoft.com/office/powerpoint/2015/10/main">
   <p1510:revLst>
-    <p1510:client id="{89931FBF-C10D-41F9-9B4E-530C99E4B782}" v="2" dt="2024-04-14T06:14:17.050"/>
-    <p1510:client id="{C4D99BA2-B736-4C03-93A1-5154DB9A5AAB}" v="10" dt="2024-04-15T01:49:52.102"/>
+    <p1510:client id="{C4D99BA2-B736-4C03-93A1-5154DB9A5AAB}" v="81" dt="2024-05-06T02:42:50.535"/>
   </p1510:revLst>
 </p1510:revInfo>
 </file>
@@ -6117,8 +6123,8 @@
   </pc:docChgLst>
   <pc:docChgLst>
     <pc:chgData name="り ぶ" userId="e79b0678f96bfbc0" providerId="LiveId" clId="{C4D99BA2-B736-4C03-93A1-5154DB9A5AAB}"/>
-    <pc:docChg chg="delSld modSld">
-      <pc:chgData name="り ぶ" userId="e79b0678f96bfbc0" providerId="LiveId" clId="{C4D99BA2-B736-4C03-93A1-5154DB9A5AAB}" dt="2024-04-15T01:49:52.102" v="168"/>
+    <pc:docChg chg="undo custSel addSld delSld modSld">
+      <pc:chgData name="り ぶ" userId="e79b0678f96bfbc0" providerId="LiveId" clId="{C4D99BA2-B736-4C03-93A1-5154DB9A5AAB}" dt="2024-05-06T02:42:50.535" v="1131"/>
       <pc:docMkLst>
         <pc:docMk/>
       </pc:docMkLst>
@@ -6180,13 +6186,13 @@
         </pc:sldMkLst>
       </pc:sldChg>
       <pc:sldChg chg="modSp mod">
-        <pc:chgData name="り ぶ" userId="e79b0678f96bfbc0" providerId="LiveId" clId="{C4D99BA2-B736-4C03-93A1-5154DB9A5AAB}" dt="2024-04-14T06:59:41.134" v="113"/>
+        <pc:chgData name="り ぶ" userId="e79b0678f96bfbc0" providerId="LiveId" clId="{C4D99BA2-B736-4C03-93A1-5154DB9A5AAB}" dt="2024-05-06T02:25:22.488" v="172" actId="20577"/>
         <pc:sldMkLst>
           <pc:docMk/>
           <pc:sldMk cId="3309090933" sldId="547"/>
         </pc:sldMkLst>
         <pc:spChg chg="mod">
-          <ac:chgData name="り ぶ" userId="e79b0678f96bfbc0" providerId="LiveId" clId="{C4D99BA2-B736-4C03-93A1-5154DB9A5AAB}" dt="2024-04-14T06:59:41.134" v="113"/>
+          <ac:chgData name="り ぶ" userId="e79b0678f96bfbc0" providerId="LiveId" clId="{C4D99BA2-B736-4C03-93A1-5154DB9A5AAB}" dt="2024-05-06T02:25:22.488" v="172" actId="20577"/>
           <ac:spMkLst>
             <pc:docMk/>
             <pc:sldMk cId="3309090933" sldId="547"/>
@@ -6238,6 +6244,37 @@
           </ac:spMkLst>
         </pc:spChg>
       </pc:sldChg>
+      <pc:sldChg chg="addSp modSp mod">
+        <pc:chgData name="り ぶ" userId="e79b0678f96bfbc0" providerId="LiveId" clId="{C4D99BA2-B736-4C03-93A1-5154DB9A5AAB}" dt="2024-05-06T02:28:00.428" v="246" actId="14100"/>
+        <pc:sldMkLst>
+          <pc:docMk/>
+          <pc:sldMk cId="2136661841" sldId="561"/>
+        </pc:sldMkLst>
+        <pc:spChg chg="mod">
+          <ac:chgData name="り ぶ" userId="e79b0678f96bfbc0" providerId="LiveId" clId="{C4D99BA2-B736-4C03-93A1-5154DB9A5AAB}" dt="2024-05-06T02:27:06.739" v="219"/>
+          <ac:spMkLst>
+            <pc:docMk/>
+            <pc:sldMk cId="2136661841" sldId="561"/>
+            <ac:spMk id="2" creationId="{1EF8D01E-4A1A-836B-34E0-C61FAFEB768C}"/>
+          </ac:spMkLst>
+        </pc:spChg>
+        <pc:spChg chg="add mod">
+          <ac:chgData name="り ぶ" userId="e79b0678f96bfbc0" providerId="LiveId" clId="{C4D99BA2-B736-4C03-93A1-5154DB9A5AAB}" dt="2024-05-06T02:28:00.428" v="246" actId="14100"/>
+          <ac:spMkLst>
+            <pc:docMk/>
+            <pc:sldMk cId="2136661841" sldId="561"/>
+            <ac:spMk id="4" creationId="{FA3C4A1A-CC76-1AAB-472D-7FCF5654F1B0}"/>
+          </ac:spMkLst>
+        </pc:spChg>
+        <pc:picChg chg="mod">
+          <ac:chgData name="り ぶ" userId="e79b0678f96bfbc0" providerId="LiveId" clId="{C4D99BA2-B736-4C03-93A1-5154DB9A5AAB}" dt="2024-05-06T02:27:49.235" v="242" actId="1076"/>
+          <ac:picMkLst>
+            <pc:docMk/>
+            <pc:sldMk cId="2136661841" sldId="561"/>
+            <ac:picMk id="6" creationId="{3A683F24-B180-B0FF-23AB-BDA8346C9365}"/>
+          </ac:picMkLst>
+        </pc:picChg>
+      </pc:sldChg>
       <pc:sldChg chg="del">
         <pc:chgData name="り ぶ" userId="e79b0678f96bfbc0" providerId="LiveId" clId="{C4D99BA2-B736-4C03-93A1-5154DB9A5AAB}" dt="2024-04-14T07:02:52.189" v="115" actId="47"/>
         <pc:sldMkLst>
@@ -6317,6 +6354,21 @@
           <pc:sldMk cId="1948979181" sldId="583"/>
         </pc:sldMkLst>
       </pc:sldChg>
+      <pc:sldChg chg="modSp mod">
+        <pc:chgData name="り ぶ" userId="e79b0678f96bfbc0" providerId="LiveId" clId="{C4D99BA2-B736-4C03-93A1-5154DB9A5AAB}" dt="2024-05-06T02:42:50.535" v="1131"/>
+        <pc:sldMkLst>
+          <pc:docMk/>
+          <pc:sldMk cId="1409119501" sldId="584"/>
+        </pc:sldMkLst>
+        <pc:spChg chg="mod">
+          <ac:chgData name="り ぶ" userId="e79b0678f96bfbc0" providerId="LiveId" clId="{C4D99BA2-B736-4C03-93A1-5154DB9A5AAB}" dt="2024-05-06T02:42:50.535" v="1131"/>
+          <ac:spMkLst>
+            <pc:docMk/>
+            <pc:sldMk cId="1409119501" sldId="584"/>
+            <ac:spMk id="7" creationId="{0B6B6A05-3B1F-9ED6-2127-B6C707732130}"/>
+          </ac:spMkLst>
+        </pc:spChg>
+      </pc:sldChg>
       <pc:sldChg chg="del">
         <pc:chgData name="り ぶ" userId="e79b0678f96bfbc0" providerId="LiveId" clId="{C4D99BA2-B736-4C03-93A1-5154DB9A5AAB}" dt="2024-04-14T06:57:10.865" v="3" actId="47"/>
         <pc:sldMkLst>
@@ -6324,6 +6376,21 @@
           <pc:sldMk cId="83826238" sldId="601"/>
         </pc:sldMkLst>
       </pc:sldChg>
+      <pc:sldChg chg="modSp add mod">
+        <pc:chgData name="り ぶ" userId="e79b0678f96bfbc0" providerId="LiveId" clId="{C4D99BA2-B736-4C03-93A1-5154DB9A5AAB}" dt="2024-05-06T02:25:16.237" v="171" actId="20577"/>
+        <pc:sldMkLst>
+          <pc:docMk/>
+          <pc:sldMk cId="2072131316" sldId="601"/>
+        </pc:sldMkLst>
+        <pc:spChg chg="mod">
+          <ac:chgData name="り ぶ" userId="e79b0678f96bfbc0" providerId="LiveId" clId="{C4D99BA2-B736-4C03-93A1-5154DB9A5AAB}" dt="2024-05-06T02:25:16.237" v="171" actId="20577"/>
+          <ac:spMkLst>
+            <pc:docMk/>
+            <pc:sldMk cId="2072131316" sldId="601"/>
+            <ac:spMk id="2" creationId="{6AFA4A1C-670C-A769-0ADC-8958CEEEF089}"/>
+          </ac:spMkLst>
+        </pc:spChg>
+      </pc:sldChg>
       <pc:sldChg chg="del">
         <pc:chgData name="り ぶ" userId="e79b0678f96bfbc0" providerId="LiveId" clId="{C4D99BA2-B736-4C03-93A1-5154DB9A5AAB}" dt="2024-04-14T06:58:21.033" v="50" actId="2696"/>
         <pc:sldMkLst>
@@ -6331,6 +6398,13 @@
           <pc:sldMk cId="3496517991" sldId="602"/>
         </pc:sldMkLst>
       </pc:sldChg>
+      <pc:sldChg chg="add">
+        <pc:chgData name="り ぶ" userId="e79b0678f96bfbc0" providerId="LiveId" clId="{C4D99BA2-B736-4C03-93A1-5154DB9A5AAB}" dt="2024-05-06T02:25:08.554" v="170"/>
+        <pc:sldMkLst>
+          <pc:docMk/>
+          <pc:sldMk cId="3592530665" sldId="602"/>
+        </pc:sldMkLst>
+      </pc:sldChg>
       <pc:sldChg chg="del">
         <pc:chgData name="り ぶ" userId="e79b0678f96bfbc0" providerId="LiveId" clId="{C4D99BA2-B736-4C03-93A1-5154DB9A5AAB}" dt="2024-04-14T06:58:21.033" v="50" actId="2696"/>
         <pc:sldMkLst>
@@ -6338,6 +6412,44 @@
           <pc:sldMk cId="483406486" sldId="603"/>
         </pc:sldMkLst>
       </pc:sldChg>
+      <pc:sldChg chg="add">
+        <pc:chgData name="り ぶ" userId="e79b0678f96bfbc0" providerId="LiveId" clId="{C4D99BA2-B736-4C03-93A1-5154DB9A5AAB}" dt="2024-05-06T02:25:08.554" v="170"/>
+        <pc:sldMkLst>
+          <pc:docMk/>
+          <pc:sldMk cId="994112391" sldId="603"/>
+        </pc:sldMkLst>
+      </pc:sldChg>
+      <pc:sldChg chg="addSp modSp new mod">
+        <pc:chgData name="り ぶ" userId="e79b0678f96bfbc0" providerId="LiveId" clId="{C4D99BA2-B736-4C03-93A1-5154DB9A5AAB}" dt="2024-05-06T02:32:00.116" v="373" actId="1076"/>
+        <pc:sldMkLst>
+          <pc:docMk/>
+          <pc:sldMk cId="2153565202" sldId="604"/>
+        </pc:sldMkLst>
+        <pc:spChg chg="mod">
+          <ac:chgData name="り ぶ" userId="e79b0678f96bfbc0" providerId="LiveId" clId="{C4D99BA2-B736-4C03-93A1-5154DB9A5AAB}" dt="2024-05-06T02:30:24.101" v="336"/>
+          <ac:spMkLst>
+            <pc:docMk/>
+            <pc:sldMk cId="2153565202" sldId="604"/>
+            <ac:spMk id="2" creationId="{FDA3C64E-105F-1B20-A59B-D0E8EFAE085E}"/>
+          </ac:spMkLst>
+        </pc:spChg>
+        <pc:spChg chg="add mod">
+          <ac:chgData name="り ぶ" userId="e79b0678f96bfbc0" providerId="LiveId" clId="{C4D99BA2-B736-4C03-93A1-5154DB9A5AAB}" dt="2024-05-06T02:32:00.116" v="373" actId="1076"/>
+          <ac:spMkLst>
+            <pc:docMk/>
+            <pc:sldMk cId="2153565202" sldId="604"/>
+            <ac:spMk id="5" creationId="{82E1385E-7193-3CD1-0CA9-C37D354CBE2E}"/>
+          </ac:spMkLst>
+        </pc:spChg>
+        <pc:picChg chg="add mod">
+          <ac:chgData name="り ぶ" userId="e79b0678f96bfbc0" providerId="LiveId" clId="{C4D99BA2-B736-4C03-93A1-5154DB9A5AAB}" dt="2024-05-06T02:29:42.633" v="312" actId="1076"/>
+          <ac:picMkLst>
+            <pc:docMk/>
+            <pc:sldMk cId="2153565202" sldId="604"/>
+            <ac:picMk id="4" creationId="{8E650E38-35B2-A116-0B73-9BB8599114EA}"/>
+          </ac:picMkLst>
+        </pc:picChg>
+      </pc:sldChg>
       <pc:sldChg chg="del">
         <pc:chgData name="り ぶ" userId="e79b0678f96bfbc0" providerId="LiveId" clId="{C4D99BA2-B736-4C03-93A1-5154DB9A5AAB}" dt="2024-04-14T06:58:21.033" v="50" actId="2696"/>
         <pc:sldMkLst>
@@ -6352,6 +6464,52 @@
           <pc:sldMk cId="2031208107" sldId="605"/>
         </pc:sldMkLst>
       </pc:sldChg>
+      <pc:sldChg chg="addSp modSp new mod">
+        <pc:chgData name="り ぶ" userId="e79b0678f96bfbc0" providerId="LiveId" clId="{C4D99BA2-B736-4C03-93A1-5154DB9A5AAB}" dt="2024-05-06T02:39:43.608" v="847"/>
+        <pc:sldMkLst>
+          <pc:docMk/>
+          <pc:sldMk cId="3313266945" sldId="605"/>
+        </pc:sldMkLst>
+        <pc:spChg chg="mod">
+          <ac:chgData name="り ぶ" userId="e79b0678f96bfbc0" providerId="LiveId" clId="{C4D99BA2-B736-4C03-93A1-5154DB9A5AAB}" dt="2024-05-06T02:35:22.533" v="596"/>
+          <ac:spMkLst>
+            <pc:docMk/>
+            <pc:sldMk cId="3313266945" sldId="605"/>
+            <ac:spMk id="2" creationId="{D26523A7-1078-F679-2309-E608D1EBFBF9}"/>
+          </ac:spMkLst>
+        </pc:spChg>
+        <pc:spChg chg="mod">
+          <ac:chgData name="り ぶ" userId="e79b0678f96bfbc0" providerId="LiveId" clId="{C4D99BA2-B736-4C03-93A1-5154DB9A5AAB}" dt="2024-05-06T02:35:30.742" v="615"/>
+          <ac:spMkLst>
+            <pc:docMk/>
+            <pc:sldMk cId="3313266945" sldId="605"/>
+            <ac:spMk id="3" creationId="{8B8BD6DA-0D96-C658-1FCA-177EA786FAD2}"/>
+          </ac:spMkLst>
+        </pc:spChg>
+        <pc:graphicFrameChg chg="add mod">
+          <ac:chgData name="り ぶ" userId="e79b0678f96bfbc0" providerId="LiveId" clId="{C4D99BA2-B736-4C03-93A1-5154DB9A5AAB}" dt="2024-05-06T02:39:43.608" v="847"/>
+          <ac:graphicFrameMkLst>
+            <pc:docMk/>
+            <pc:sldMk cId="3313266945" sldId="605"/>
+            <ac:graphicFrameMk id="4" creationId="{DC49BE4E-FBC8-06C8-793A-02B1CC8554EB}"/>
+          </ac:graphicFrameMkLst>
+        </pc:graphicFrameChg>
+      </pc:sldChg>
+      <pc:sldChg chg="addSp modSp new del mod">
+        <pc:chgData name="り ぶ" userId="e79b0678f96bfbc0" providerId="LiveId" clId="{C4D99BA2-B736-4C03-93A1-5154DB9A5AAB}" dt="2024-05-06T02:40:04.039" v="848" actId="2696"/>
+        <pc:sldMkLst>
+          <pc:docMk/>
+          <pc:sldMk cId="1234977562" sldId="606"/>
+        </pc:sldMkLst>
+        <pc:graphicFrameChg chg="add mod modGraphic">
+          <ac:chgData name="り ぶ" userId="e79b0678f96bfbc0" providerId="LiveId" clId="{C4D99BA2-B736-4C03-93A1-5154DB9A5AAB}" dt="2024-05-06T02:39:35.271" v="846" actId="14100"/>
+          <ac:graphicFrameMkLst>
+            <pc:docMk/>
+            <pc:sldMk cId="1234977562" sldId="606"/>
+            <ac:graphicFrameMk id="3" creationId="{F0B0F427-B545-283F-DA9D-02DFC66A917A}"/>
+          </ac:graphicFrameMkLst>
+        </pc:graphicFrameChg>
+      </pc:sldChg>
       <pc:sldChg chg="del">
         <pc:chgData name="り ぶ" userId="e79b0678f96bfbc0" providerId="LiveId" clId="{C4D99BA2-B736-4C03-93A1-5154DB9A5AAB}" dt="2024-04-14T06:59:22.549" v="90" actId="47"/>
         <pc:sldMkLst>
@@ -6359,12 +6517,82 @@
           <pc:sldMk cId="2909890288" sldId="606"/>
         </pc:sldMkLst>
       </pc:sldChg>
+      <pc:sldChg chg="addSp modSp new mod">
+        <pc:chgData name="り ぶ" userId="e79b0678f96bfbc0" providerId="LiveId" clId="{C4D99BA2-B736-4C03-93A1-5154DB9A5AAB}" dt="2024-05-06T02:35:13.838" v="566" actId="14100"/>
+        <pc:sldMkLst>
+          <pc:docMk/>
+          <pc:sldMk cId="131422820" sldId="607"/>
+        </pc:sldMkLst>
+        <pc:spChg chg="mod">
+          <ac:chgData name="り ぶ" userId="e79b0678f96bfbc0" providerId="LiveId" clId="{C4D99BA2-B736-4C03-93A1-5154DB9A5AAB}" dt="2024-05-06T02:34:12.757" v="456"/>
+          <ac:spMkLst>
+            <pc:docMk/>
+            <pc:sldMk cId="131422820" sldId="607"/>
+            <ac:spMk id="2" creationId="{A256FE61-749D-A0E1-848E-61697F58732A}"/>
+          </ac:spMkLst>
+        </pc:spChg>
+        <pc:spChg chg="add mod">
+          <ac:chgData name="り ぶ" userId="e79b0678f96bfbc0" providerId="LiveId" clId="{C4D99BA2-B736-4C03-93A1-5154DB9A5AAB}" dt="2024-05-06T02:34:54.597" v="528" actId="14100"/>
+          <ac:spMkLst>
+            <pc:docMk/>
+            <pc:sldMk cId="131422820" sldId="607"/>
+            <ac:spMk id="4" creationId="{E58A1FC4-2147-0EB0-5183-38AA0BD233B4}"/>
+          </ac:spMkLst>
+        </pc:spChg>
+        <pc:spChg chg="add mod">
+          <ac:chgData name="り ぶ" userId="e79b0678f96bfbc0" providerId="LiveId" clId="{C4D99BA2-B736-4C03-93A1-5154DB9A5AAB}" dt="2024-05-06T02:35:13.838" v="566" actId="14100"/>
+          <ac:spMkLst>
+            <pc:docMk/>
+            <pc:sldMk cId="131422820" sldId="607"/>
+            <ac:spMk id="5" creationId="{4D785F0C-1DF1-29D5-E8B6-6D2DD6D1EF95}"/>
+          </ac:spMkLst>
+        </pc:spChg>
+        <pc:picChg chg="add mod">
+          <ac:chgData name="り ぶ" userId="e79b0678f96bfbc0" providerId="LiveId" clId="{C4D99BA2-B736-4C03-93A1-5154DB9A5AAB}" dt="2024-05-06T02:34:19.167" v="457"/>
+          <ac:picMkLst>
+            <pc:docMk/>
+            <pc:sldMk cId="131422820" sldId="607"/>
+            <ac:picMk id="3" creationId="{23DA6BF5-FA09-27CE-BCE7-BFEDA7971D69}"/>
+          </ac:picMkLst>
+        </pc:picChg>
+      </pc:sldChg>
       <pc:sldChg chg="del">
         <pc:chgData name="り ぶ" userId="e79b0678f96bfbc0" providerId="LiveId" clId="{C4D99BA2-B736-4C03-93A1-5154DB9A5AAB}" dt="2024-04-14T07:02:52.189" v="115" actId="47"/>
         <pc:sldMkLst>
           <pc:docMk/>
           <pc:sldMk cId="2919171283" sldId="608"/>
         </pc:sldMkLst>
+      </pc:sldChg>
+      <pc:sldChg chg="addSp modSp new mod">
+        <pc:chgData name="り ぶ" userId="e79b0678f96bfbc0" providerId="LiveId" clId="{C4D99BA2-B736-4C03-93A1-5154DB9A5AAB}" dt="2024-05-06T02:41:06.105" v="922" actId="1076"/>
+        <pc:sldMkLst>
+          <pc:docMk/>
+          <pc:sldMk cId="3360473473" sldId="608"/>
+        </pc:sldMkLst>
+        <pc:spChg chg="mod">
+          <ac:chgData name="り ぶ" userId="e79b0678f96bfbc0" providerId="LiveId" clId="{C4D99BA2-B736-4C03-93A1-5154DB9A5AAB}" dt="2024-05-06T02:40:16.005" v="878"/>
+          <ac:spMkLst>
+            <pc:docMk/>
+            <pc:sldMk cId="3360473473" sldId="608"/>
+            <ac:spMk id="2" creationId="{85B2359A-A163-6720-D71E-5E8F141D973A}"/>
+          </ac:spMkLst>
+        </pc:spChg>
+        <pc:spChg chg="add mod">
+          <ac:chgData name="り ぶ" userId="e79b0678f96bfbc0" providerId="LiveId" clId="{C4D99BA2-B736-4C03-93A1-5154DB9A5AAB}" dt="2024-05-06T02:41:06.105" v="922" actId="1076"/>
+          <ac:spMkLst>
+            <pc:docMk/>
+            <pc:sldMk cId="3360473473" sldId="608"/>
+            <ac:spMk id="5" creationId="{C0385760-2124-1005-75F4-7CEA5B7B5AC3}"/>
+          </ac:spMkLst>
+        </pc:spChg>
+        <pc:picChg chg="add mod">
+          <ac:chgData name="り ぶ" userId="e79b0678f96bfbc0" providerId="LiveId" clId="{C4D99BA2-B736-4C03-93A1-5154DB9A5AAB}" dt="2024-05-06T02:40:52.989" v="883" actId="1076"/>
+          <ac:picMkLst>
+            <pc:docMk/>
+            <pc:sldMk cId="3360473473" sldId="608"/>
+            <ac:picMk id="4" creationId="{FE0ECDF5-7EFA-21EF-5E3F-A78EFAA77855}"/>
+          </ac:picMkLst>
+        </pc:picChg>
       </pc:sldChg>
       <pc:sldChg chg="del">
         <pc:chgData name="り ぶ" userId="e79b0678f96bfbc0" providerId="LiveId" clId="{C4D99BA2-B736-4C03-93A1-5154DB9A5AAB}" dt="2024-04-14T06:59:26.746" v="91" actId="47"/>
@@ -9222,7 +9450,7 @@
           <a:p>
             <a:fld id="{389ACFA8-1AB5-47AD-8712-789ED582E266}" type="datetimeFigureOut">
               <a:rPr kumimoji="1" lang="ja-JP" altLang="en-US" smtClean="0"/>
-              <a:t>2024/4/15</a:t>
+              <a:t>2024/5/6</a:t>
             </a:fld>
             <a:endParaRPr kumimoji="1" lang="ja-JP" altLang="en-US"/>
           </a:p>
@@ -9351,7 +9579,7 @@
             <a:fld id="{49E156C8-D1E6-4437-B817-0C57EC289493}" type="datetimeFigureOut">
               <a:rPr kumimoji="1" lang="ja-JP" altLang="en-US" smtClean="0"/>
               <a:pPr/>
-              <a:t>2024/4/15</a:t>
+              <a:t>2024/5/6</a:t>
             </a:fld>
             <a:endParaRPr kumimoji="1" lang="ja-JP" altLang="en-US"/>
           </a:p>
@@ -9847,7 +10075,7 @@
             <a:fld id="{C0644275-5C74-4E59-8F01-9B0DD8D2F6FE}" type="slidenum">
               <a:rPr kumimoji="1" lang="ja-JP" altLang="en-US" smtClean="0"/>
               <a:pPr/>
-              <a:t>15</a:t>
+              <a:t>17</a:t>
             </a:fld>
             <a:endParaRPr kumimoji="1" lang="ja-JP" altLang="en-US" dirty="0"/>
           </a:p>
@@ -9856,7 +10084,7 @@
     </p:spTree>
     <p:extLst>
       <p:ext uri="{BB962C8B-B14F-4D97-AF65-F5344CB8AC3E}">
-        <p14:creationId xmlns:p14="http://schemas.microsoft.com/office/powerpoint/2010/main" val="1581123259"/>
+        <p14:creationId xmlns:p14="http://schemas.microsoft.com/office/powerpoint/2010/main" val="176121392"/>
       </p:ext>
     </p:extLst>
   </p:cSld>
@@ -9932,7 +10160,7 @@
             <a:fld id="{C0644275-5C74-4E59-8F01-9B0DD8D2F6FE}" type="slidenum">
               <a:rPr kumimoji="1" lang="ja-JP" altLang="en-US" smtClean="0"/>
               <a:pPr/>
-              <a:t>19</a:t>
+              <a:t>18</a:t>
             </a:fld>
             <a:endParaRPr kumimoji="1" lang="ja-JP" altLang="en-US" dirty="0"/>
           </a:p>
@@ -9941,7 +10169,7 @@
     </p:spTree>
     <p:extLst>
       <p:ext uri="{BB962C8B-B14F-4D97-AF65-F5344CB8AC3E}">
-        <p14:creationId xmlns:p14="http://schemas.microsoft.com/office/powerpoint/2010/main" val="3859866061"/>
+        <p14:creationId xmlns:p14="http://schemas.microsoft.com/office/powerpoint/2010/main" val="3642679986"/>
       </p:ext>
     </p:extLst>
   </p:cSld>
@@ -10017,7 +10245,7 @@
             <a:fld id="{C0644275-5C74-4E59-8F01-9B0DD8D2F6FE}" type="slidenum">
               <a:rPr kumimoji="1" lang="ja-JP" altLang="en-US" smtClean="0"/>
               <a:pPr/>
-              <a:t>21</a:t>
+              <a:t>19</a:t>
             </a:fld>
             <a:endParaRPr kumimoji="1" lang="ja-JP" altLang="en-US" dirty="0"/>
           </a:p>
@@ -10026,7 +10254,7 @@
     </p:spTree>
     <p:extLst>
       <p:ext uri="{BB962C8B-B14F-4D97-AF65-F5344CB8AC3E}">
-        <p14:creationId xmlns:p14="http://schemas.microsoft.com/office/powerpoint/2010/main" val="957993025"/>
+        <p14:creationId xmlns:p14="http://schemas.microsoft.com/office/powerpoint/2010/main" val="3799620702"/>
       </p:ext>
     </p:extLst>
   </p:cSld>
@@ -10111,7 +10339,7 @@
     </p:spTree>
     <p:extLst>
       <p:ext uri="{BB962C8B-B14F-4D97-AF65-F5344CB8AC3E}">
-        <p14:creationId xmlns:p14="http://schemas.microsoft.com/office/powerpoint/2010/main" val="1065542860"/>
+        <p14:creationId xmlns:p14="http://schemas.microsoft.com/office/powerpoint/2010/main" val="1581123259"/>
       </p:ext>
     </p:extLst>
   </p:cSld>
@@ -10187,7 +10415,7 @@
             <a:fld id="{C0644275-5C74-4E59-8F01-9B0DD8D2F6FE}" type="slidenum">
               <a:rPr kumimoji="1" lang="ja-JP" altLang="en-US" smtClean="0"/>
               <a:pPr/>
-              <a:t>23</a:t>
+              <a:t>26</a:t>
             </a:fld>
             <a:endParaRPr kumimoji="1" lang="ja-JP" altLang="en-US" dirty="0"/>
           </a:p>
@@ -10196,7 +10424,7 @@
     </p:spTree>
     <p:extLst>
       <p:ext uri="{BB962C8B-B14F-4D97-AF65-F5344CB8AC3E}">
-        <p14:creationId xmlns:p14="http://schemas.microsoft.com/office/powerpoint/2010/main" val="891362913"/>
+        <p14:creationId xmlns:p14="http://schemas.microsoft.com/office/powerpoint/2010/main" val="3859866061"/>
       </p:ext>
     </p:extLst>
   </p:cSld>
@@ -10272,7 +10500,7 @@
             <a:fld id="{C0644275-5C74-4E59-8F01-9B0DD8D2F6FE}" type="slidenum">
               <a:rPr kumimoji="1" lang="ja-JP" altLang="en-US" smtClean="0"/>
               <a:pPr/>
-              <a:t>24</a:t>
+              <a:t>28</a:t>
             </a:fld>
             <a:endParaRPr kumimoji="1" lang="ja-JP" altLang="en-US" dirty="0"/>
           </a:p>
@@ -10281,7 +10509,7 @@
     </p:spTree>
     <p:extLst>
       <p:ext uri="{BB962C8B-B14F-4D97-AF65-F5344CB8AC3E}">
-        <p14:creationId xmlns:p14="http://schemas.microsoft.com/office/powerpoint/2010/main" val="860962317"/>
+        <p14:creationId xmlns:p14="http://schemas.microsoft.com/office/powerpoint/2010/main" val="957993025"/>
       </p:ext>
     </p:extLst>
   </p:cSld>
@@ -10357,7 +10585,7 @@
             <a:fld id="{C0644275-5C74-4E59-8F01-9B0DD8D2F6FE}" type="slidenum">
               <a:rPr kumimoji="1" lang="ja-JP" altLang="en-US" smtClean="0"/>
               <a:pPr/>
-              <a:t>26</a:t>
+              <a:t>29</a:t>
             </a:fld>
             <a:endParaRPr kumimoji="1" lang="ja-JP" altLang="en-US" dirty="0"/>
           </a:p>
@@ -10366,7 +10594,7 @@
     </p:spTree>
     <p:extLst>
       <p:ext uri="{BB962C8B-B14F-4D97-AF65-F5344CB8AC3E}">
-        <p14:creationId xmlns:p14="http://schemas.microsoft.com/office/powerpoint/2010/main" val="1628202622"/>
+        <p14:creationId xmlns:p14="http://schemas.microsoft.com/office/powerpoint/2010/main" val="1065542860"/>
       </p:ext>
     </p:extLst>
   </p:cSld>
@@ -10442,7 +10670,7 @@
             <a:fld id="{C0644275-5C74-4E59-8F01-9B0DD8D2F6FE}" type="slidenum">
               <a:rPr kumimoji="1" lang="ja-JP" altLang="en-US" smtClean="0"/>
               <a:pPr/>
-              <a:t>27</a:t>
+              <a:t>30</a:t>
             </a:fld>
             <a:endParaRPr kumimoji="1" lang="ja-JP" altLang="en-US" dirty="0"/>
           </a:p>
@@ -10451,7 +10679,7 @@
     </p:spTree>
     <p:extLst>
       <p:ext uri="{BB962C8B-B14F-4D97-AF65-F5344CB8AC3E}">
-        <p14:creationId xmlns:p14="http://schemas.microsoft.com/office/powerpoint/2010/main" val="2436057465"/>
+        <p14:creationId xmlns:p14="http://schemas.microsoft.com/office/powerpoint/2010/main" val="891362913"/>
       </p:ext>
     </p:extLst>
   </p:cSld>
@@ -10527,7 +10755,7 @@
             <a:fld id="{C0644275-5C74-4E59-8F01-9B0DD8D2F6FE}" type="slidenum">
               <a:rPr kumimoji="1" lang="ja-JP" altLang="en-US" smtClean="0"/>
               <a:pPr/>
-              <a:t>30</a:t>
+              <a:t>31</a:t>
             </a:fld>
             <a:endParaRPr kumimoji="1" lang="ja-JP" altLang="en-US" dirty="0"/>
           </a:p>
@@ -10536,7 +10764,7 @@
     </p:spTree>
     <p:extLst>
       <p:ext uri="{BB962C8B-B14F-4D97-AF65-F5344CB8AC3E}">
-        <p14:creationId xmlns:p14="http://schemas.microsoft.com/office/powerpoint/2010/main" val="3017907017"/>
+        <p14:creationId xmlns:p14="http://schemas.microsoft.com/office/powerpoint/2010/main" val="860962317"/>
       </p:ext>
     </p:extLst>
   </p:cSld>
@@ -10622,6 +10850,261 @@
     <p:extLst>
       <p:ext uri="{BB962C8B-B14F-4D97-AF65-F5344CB8AC3E}">
         <p14:creationId xmlns:p14="http://schemas.microsoft.com/office/powerpoint/2010/main" val="122498770"/>
+      </p:ext>
+    </p:extLst>
+  </p:cSld>
+  <p:clrMapOvr>
+    <a:masterClrMapping/>
+  </p:clrMapOvr>
+</p:notes>
+</file>
+
+<file path=ppt/notesSlides/notesSlide20.xml><?xml version="1.0" encoding="utf-8"?>
+<p:notes xmlns:a="http://schemas.openxmlformats.org/drawingml/2006/main" xmlns:r="http://schemas.openxmlformats.org/officeDocument/2006/relationships" xmlns:p="http://schemas.openxmlformats.org/presentationml/2006/main">
+  <p:cSld>
+    <p:spTree>
+      <p:nvGrpSpPr>
+        <p:cNvPr id="1" name=""/>
+        <p:cNvGrpSpPr/>
+        <p:nvPr/>
+      </p:nvGrpSpPr>
+      <p:grpSpPr>
+        <a:xfrm>
+          <a:off x="0" y="0"/>
+          <a:ext cx="0" cy="0"/>
+          <a:chOff x="0" y="0"/>
+          <a:chExt cx="0" cy="0"/>
+        </a:xfrm>
+      </p:grpSpPr>
+      <p:sp>
+        <p:nvSpPr>
+          <p:cNvPr id="2" name="スライド イメージ プレースホルダー 1"/>
+          <p:cNvSpPr>
+            <a:spLocks noGrp="1" noRot="1" noChangeAspect="1"/>
+          </p:cNvSpPr>
+          <p:nvPr>
+            <p:ph type="sldImg"/>
+          </p:nvPr>
+        </p:nvSpPr>
+        <p:spPr/>
+      </p:sp>
+      <p:sp>
+        <p:nvSpPr>
+          <p:cNvPr id="3" name="ノート プレースホルダー 2"/>
+          <p:cNvSpPr>
+            <a:spLocks noGrp="1"/>
+          </p:cNvSpPr>
+          <p:nvPr>
+            <p:ph type="body" idx="1"/>
+          </p:nvPr>
+        </p:nvSpPr>
+        <p:spPr/>
+        <p:txBody>
+          <a:bodyPr/>
+          <a:lstStyle/>
+          <a:p>
+            <a:endParaRPr kumimoji="1" lang="ja-JP" altLang="en-US" dirty="0"/>
+          </a:p>
+        </p:txBody>
+      </p:sp>
+      <p:sp>
+        <p:nvSpPr>
+          <p:cNvPr id="4" name="スライド番号プレースホルダー 3"/>
+          <p:cNvSpPr>
+            <a:spLocks noGrp="1"/>
+          </p:cNvSpPr>
+          <p:nvPr>
+            <p:ph type="sldNum" sz="quarter" idx="5"/>
+          </p:nvPr>
+        </p:nvSpPr>
+        <p:spPr/>
+        <p:txBody>
+          <a:bodyPr/>
+          <a:lstStyle/>
+          <a:p>
+            <a:fld id="{C0644275-5C74-4E59-8F01-9B0DD8D2F6FE}" type="slidenum">
+              <a:rPr kumimoji="1" lang="ja-JP" altLang="en-US" smtClean="0"/>
+              <a:pPr/>
+              <a:t>33</a:t>
+            </a:fld>
+            <a:endParaRPr kumimoji="1" lang="ja-JP" altLang="en-US" dirty="0"/>
+          </a:p>
+        </p:txBody>
+      </p:sp>
+    </p:spTree>
+    <p:extLst>
+      <p:ext uri="{BB962C8B-B14F-4D97-AF65-F5344CB8AC3E}">
+        <p14:creationId xmlns:p14="http://schemas.microsoft.com/office/powerpoint/2010/main" val="1628202622"/>
+      </p:ext>
+    </p:extLst>
+  </p:cSld>
+  <p:clrMapOvr>
+    <a:masterClrMapping/>
+  </p:clrMapOvr>
+</p:notes>
+</file>
+
+<file path=ppt/notesSlides/notesSlide21.xml><?xml version="1.0" encoding="utf-8"?>
+<p:notes xmlns:a="http://schemas.openxmlformats.org/drawingml/2006/main" xmlns:r="http://schemas.openxmlformats.org/officeDocument/2006/relationships" xmlns:p="http://schemas.openxmlformats.org/presentationml/2006/main">
+  <p:cSld>
+    <p:spTree>
+      <p:nvGrpSpPr>
+        <p:cNvPr id="1" name=""/>
+        <p:cNvGrpSpPr/>
+        <p:nvPr/>
+      </p:nvGrpSpPr>
+      <p:grpSpPr>
+        <a:xfrm>
+          <a:off x="0" y="0"/>
+          <a:ext cx="0" cy="0"/>
+          <a:chOff x="0" y="0"/>
+          <a:chExt cx="0" cy="0"/>
+        </a:xfrm>
+      </p:grpSpPr>
+      <p:sp>
+        <p:nvSpPr>
+          <p:cNvPr id="2" name="スライド イメージ プレースホルダー 1"/>
+          <p:cNvSpPr>
+            <a:spLocks noGrp="1" noRot="1" noChangeAspect="1"/>
+          </p:cNvSpPr>
+          <p:nvPr>
+            <p:ph type="sldImg"/>
+          </p:nvPr>
+        </p:nvSpPr>
+        <p:spPr/>
+      </p:sp>
+      <p:sp>
+        <p:nvSpPr>
+          <p:cNvPr id="3" name="ノート プレースホルダー 2"/>
+          <p:cNvSpPr>
+            <a:spLocks noGrp="1"/>
+          </p:cNvSpPr>
+          <p:nvPr>
+            <p:ph type="body" idx="1"/>
+          </p:nvPr>
+        </p:nvSpPr>
+        <p:spPr/>
+        <p:txBody>
+          <a:bodyPr/>
+          <a:lstStyle/>
+          <a:p>
+            <a:endParaRPr kumimoji="1" lang="ja-JP" altLang="en-US" dirty="0"/>
+          </a:p>
+        </p:txBody>
+      </p:sp>
+      <p:sp>
+        <p:nvSpPr>
+          <p:cNvPr id="4" name="スライド番号プレースホルダー 3"/>
+          <p:cNvSpPr>
+            <a:spLocks noGrp="1"/>
+          </p:cNvSpPr>
+          <p:nvPr>
+            <p:ph type="sldNum" sz="quarter" idx="5"/>
+          </p:nvPr>
+        </p:nvSpPr>
+        <p:spPr/>
+        <p:txBody>
+          <a:bodyPr/>
+          <a:lstStyle/>
+          <a:p>
+            <a:fld id="{C0644275-5C74-4E59-8F01-9B0DD8D2F6FE}" type="slidenum">
+              <a:rPr kumimoji="1" lang="ja-JP" altLang="en-US" smtClean="0"/>
+              <a:pPr/>
+              <a:t>34</a:t>
+            </a:fld>
+            <a:endParaRPr kumimoji="1" lang="ja-JP" altLang="en-US" dirty="0"/>
+          </a:p>
+        </p:txBody>
+      </p:sp>
+    </p:spTree>
+    <p:extLst>
+      <p:ext uri="{BB962C8B-B14F-4D97-AF65-F5344CB8AC3E}">
+        <p14:creationId xmlns:p14="http://schemas.microsoft.com/office/powerpoint/2010/main" val="2436057465"/>
+      </p:ext>
+    </p:extLst>
+  </p:cSld>
+  <p:clrMapOvr>
+    <a:masterClrMapping/>
+  </p:clrMapOvr>
+</p:notes>
+</file>
+
+<file path=ppt/notesSlides/notesSlide22.xml><?xml version="1.0" encoding="utf-8"?>
+<p:notes xmlns:a="http://schemas.openxmlformats.org/drawingml/2006/main" xmlns:r="http://schemas.openxmlformats.org/officeDocument/2006/relationships" xmlns:p="http://schemas.openxmlformats.org/presentationml/2006/main">
+  <p:cSld>
+    <p:spTree>
+      <p:nvGrpSpPr>
+        <p:cNvPr id="1" name=""/>
+        <p:cNvGrpSpPr/>
+        <p:nvPr/>
+      </p:nvGrpSpPr>
+      <p:grpSpPr>
+        <a:xfrm>
+          <a:off x="0" y="0"/>
+          <a:ext cx="0" cy="0"/>
+          <a:chOff x="0" y="0"/>
+          <a:chExt cx="0" cy="0"/>
+        </a:xfrm>
+      </p:grpSpPr>
+      <p:sp>
+        <p:nvSpPr>
+          <p:cNvPr id="2" name="スライド イメージ プレースホルダー 1"/>
+          <p:cNvSpPr>
+            <a:spLocks noGrp="1" noRot="1" noChangeAspect="1"/>
+          </p:cNvSpPr>
+          <p:nvPr>
+            <p:ph type="sldImg"/>
+          </p:nvPr>
+        </p:nvSpPr>
+        <p:spPr/>
+      </p:sp>
+      <p:sp>
+        <p:nvSpPr>
+          <p:cNvPr id="3" name="ノート プレースホルダー 2"/>
+          <p:cNvSpPr>
+            <a:spLocks noGrp="1"/>
+          </p:cNvSpPr>
+          <p:nvPr>
+            <p:ph type="body" idx="1"/>
+          </p:nvPr>
+        </p:nvSpPr>
+        <p:spPr/>
+        <p:txBody>
+          <a:bodyPr/>
+          <a:lstStyle/>
+          <a:p>
+            <a:endParaRPr kumimoji="1" lang="ja-JP" altLang="en-US" dirty="0"/>
+          </a:p>
+        </p:txBody>
+      </p:sp>
+      <p:sp>
+        <p:nvSpPr>
+          <p:cNvPr id="4" name="スライド番号プレースホルダー 3"/>
+          <p:cNvSpPr>
+            <a:spLocks noGrp="1"/>
+          </p:cNvSpPr>
+          <p:nvPr>
+            <p:ph type="sldNum" sz="quarter" idx="5"/>
+          </p:nvPr>
+        </p:nvSpPr>
+        <p:spPr/>
+        <p:txBody>
+          <a:bodyPr/>
+          <a:lstStyle/>
+          <a:p>
+            <a:fld id="{C0644275-5C74-4E59-8F01-9B0DD8D2F6FE}" type="slidenum">
+              <a:rPr kumimoji="1" lang="ja-JP" altLang="en-US" smtClean="0"/>
+              <a:pPr/>
+              <a:t>37</a:t>
+            </a:fld>
+            <a:endParaRPr kumimoji="1" lang="ja-JP" altLang="en-US" dirty="0"/>
+          </a:p>
+        </p:txBody>
+      </p:sp>
+    </p:spTree>
+    <p:extLst>
+      <p:ext uri="{BB962C8B-B14F-4D97-AF65-F5344CB8AC3E}">
+        <p14:creationId xmlns:p14="http://schemas.microsoft.com/office/powerpoint/2010/main" val="3017907017"/>
       </p:ext>
     </p:extLst>
   </p:cSld>
@@ -14267,6 +14750,1889 @@
               <a:t>Arduino IDE</a:t>
             </a:r>
             <a:r>
+              <a:rPr lang="ja-JP" altLang="en-US" dirty="0"/>
+              <a:t>の起動</a:t>
+            </a:r>
+            <a:endParaRPr kumimoji="1" lang="ja-JP" altLang="en-US" dirty="0"/>
+          </a:p>
+        </p:txBody>
+      </p:sp>
+      <p:sp>
+        <p:nvSpPr>
+          <p:cNvPr id="3" name="コンテンツ プレースホルダー 2">
+            <a:extLst>
+              <a:ext uri="{FF2B5EF4-FFF2-40B4-BE49-F238E27FC236}">
+                <a16:creationId xmlns:a16="http://schemas.microsoft.com/office/drawing/2014/main" id="{74A66E10-5ACC-090D-3D4C-6A69CDE56DC2}"/>
+              </a:ext>
+            </a:extLst>
+          </p:cNvPr>
+          <p:cNvSpPr>
+            <a:spLocks noGrp="1"/>
+          </p:cNvSpPr>
+          <p:nvPr>
+            <p:ph idx="1"/>
+          </p:nvPr>
+        </p:nvSpPr>
+        <p:spPr/>
+        <p:txBody>
+          <a:bodyPr/>
+          <a:lstStyle/>
+          <a:p>
+            <a:r>
+              <a:rPr kumimoji="1" lang="ja-JP" altLang="en-US" dirty="0"/>
+              <a:t>「</a:t>
+            </a:r>
+            <a:r>
+              <a:rPr kumimoji="1" lang="en-US" altLang="ja-JP" dirty="0"/>
+              <a:t>Hello World</a:t>
+            </a:r>
+            <a:r>
+              <a:rPr kumimoji="1" lang="ja-JP" altLang="en-US" dirty="0"/>
+              <a:t>」ファイルをダブルクリックし，</a:t>
+            </a:r>
+            <a:r>
+              <a:rPr kumimoji="1" lang="en-US" altLang="ja-JP" dirty="0"/>
+              <a:t>Arduino IDE</a:t>
+            </a:r>
+            <a:r>
+              <a:rPr lang="ja-JP" altLang="en-US" dirty="0"/>
+              <a:t>を起動</a:t>
+            </a:r>
+            <a:endParaRPr lang="en-US" altLang="ja-JP" dirty="0"/>
+          </a:p>
+          <a:p>
+            <a:pPr lvl="2"/>
+            <a:endParaRPr kumimoji="1" lang="en-US" altLang="ja-JP" dirty="0"/>
+          </a:p>
+          <a:p>
+            <a:r>
+              <a:rPr lang="ja-JP" altLang="en-US" dirty="0"/>
+              <a:t>起動時の画面</a:t>
+            </a:r>
+            <a:endParaRPr kumimoji="1" lang="en-US" altLang="ja-JP" dirty="0"/>
+          </a:p>
+        </p:txBody>
+      </p:sp>
+      <p:pic>
+        <p:nvPicPr>
+          <p:cNvPr id="6" name="図 5">
+            <a:extLst>
+              <a:ext uri="{FF2B5EF4-FFF2-40B4-BE49-F238E27FC236}">
+                <a16:creationId xmlns:a16="http://schemas.microsoft.com/office/drawing/2014/main" id="{3A683F24-B180-B0FF-23AB-BDA8346C9365}"/>
+              </a:ext>
+            </a:extLst>
+          </p:cNvPr>
+          <p:cNvPicPr>
+            <a:picLocks noChangeAspect="1"/>
+          </p:cNvPicPr>
+          <p:nvPr/>
+        </p:nvPicPr>
+        <p:blipFill>
+          <a:blip r:embed="rId3"/>
+          <a:stretch>
+            <a:fillRect/>
+          </a:stretch>
+        </p:blipFill>
+        <p:spPr>
+          <a:xfrm>
+            <a:off x="2022286" y="2016494"/>
+            <a:ext cx="4473183" cy="2902863"/>
+          </a:xfrm>
+          <a:prstGeom prst="rect">
+            <a:avLst/>
+          </a:prstGeom>
+        </p:spPr>
+      </p:pic>
+      <p:sp>
+        <p:nvSpPr>
+          <p:cNvPr id="4" name="吹き出し: 四角形 3">
+            <a:extLst>
+              <a:ext uri="{FF2B5EF4-FFF2-40B4-BE49-F238E27FC236}">
+                <a16:creationId xmlns:a16="http://schemas.microsoft.com/office/drawing/2014/main" id="{FA3C4A1A-CC76-1AAB-472D-7FCF5654F1B0}"/>
+              </a:ext>
+            </a:extLst>
+          </p:cNvPr>
+          <p:cNvSpPr/>
+          <p:nvPr/>
+        </p:nvSpPr>
+        <p:spPr>
+          <a:xfrm>
+            <a:off x="457199" y="2571750"/>
+            <a:ext cx="1219201" cy="681659"/>
+          </a:xfrm>
+          <a:prstGeom prst="wedgeRectCallout">
+            <a:avLst>
+              <a:gd name="adj1" fmla="val 84602"/>
+              <a:gd name="adj2" fmla="val -7488"/>
+            </a:avLst>
+          </a:prstGeom>
+          <a:solidFill>
+            <a:srgbClr val="FFFFE5"/>
+          </a:solidFill>
+          <a:ln>
+            <a:solidFill>
+              <a:schemeClr val="bg1">
+                <a:lumMod val="75000"/>
+              </a:schemeClr>
+            </a:solidFill>
+          </a:ln>
+        </p:spPr>
+        <p:style>
+          <a:lnRef idx="2">
+            <a:schemeClr val="accent1">
+              <a:shade val="50000"/>
+            </a:schemeClr>
+          </a:lnRef>
+          <a:fillRef idx="1">
+            <a:schemeClr val="accent1"/>
+          </a:fillRef>
+          <a:effectRef idx="0">
+            <a:schemeClr val="accent1"/>
+          </a:effectRef>
+          <a:fontRef idx="minor">
+            <a:schemeClr val="lt1"/>
+          </a:fontRef>
+        </p:style>
+        <p:txBody>
+          <a:bodyPr rtlCol="0" anchor="ctr"/>
+          <a:lstStyle/>
+          <a:p>
+            <a:pPr algn="ctr"/>
+            <a:r>
+              <a:rPr kumimoji="1" lang="ja-JP" altLang="en-US" dirty="0">
+                <a:solidFill>
+                  <a:schemeClr val="tx1"/>
+                </a:solidFill>
+              </a:rPr>
+              <a:t>ここを</a:t>
+            </a:r>
+            <a:endParaRPr kumimoji="1" lang="en-US" altLang="ja-JP" dirty="0">
+              <a:solidFill>
+                <a:schemeClr val="tx1"/>
+              </a:solidFill>
+            </a:endParaRPr>
+          </a:p>
+          <a:p>
+            <a:pPr algn="ctr"/>
+            <a:r>
+              <a:rPr kumimoji="1" lang="ja-JP" altLang="en-US" dirty="0">
+                <a:solidFill>
+                  <a:schemeClr val="tx1"/>
+                </a:solidFill>
+              </a:rPr>
+              <a:t>クリック</a:t>
+            </a:r>
+          </a:p>
+        </p:txBody>
+      </p:sp>
+    </p:spTree>
+    <p:extLst>
+      <p:ext uri="{BB962C8B-B14F-4D97-AF65-F5344CB8AC3E}">
+        <p14:creationId xmlns:p14="http://schemas.microsoft.com/office/powerpoint/2010/main" val="2136661841"/>
+      </p:ext>
+    </p:extLst>
+  </p:cSld>
+  <p:clrMapOvr>
+    <a:masterClrMapping/>
+  </p:clrMapOvr>
+</p:sld>
+</file>
+
+<file path=ppt/slides/slide13.xml><?xml version="1.0" encoding="utf-8"?>
+<p:sld xmlns:a="http://schemas.openxmlformats.org/drawingml/2006/main" xmlns:r="http://schemas.openxmlformats.org/officeDocument/2006/relationships" xmlns:p="http://schemas.openxmlformats.org/presentationml/2006/main">
+  <p:cSld>
+    <p:spTree>
+      <p:nvGrpSpPr>
+        <p:cNvPr id="1" name=""/>
+        <p:cNvGrpSpPr/>
+        <p:nvPr/>
+      </p:nvGrpSpPr>
+      <p:grpSpPr>
+        <a:xfrm>
+          <a:off x="0" y="0"/>
+          <a:ext cx="0" cy="0"/>
+          <a:chOff x="0" y="0"/>
+          <a:chExt cx="0" cy="0"/>
+        </a:xfrm>
+      </p:grpSpPr>
+      <p:sp>
+        <p:nvSpPr>
+          <p:cNvPr id="2" name="タイトル 1">
+            <a:extLst>
+              <a:ext uri="{FF2B5EF4-FFF2-40B4-BE49-F238E27FC236}">
+                <a16:creationId xmlns:a16="http://schemas.microsoft.com/office/drawing/2014/main" id="{FDA3C64E-105F-1B20-A59B-D0E8EFAE085E}"/>
+              </a:ext>
+            </a:extLst>
+          </p:cNvPr>
+          <p:cNvSpPr>
+            <a:spLocks noGrp="1"/>
+          </p:cNvSpPr>
+          <p:nvPr>
+            <p:ph type="title"/>
+          </p:nvPr>
+        </p:nvSpPr>
+        <p:spPr/>
+        <p:txBody>
+          <a:bodyPr/>
+          <a:lstStyle/>
+          <a:p>
+            <a:r>
+              <a:rPr lang="ja-JP" altLang="en-US" dirty="0"/>
+              <a:t>プラグインの選択方法</a:t>
+            </a:r>
+            <a:endParaRPr kumimoji="1" lang="ja-JP" altLang="en-US" dirty="0"/>
+          </a:p>
+        </p:txBody>
+      </p:sp>
+      <p:pic>
+        <p:nvPicPr>
+          <p:cNvPr id="4" name="図 3">
+            <a:extLst>
+              <a:ext uri="{FF2B5EF4-FFF2-40B4-BE49-F238E27FC236}">
+                <a16:creationId xmlns:a16="http://schemas.microsoft.com/office/drawing/2014/main" id="{8E650E38-35B2-A116-0B73-9BB8599114EA}"/>
+              </a:ext>
+            </a:extLst>
+          </p:cNvPr>
+          <p:cNvPicPr>
+            <a:picLocks noChangeAspect="1"/>
+          </p:cNvPicPr>
+          <p:nvPr/>
+        </p:nvPicPr>
+        <p:blipFill>
+          <a:blip r:embed="rId2"/>
+          <a:stretch>
+            <a:fillRect/>
+          </a:stretch>
+        </p:blipFill>
+        <p:spPr>
+          <a:xfrm>
+            <a:off x="3200112" y="960783"/>
+            <a:ext cx="5601305" cy="3836613"/>
+          </a:xfrm>
+          <a:prstGeom prst="rect">
+            <a:avLst/>
+          </a:prstGeom>
+        </p:spPr>
+      </p:pic>
+      <p:sp>
+        <p:nvSpPr>
+          <p:cNvPr id="5" name="吹き出し: 四角形 4">
+            <a:extLst>
+              <a:ext uri="{FF2B5EF4-FFF2-40B4-BE49-F238E27FC236}">
+                <a16:creationId xmlns:a16="http://schemas.microsoft.com/office/drawing/2014/main" id="{82E1385E-7193-3CD1-0CA9-C37D354CBE2E}"/>
+              </a:ext>
+            </a:extLst>
+          </p:cNvPr>
+          <p:cNvSpPr/>
+          <p:nvPr/>
+        </p:nvSpPr>
+        <p:spPr>
+          <a:xfrm>
+            <a:off x="424069" y="1212575"/>
+            <a:ext cx="3001617" cy="755374"/>
+          </a:xfrm>
+          <a:prstGeom prst="wedgeRectCallout">
+            <a:avLst>
+              <a:gd name="adj1" fmla="val 56509"/>
+              <a:gd name="adj2" fmla="val 13167"/>
+            </a:avLst>
+          </a:prstGeom>
+          <a:solidFill>
+            <a:srgbClr val="FFFFE5"/>
+          </a:solidFill>
+          <a:ln>
+            <a:solidFill>
+              <a:schemeClr val="bg1">
+                <a:lumMod val="75000"/>
+              </a:schemeClr>
+            </a:solidFill>
+          </a:ln>
+        </p:spPr>
+        <p:style>
+          <a:lnRef idx="2">
+            <a:schemeClr val="accent1">
+              <a:shade val="50000"/>
+            </a:schemeClr>
+          </a:lnRef>
+          <a:fillRef idx="1">
+            <a:schemeClr val="accent1"/>
+          </a:fillRef>
+          <a:effectRef idx="0">
+            <a:schemeClr val="accent1"/>
+          </a:effectRef>
+          <a:fontRef idx="minor">
+            <a:schemeClr val="lt1"/>
+          </a:fontRef>
+        </p:style>
+        <p:txBody>
+          <a:bodyPr rtlCol="0" anchor="ctr"/>
+          <a:lstStyle/>
+          <a:p>
+            <a:pPr algn="ctr"/>
+            <a:r>
+              <a:rPr kumimoji="1" lang="ja-JP" altLang="en-US" dirty="0">
+                <a:solidFill>
+                  <a:schemeClr val="tx1"/>
+                </a:solidFill>
+              </a:rPr>
+              <a:t>ここにプラグイン名を入力</a:t>
+            </a:r>
+            <a:endParaRPr kumimoji="1" lang="en-US" altLang="ja-JP" dirty="0">
+              <a:solidFill>
+                <a:schemeClr val="tx1"/>
+              </a:solidFill>
+            </a:endParaRPr>
+          </a:p>
+          <a:p>
+            <a:pPr algn="ctr"/>
+            <a:r>
+              <a:rPr kumimoji="1" lang="en-US" altLang="ja-JP" sz="1600" dirty="0">
+                <a:solidFill>
+                  <a:schemeClr val="tx1"/>
+                </a:solidFill>
+              </a:rPr>
+              <a:t>(</a:t>
+            </a:r>
+            <a:r>
+              <a:rPr kumimoji="1" lang="ja-JP" altLang="en-US" sz="1600" dirty="0">
+                <a:solidFill>
+                  <a:schemeClr val="tx1"/>
+                </a:solidFill>
+              </a:rPr>
+              <a:t>今回は「</a:t>
+            </a:r>
+            <a:r>
+              <a:rPr kumimoji="1" lang="en-US" altLang="ja-JP" sz="1600" dirty="0">
+                <a:solidFill>
+                  <a:schemeClr val="tx1"/>
+                </a:solidFill>
+              </a:rPr>
+              <a:t>Arduino</a:t>
+            </a:r>
+            <a:r>
+              <a:rPr kumimoji="1" lang="ja-JP" altLang="en-US" sz="1600" dirty="0">
+                <a:solidFill>
+                  <a:schemeClr val="tx1"/>
+                </a:solidFill>
+              </a:rPr>
+              <a:t>」と入力</a:t>
+            </a:r>
+            <a:r>
+              <a:rPr kumimoji="1" lang="en-US" altLang="ja-JP" sz="1600" dirty="0">
+                <a:solidFill>
+                  <a:schemeClr val="tx1"/>
+                </a:solidFill>
+              </a:rPr>
+              <a:t>)</a:t>
+            </a:r>
+            <a:endParaRPr kumimoji="1" lang="ja-JP" altLang="en-US" sz="1600" dirty="0">
+              <a:solidFill>
+                <a:schemeClr val="tx1"/>
+              </a:solidFill>
+            </a:endParaRPr>
+          </a:p>
+        </p:txBody>
+      </p:sp>
+    </p:spTree>
+    <p:extLst>
+      <p:ext uri="{BB962C8B-B14F-4D97-AF65-F5344CB8AC3E}">
+        <p14:creationId xmlns:p14="http://schemas.microsoft.com/office/powerpoint/2010/main" val="2153565202"/>
+      </p:ext>
+    </p:extLst>
+  </p:cSld>
+  <p:clrMapOvr>
+    <a:masterClrMapping/>
+  </p:clrMapOvr>
+</p:sld>
+</file>
+
+<file path=ppt/slides/slide14.xml><?xml version="1.0" encoding="utf-8"?>
+<p:sld xmlns:a="http://schemas.openxmlformats.org/drawingml/2006/main" xmlns:r="http://schemas.openxmlformats.org/officeDocument/2006/relationships" xmlns:p="http://schemas.openxmlformats.org/presentationml/2006/main">
+  <p:cSld>
+    <p:spTree>
+      <p:nvGrpSpPr>
+        <p:cNvPr id="1" name=""/>
+        <p:cNvGrpSpPr/>
+        <p:nvPr/>
+      </p:nvGrpSpPr>
+      <p:grpSpPr>
+        <a:xfrm>
+          <a:off x="0" y="0"/>
+          <a:ext cx="0" cy="0"/>
+          <a:chOff x="0" y="0"/>
+          <a:chExt cx="0" cy="0"/>
+        </a:xfrm>
+      </p:grpSpPr>
+      <p:sp>
+        <p:nvSpPr>
+          <p:cNvPr id="2" name="タイトル 1">
+            <a:extLst>
+              <a:ext uri="{FF2B5EF4-FFF2-40B4-BE49-F238E27FC236}">
+                <a16:creationId xmlns:a16="http://schemas.microsoft.com/office/drawing/2014/main" id="{A256FE61-749D-A0E1-848E-61697F58732A}"/>
+              </a:ext>
+            </a:extLst>
+          </p:cNvPr>
+          <p:cNvSpPr>
+            <a:spLocks noGrp="1"/>
+          </p:cNvSpPr>
+          <p:nvPr>
+            <p:ph type="title"/>
+          </p:nvPr>
+        </p:nvSpPr>
+        <p:spPr/>
+        <p:txBody>
+          <a:bodyPr/>
+          <a:lstStyle/>
+          <a:p>
+            <a:r>
+              <a:rPr kumimoji="1" lang="ja-JP" altLang="en-US" dirty="0"/>
+              <a:t>プラグインのインストール</a:t>
+            </a:r>
+          </a:p>
+        </p:txBody>
+      </p:sp>
+      <p:pic>
+        <p:nvPicPr>
+          <p:cNvPr id="3" name="図 2">
+            <a:extLst>
+              <a:ext uri="{FF2B5EF4-FFF2-40B4-BE49-F238E27FC236}">
+                <a16:creationId xmlns:a16="http://schemas.microsoft.com/office/drawing/2014/main" id="{23DA6BF5-FA09-27CE-BCE7-BFEDA7971D69}"/>
+              </a:ext>
+            </a:extLst>
+          </p:cNvPr>
+          <p:cNvPicPr>
+            <a:picLocks noChangeAspect="1"/>
+          </p:cNvPicPr>
+          <p:nvPr/>
+        </p:nvPicPr>
+        <p:blipFill>
+          <a:blip r:embed="rId2"/>
+          <a:stretch>
+            <a:fillRect/>
+          </a:stretch>
+        </p:blipFill>
+        <p:spPr>
+          <a:xfrm>
+            <a:off x="3200112" y="960783"/>
+            <a:ext cx="5601305" cy="3836613"/>
+          </a:xfrm>
+          <a:prstGeom prst="rect">
+            <a:avLst/>
+          </a:prstGeom>
+        </p:spPr>
+      </p:pic>
+      <p:sp>
+        <p:nvSpPr>
+          <p:cNvPr id="4" name="吹き出し: 四角形 3">
+            <a:extLst>
+              <a:ext uri="{FF2B5EF4-FFF2-40B4-BE49-F238E27FC236}">
+                <a16:creationId xmlns:a16="http://schemas.microsoft.com/office/drawing/2014/main" id="{E58A1FC4-2147-0EB0-5183-38AA0BD233B4}"/>
+              </a:ext>
+            </a:extLst>
+          </p:cNvPr>
+          <p:cNvSpPr/>
+          <p:nvPr/>
+        </p:nvSpPr>
+        <p:spPr>
+          <a:xfrm>
+            <a:off x="1132774" y="1921566"/>
+            <a:ext cx="2067338" cy="1007166"/>
+          </a:xfrm>
+          <a:prstGeom prst="wedgeRectCallout">
+            <a:avLst>
+              <a:gd name="adj1" fmla="val 71573"/>
+              <a:gd name="adj2" fmla="val 69088"/>
+            </a:avLst>
+          </a:prstGeom>
+          <a:solidFill>
+            <a:srgbClr val="FFFFE5"/>
+          </a:solidFill>
+          <a:ln>
+            <a:solidFill>
+              <a:schemeClr val="bg1">
+                <a:lumMod val="75000"/>
+              </a:schemeClr>
+            </a:solidFill>
+          </a:ln>
+        </p:spPr>
+        <p:style>
+          <a:lnRef idx="2">
+            <a:schemeClr val="accent1">
+              <a:shade val="50000"/>
+            </a:schemeClr>
+          </a:lnRef>
+          <a:fillRef idx="1">
+            <a:schemeClr val="accent1"/>
+          </a:fillRef>
+          <a:effectRef idx="0">
+            <a:schemeClr val="accent1"/>
+          </a:effectRef>
+          <a:fontRef idx="minor">
+            <a:schemeClr val="lt1"/>
+          </a:fontRef>
+        </p:style>
+        <p:txBody>
+          <a:bodyPr rtlCol="0" anchor="ctr"/>
+          <a:lstStyle/>
+          <a:p>
+            <a:pPr algn="ctr"/>
+            <a:r>
+              <a:rPr kumimoji="1" lang="ja-JP" altLang="en-US" sz="1600" dirty="0">
+                <a:solidFill>
+                  <a:schemeClr val="tx1"/>
+                </a:solidFill>
+              </a:rPr>
+              <a:t>①リストの中から</a:t>
+            </a:r>
+            <a:endParaRPr kumimoji="1" lang="en-US" altLang="ja-JP" sz="1600" dirty="0">
+              <a:solidFill>
+                <a:schemeClr val="tx1"/>
+              </a:solidFill>
+            </a:endParaRPr>
+          </a:p>
+          <a:p>
+            <a:pPr algn="ctr"/>
+            <a:r>
+              <a:rPr kumimoji="1" lang="ja-JP" altLang="en-US" sz="1600" dirty="0">
+                <a:solidFill>
+                  <a:schemeClr val="tx1"/>
+                </a:solidFill>
+              </a:rPr>
+              <a:t>インストールする</a:t>
+            </a:r>
+            <a:endParaRPr kumimoji="1" lang="en-US" altLang="ja-JP" sz="1600" dirty="0">
+              <a:solidFill>
+                <a:schemeClr val="tx1"/>
+              </a:solidFill>
+            </a:endParaRPr>
+          </a:p>
+          <a:p>
+            <a:pPr algn="ctr"/>
+            <a:r>
+              <a:rPr kumimoji="1" lang="ja-JP" altLang="en-US" sz="1600" dirty="0">
+                <a:solidFill>
+                  <a:schemeClr val="tx1"/>
+                </a:solidFill>
+              </a:rPr>
+              <a:t>プラグインを探す</a:t>
+            </a:r>
+          </a:p>
+        </p:txBody>
+      </p:sp>
+      <p:sp>
+        <p:nvSpPr>
+          <p:cNvPr id="5" name="吹き出し: 四角形 4">
+            <a:extLst>
+              <a:ext uri="{FF2B5EF4-FFF2-40B4-BE49-F238E27FC236}">
+                <a16:creationId xmlns:a16="http://schemas.microsoft.com/office/drawing/2014/main" id="{4D785F0C-1DF1-29D5-E8B6-6D2DD6D1EF95}"/>
+              </a:ext>
+            </a:extLst>
+          </p:cNvPr>
+          <p:cNvSpPr/>
+          <p:nvPr/>
+        </p:nvSpPr>
+        <p:spPr>
+          <a:xfrm>
+            <a:off x="874643" y="3034748"/>
+            <a:ext cx="2252582" cy="1007166"/>
+          </a:xfrm>
+          <a:prstGeom prst="wedgeRectCallout">
+            <a:avLst>
+              <a:gd name="adj1" fmla="val 75103"/>
+              <a:gd name="adj2" fmla="val 54614"/>
+            </a:avLst>
+          </a:prstGeom>
+          <a:solidFill>
+            <a:srgbClr val="FFFFE5"/>
+          </a:solidFill>
+          <a:ln>
+            <a:solidFill>
+              <a:schemeClr val="bg1">
+                <a:lumMod val="75000"/>
+              </a:schemeClr>
+            </a:solidFill>
+          </a:ln>
+        </p:spPr>
+        <p:style>
+          <a:lnRef idx="2">
+            <a:schemeClr val="accent1">
+              <a:shade val="50000"/>
+            </a:schemeClr>
+          </a:lnRef>
+          <a:fillRef idx="1">
+            <a:schemeClr val="accent1"/>
+          </a:fillRef>
+          <a:effectRef idx="0">
+            <a:schemeClr val="accent1"/>
+          </a:effectRef>
+          <a:fontRef idx="minor">
+            <a:schemeClr val="lt1"/>
+          </a:fontRef>
+        </p:style>
+        <p:txBody>
+          <a:bodyPr rtlCol="0" anchor="ctr"/>
+          <a:lstStyle/>
+          <a:p>
+            <a:pPr algn="ctr"/>
+            <a:r>
+              <a:rPr kumimoji="1" lang="ja-JP" altLang="en-US" sz="1600" dirty="0">
+                <a:solidFill>
+                  <a:schemeClr val="tx1"/>
+                </a:solidFill>
+              </a:rPr>
+              <a:t>②「インストール」を</a:t>
+            </a:r>
+            <a:endParaRPr kumimoji="1" lang="en-US" altLang="ja-JP" sz="1600" dirty="0">
+              <a:solidFill>
+                <a:schemeClr val="tx1"/>
+              </a:solidFill>
+            </a:endParaRPr>
+          </a:p>
+          <a:p>
+            <a:pPr algn="ctr"/>
+            <a:r>
+              <a:rPr kumimoji="1" lang="ja-JP" altLang="en-US" sz="1600" dirty="0">
+                <a:solidFill>
+                  <a:schemeClr val="tx1"/>
+                </a:solidFill>
+              </a:rPr>
+              <a:t>クリック</a:t>
+            </a:r>
+          </a:p>
+        </p:txBody>
+      </p:sp>
+    </p:spTree>
+    <p:extLst>
+      <p:ext uri="{BB962C8B-B14F-4D97-AF65-F5344CB8AC3E}">
+        <p14:creationId xmlns:p14="http://schemas.microsoft.com/office/powerpoint/2010/main" val="131422820"/>
+      </p:ext>
+    </p:extLst>
+  </p:cSld>
+  <p:clrMapOvr>
+    <a:masterClrMapping/>
+  </p:clrMapOvr>
+</p:sld>
+</file>
+
+<file path=ppt/slides/slide15.xml><?xml version="1.0" encoding="utf-8"?>
+<p:sld xmlns:a="http://schemas.openxmlformats.org/drawingml/2006/main" xmlns:r="http://schemas.openxmlformats.org/officeDocument/2006/relationships" xmlns:p="http://schemas.openxmlformats.org/presentationml/2006/main">
+  <p:cSld>
+    <p:spTree>
+      <p:nvGrpSpPr>
+        <p:cNvPr id="1" name=""/>
+        <p:cNvGrpSpPr/>
+        <p:nvPr/>
+      </p:nvGrpSpPr>
+      <p:grpSpPr>
+        <a:xfrm>
+          <a:off x="0" y="0"/>
+          <a:ext cx="0" cy="0"/>
+          <a:chOff x="0" y="0"/>
+          <a:chExt cx="0" cy="0"/>
+        </a:xfrm>
+      </p:grpSpPr>
+      <p:sp>
+        <p:nvSpPr>
+          <p:cNvPr id="2" name="タイトル 1">
+            <a:extLst>
+              <a:ext uri="{FF2B5EF4-FFF2-40B4-BE49-F238E27FC236}">
+                <a16:creationId xmlns:a16="http://schemas.microsoft.com/office/drawing/2014/main" id="{D26523A7-1078-F679-2309-E608D1EBFBF9}"/>
+              </a:ext>
+            </a:extLst>
+          </p:cNvPr>
+          <p:cNvSpPr>
+            <a:spLocks noGrp="1"/>
+          </p:cNvSpPr>
+          <p:nvPr>
+            <p:ph type="title"/>
+          </p:nvPr>
+        </p:nvSpPr>
+        <p:spPr/>
+        <p:txBody>
+          <a:bodyPr/>
+          <a:lstStyle/>
+          <a:p>
+            <a:r>
+              <a:rPr kumimoji="1" lang="ja-JP" altLang="en-US" dirty="0"/>
+              <a:t>実際にインストールするプラグイン</a:t>
+            </a:r>
+          </a:p>
+        </p:txBody>
+      </p:sp>
+      <p:sp>
+        <p:nvSpPr>
+          <p:cNvPr id="3" name="コンテンツ プレースホルダー 2">
+            <a:extLst>
+              <a:ext uri="{FF2B5EF4-FFF2-40B4-BE49-F238E27FC236}">
+                <a16:creationId xmlns:a16="http://schemas.microsoft.com/office/drawing/2014/main" id="{8B8BD6DA-0D96-C658-1FCA-177EA786FAD2}"/>
+              </a:ext>
+            </a:extLst>
+          </p:cNvPr>
+          <p:cNvSpPr>
+            <a:spLocks noGrp="1"/>
+          </p:cNvSpPr>
+          <p:nvPr>
+            <p:ph idx="1"/>
+          </p:nvPr>
+        </p:nvSpPr>
+        <p:spPr/>
+        <p:txBody>
+          <a:bodyPr/>
+          <a:lstStyle/>
+          <a:p>
+            <a:r>
+              <a:rPr kumimoji="1" lang="ja-JP" altLang="en-US" dirty="0"/>
+              <a:t>必要なプラグイン</a:t>
+            </a:r>
+          </a:p>
+        </p:txBody>
+      </p:sp>
+      <p:graphicFrame>
+        <p:nvGraphicFramePr>
+          <p:cNvPr id="4" name="表 3">
+            <a:extLst>
+              <a:ext uri="{FF2B5EF4-FFF2-40B4-BE49-F238E27FC236}">
+                <a16:creationId xmlns:a16="http://schemas.microsoft.com/office/drawing/2014/main" id="{DC49BE4E-FBC8-06C8-793A-02B1CC8554EB}"/>
+              </a:ext>
+            </a:extLst>
+          </p:cNvPr>
+          <p:cNvGraphicFramePr>
+            <a:graphicFrameLocks noGrp="1"/>
+          </p:cNvGraphicFramePr>
+          <p:nvPr>
+            <p:extLst>
+              <p:ext uri="{D42A27DB-BD31-4B8C-83A1-F6EECF244321}">
+                <p14:modId xmlns:p14="http://schemas.microsoft.com/office/powerpoint/2010/main" val="1774759642"/>
+              </p:ext>
+            </p:extLst>
+          </p:nvPr>
+        </p:nvGraphicFramePr>
+        <p:xfrm>
+          <a:off x="1292087" y="1459230"/>
+          <a:ext cx="5966079" cy="1783080"/>
+        </p:xfrm>
+        <a:graphic>
+          <a:graphicData uri="http://schemas.openxmlformats.org/drawingml/2006/table">
+            <a:tbl>
+              <a:tblPr firstRow="1" bandRow="1">
+                <a:tableStyleId>{00A15C55-8517-42AA-B614-E9B94910E393}</a:tableStyleId>
+              </a:tblPr>
+              <a:tblGrid>
+                <a:gridCol w="3934079">
+                  <a:extLst>
+                    <a:ext uri="{9D8B030D-6E8A-4147-A177-3AD203B41FA5}">
+                      <a16:colId xmlns:a16="http://schemas.microsoft.com/office/drawing/2014/main" val="359466756"/>
+                    </a:ext>
+                  </a:extLst>
+                </a:gridCol>
+                <a:gridCol w="2032000">
+                  <a:extLst>
+                    <a:ext uri="{9D8B030D-6E8A-4147-A177-3AD203B41FA5}">
+                      <a16:colId xmlns:a16="http://schemas.microsoft.com/office/drawing/2014/main" val="1813266541"/>
+                    </a:ext>
+                  </a:extLst>
+                </a:gridCol>
+              </a:tblGrid>
+              <a:tr h="206264">
+                <a:tc>
+                  <a:txBody>
+                    <a:bodyPr/>
+                    <a:lstStyle/>
+                    <a:p>
+                      <a:r>
+                        <a:rPr kumimoji="1" lang="ja-JP" altLang="en-US" dirty="0"/>
+                        <a:t>プラグイン名</a:t>
+                      </a:r>
+                    </a:p>
+                  </a:txBody>
+                  <a:tcPr/>
+                </a:tc>
+                <a:tc>
+                  <a:txBody>
+                    <a:bodyPr/>
+                    <a:lstStyle/>
+                    <a:p>
+                      <a:r>
+                        <a:rPr kumimoji="1" lang="ja-JP" altLang="en-US" dirty="0"/>
+                        <a:t>代表的な対応機種</a:t>
+                      </a:r>
+                    </a:p>
+                  </a:txBody>
+                  <a:tcPr/>
+                </a:tc>
+                <a:extLst>
+                  <a:ext uri="{0D108BD9-81ED-4DB2-BD59-A6C34878D82A}">
+                    <a16:rowId xmlns:a16="http://schemas.microsoft.com/office/drawing/2014/main" val="1312857334"/>
+                  </a:ext>
+                </a:extLst>
+              </a:tr>
+              <a:tr h="206264">
+                <a:tc>
+                  <a:txBody>
+                    <a:bodyPr/>
+                    <a:lstStyle/>
+                    <a:p>
+                      <a:r>
+                        <a:rPr kumimoji="1" lang="en-US" altLang="ja-JP" dirty="0"/>
+                        <a:t>Arduino </a:t>
+                      </a:r>
+                      <a:r>
+                        <a:rPr kumimoji="1" lang="en-US" altLang="ja-JP" dirty="0" err="1"/>
+                        <a:t>Mbed</a:t>
+                      </a:r>
+                      <a:r>
+                        <a:rPr kumimoji="1" lang="en-US" altLang="ja-JP" dirty="0"/>
+                        <a:t> OS Giga Boards</a:t>
+                      </a:r>
+                      <a:endParaRPr kumimoji="1" lang="ja-JP" altLang="en-US" dirty="0"/>
+                    </a:p>
+                  </a:txBody>
+                  <a:tcPr/>
+                </a:tc>
+                <a:tc>
+                  <a:txBody>
+                    <a:bodyPr/>
+                    <a:lstStyle/>
+                    <a:p>
+                      <a:r>
+                        <a:rPr kumimoji="1" lang="en-US" altLang="ja-JP" dirty="0"/>
+                        <a:t>Giga R1 </a:t>
+                      </a:r>
+                      <a:r>
+                        <a:rPr kumimoji="1" lang="en-US" altLang="ja-JP" dirty="0" err="1"/>
+                        <a:t>WiFi</a:t>
+                      </a:r>
+                      <a:endParaRPr kumimoji="1" lang="ja-JP" altLang="en-US" dirty="0"/>
+                    </a:p>
+                  </a:txBody>
+                  <a:tcPr/>
+                </a:tc>
+                <a:extLst>
+                  <a:ext uri="{0D108BD9-81ED-4DB2-BD59-A6C34878D82A}">
+                    <a16:rowId xmlns:a16="http://schemas.microsoft.com/office/drawing/2014/main" val="3411394117"/>
+                  </a:ext>
+                </a:extLst>
+              </a:tr>
+              <a:tr h="206264">
+                <a:tc>
+                  <a:txBody>
+                    <a:bodyPr/>
+                    <a:lstStyle/>
+                    <a:p>
+                      <a:r>
+                        <a:rPr kumimoji="1" lang="en-US" altLang="ja-JP" dirty="0"/>
+                        <a:t>Arduino </a:t>
+                      </a:r>
+                      <a:r>
+                        <a:rPr kumimoji="1" lang="en-US" altLang="ja-JP" dirty="0" err="1"/>
+                        <a:t>Mbed</a:t>
+                      </a:r>
+                      <a:r>
+                        <a:rPr kumimoji="1" lang="en-US" altLang="ja-JP" dirty="0"/>
+                        <a:t> OS Nano Boards</a:t>
+                      </a:r>
+                      <a:endParaRPr kumimoji="1" lang="ja-JP" altLang="en-US" dirty="0"/>
+                    </a:p>
+                  </a:txBody>
+                  <a:tcPr/>
+                </a:tc>
+                <a:tc>
+                  <a:txBody>
+                    <a:bodyPr/>
+                    <a:lstStyle/>
+                    <a:p>
+                      <a:r>
+                        <a:rPr kumimoji="1" lang="en-US" altLang="ja-JP" dirty="0"/>
+                        <a:t>Nano33 IoT</a:t>
+                      </a:r>
+                      <a:endParaRPr kumimoji="1" lang="ja-JP" altLang="en-US" dirty="0"/>
+                    </a:p>
+                  </a:txBody>
+                  <a:tcPr/>
+                </a:tc>
+                <a:extLst>
+                  <a:ext uri="{0D108BD9-81ED-4DB2-BD59-A6C34878D82A}">
+                    <a16:rowId xmlns:a16="http://schemas.microsoft.com/office/drawing/2014/main" val="3210107855"/>
+                  </a:ext>
+                </a:extLst>
+              </a:tr>
+              <a:tr h="206264">
+                <a:tc>
+                  <a:txBody>
+                    <a:bodyPr/>
+                    <a:lstStyle/>
+                    <a:p>
+                      <a:r>
+                        <a:rPr kumimoji="1" lang="en-US" altLang="ja-JP" dirty="0"/>
+                        <a:t>Arduino SAMD Boards (32bit ARM Cortex…)</a:t>
+                      </a:r>
+                      <a:endParaRPr kumimoji="1" lang="ja-JP" altLang="en-US" dirty="0"/>
+                    </a:p>
+                  </a:txBody>
+                  <a:tcPr/>
+                </a:tc>
+                <a:tc>
+                  <a:txBody>
+                    <a:bodyPr/>
+                    <a:lstStyle/>
+                    <a:p>
+                      <a:r>
+                        <a:rPr kumimoji="1" lang="en-US" altLang="ja-JP" dirty="0"/>
+                        <a:t>MKR </a:t>
+                      </a:r>
+                      <a:r>
+                        <a:rPr kumimoji="1" lang="en-US" altLang="ja-JP" dirty="0" err="1"/>
+                        <a:t>WiFi</a:t>
+                      </a:r>
+                      <a:r>
+                        <a:rPr kumimoji="1" lang="en-US" altLang="ja-JP" dirty="0"/>
+                        <a:t> 1010</a:t>
+                      </a:r>
+                      <a:endParaRPr kumimoji="1" lang="ja-JP" altLang="en-US" dirty="0"/>
+                    </a:p>
+                  </a:txBody>
+                  <a:tcPr/>
+                </a:tc>
+                <a:extLst>
+                  <a:ext uri="{0D108BD9-81ED-4DB2-BD59-A6C34878D82A}">
+                    <a16:rowId xmlns:a16="http://schemas.microsoft.com/office/drawing/2014/main" val="904820921"/>
+                  </a:ext>
+                </a:extLst>
+              </a:tr>
+              <a:tr h="206264">
+                <a:tc>
+                  <a:txBody>
+                    <a:bodyPr/>
+                    <a:lstStyle/>
+                    <a:p>
+                      <a:r>
+                        <a:rPr kumimoji="1" lang="en-US" altLang="ja-JP" dirty="0"/>
+                        <a:t>Arduino Uno R4 Boards</a:t>
+                      </a:r>
+                      <a:endParaRPr kumimoji="1" lang="ja-JP" altLang="en-US" dirty="0"/>
+                    </a:p>
+                  </a:txBody>
+                  <a:tcPr/>
+                </a:tc>
+                <a:tc>
+                  <a:txBody>
+                    <a:bodyPr/>
+                    <a:lstStyle/>
+                    <a:p>
+                      <a:r>
+                        <a:rPr kumimoji="1" lang="en-US" altLang="ja-JP" dirty="0"/>
+                        <a:t>Uno R4 minima</a:t>
+                      </a:r>
+                      <a:endParaRPr kumimoji="1" lang="ja-JP" altLang="en-US" dirty="0"/>
+                    </a:p>
+                  </a:txBody>
+                  <a:tcPr/>
+                </a:tc>
+                <a:extLst>
+                  <a:ext uri="{0D108BD9-81ED-4DB2-BD59-A6C34878D82A}">
+                    <a16:rowId xmlns:a16="http://schemas.microsoft.com/office/drawing/2014/main" val="4112716232"/>
+                  </a:ext>
+                </a:extLst>
+              </a:tr>
+              <a:tr h="206264">
+                <a:tc>
+                  <a:txBody>
+                    <a:bodyPr/>
+                    <a:lstStyle/>
+                    <a:p>
+                      <a:r>
+                        <a:rPr kumimoji="1" lang="en-US" altLang="ja-JP" dirty="0"/>
+                        <a:t>Arduino ESP32 Boards</a:t>
+                      </a:r>
+                      <a:endParaRPr kumimoji="1" lang="ja-JP" altLang="en-US" dirty="0"/>
+                    </a:p>
+                  </a:txBody>
+                  <a:tcPr/>
+                </a:tc>
+                <a:tc>
+                  <a:txBody>
+                    <a:bodyPr/>
+                    <a:lstStyle/>
+                    <a:p>
+                      <a:r>
+                        <a:rPr kumimoji="1" lang="en-US" altLang="ja-JP" dirty="0"/>
+                        <a:t>Nano ESP32</a:t>
+                      </a:r>
+                      <a:endParaRPr kumimoji="1" lang="ja-JP" altLang="en-US" dirty="0"/>
+                    </a:p>
+                  </a:txBody>
+                  <a:tcPr/>
+                </a:tc>
+                <a:extLst>
+                  <a:ext uri="{0D108BD9-81ED-4DB2-BD59-A6C34878D82A}">
+                    <a16:rowId xmlns:a16="http://schemas.microsoft.com/office/drawing/2014/main" val="1146941338"/>
+                  </a:ext>
+                </a:extLst>
+              </a:tr>
+            </a:tbl>
+          </a:graphicData>
+        </a:graphic>
+      </p:graphicFrame>
+    </p:spTree>
+    <p:extLst>
+      <p:ext uri="{BB962C8B-B14F-4D97-AF65-F5344CB8AC3E}">
+        <p14:creationId xmlns:p14="http://schemas.microsoft.com/office/powerpoint/2010/main" val="3313266945"/>
+      </p:ext>
+    </p:extLst>
+  </p:cSld>
+  <p:clrMapOvr>
+    <a:masterClrMapping/>
+  </p:clrMapOvr>
+</p:sld>
+</file>
+
+<file path=ppt/slides/slide16.xml><?xml version="1.0" encoding="utf-8"?>
+<p:sld xmlns:a="http://schemas.openxmlformats.org/drawingml/2006/main" xmlns:r="http://schemas.openxmlformats.org/officeDocument/2006/relationships" xmlns:p="http://schemas.openxmlformats.org/presentationml/2006/main">
+  <p:cSld>
+    <p:spTree>
+      <p:nvGrpSpPr>
+        <p:cNvPr id="1" name=""/>
+        <p:cNvGrpSpPr/>
+        <p:nvPr/>
+      </p:nvGrpSpPr>
+      <p:grpSpPr>
+        <a:xfrm>
+          <a:off x="0" y="0"/>
+          <a:ext cx="0" cy="0"/>
+          <a:chOff x="0" y="0"/>
+          <a:chExt cx="0" cy="0"/>
+        </a:xfrm>
+      </p:grpSpPr>
+      <p:sp>
+        <p:nvSpPr>
+          <p:cNvPr id="2" name="タイトル 1">
+            <a:extLst>
+              <a:ext uri="{FF2B5EF4-FFF2-40B4-BE49-F238E27FC236}">
+                <a16:creationId xmlns:a16="http://schemas.microsoft.com/office/drawing/2014/main" id="{85B2359A-A163-6720-D71E-5E8F141D973A}"/>
+              </a:ext>
+            </a:extLst>
+          </p:cNvPr>
+          <p:cNvSpPr>
+            <a:spLocks noGrp="1"/>
+          </p:cNvSpPr>
+          <p:nvPr>
+            <p:ph type="title"/>
+          </p:nvPr>
+        </p:nvSpPr>
+        <p:spPr/>
+        <p:txBody>
+          <a:bodyPr/>
+          <a:lstStyle/>
+          <a:p>
+            <a:r>
+              <a:rPr kumimoji="1" lang="ja-JP" altLang="en-US" dirty="0"/>
+              <a:t>インストール後の状態</a:t>
+            </a:r>
+          </a:p>
+        </p:txBody>
+      </p:sp>
+      <p:pic>
+        <p:nvPicPr>
+          <p:cNvPr id="4" name="図 3">
+            <a:extLst>
+              <a:ext uri="{FF2B5EF4-FFF2-40B4-BE49-F238E27FC236}">
+                <a16:creationId xmlns:a16="http://schemas.microsoft.com/office/drawing/2014/main" id="{FE0ECDF5-7EFA-21EF-5E3F-A78EFAA77855}"/>
+              </a:ext>
+            </a:extLst>
+          </p:cNvPr>
+          <p:cNvPicPr>
+            <a:picLocks noChangeAspect="1"/>
+          </p:cNvPicPr>
+          <p:nvPr/>
+        </p:nvPicPr>
+        <p:blipFill>
+          <a:blip r:embed="rId2"/>
+          <a:stretch>
+            <a:fillRect/>
+          </a:stretch>
+        </p:blipFill>
+        <p:spPr>
+          <a:xfrm>
+            <a:off x="2805873" y="627063"/>
+            <a:ext cx="4835519" cy="4250528"/>
+          </a:xfrm>
+          <a:prstGeom prst="rect">
+            <a:avLst/>
+          </a:prstGeom>
+        </p:spPr>
+      </p:pic>
+      <p:sp>
+        <p:nvSpPr>
+          <p:cNvPr id="5" name="吹き出し: 四角形 4">
+            <a:extLst>
+              <a:ext uri="{FF2B5EF4-FFF2-40B4-BE49-F238E27FC236}">
+                <a16:creationId xmlns:a16="http://schemas.microsoft.com/office/drawing/2014/main" id="{C0385760-2124-1005-75F4-7CEA5B7B5AC3}"/>
+              </a:ext>
+            </a:extLst>
+          </p:cNvPr>
+          <p:cNvSpPr/>
+          <p:nvPr/>
+        </p:nvSpPr>
+        <p:spPr>
+          <a:xfrm>
+            <a:off x="234000" y="1404730"/>
+            <a:ext cx="2252582" cy="1007166"/>
+          </a:xfrm>
+          <a:prstGeom prst="wedgeRectCallout">
+            <a:avLst>
+              <a:gd name="adj1" fmla="val 75103"/>
+              <a:gd name="adj2" fmla="val 54614"/>
+            </a:avLst>
+          </a:prstGeom>
+          <a:solidFill>
+            <a:srgbClr val="FFFFE5"/>
+          </a:solidFill>
+          <a:ln>
+            <a:solidFill>
+              <a:schemeClr val="bg1">
+                <a:lumMod val="75000"/>
+              </a:schemeClr>
+            </a:solidFill>
+          </a:ln>
+        </p:spPr>
+        <p:style>
+          <a:lnRef idx="2">
+            <a:schemeClr val="accent1">
+              <a:shade val="50000"/>
+            </a:schemeClr>
+          </a:lnRef>
+          <a:fillRef idx="1">
+            <a:schemeClr val="accent1"/>
+          </a:fillRef>
+          <a:effectRef idx="0">
+            <a:schemeClr val="accent1"/>
+          </a:effectRef>
+          <a:fontRef idx="minor">
+            <a:schemeClr val="lt1"/>
+          </a:fontRef>
+        </p:style>
+        <p:txBody>
+          <a:bodyPr rtlCol="0" anchor="ctr"/>
+          <a:lstStyle/>
+          <a:p>
+            <a:pPr algn="ctr"/>
+            <a:r>
+              <a:rPr kumimoji="1" lang="ja-JP" altLang="en-US" sz="1600" dirty="0">
+                <a:solidFill>
+                  <a:schemeClr val="tx1"/>
+                </a:solidFill>
+              </a:rPr>
+              <a:t>インストールされた</a:t>
+            </a:r>
+            <a:endParaRPr kumimoji="1" lang="en-US" altLang="ja-JP" sz="1600" dirty="0">
+              <a:solidFill>
+                <a:schemeClr val="tx1"/>
+              </a:solidFill>
+            </a:endParaRPr>
+          </a:p>
+          <a:p>
+            <a:pPr algn="ctr"/>
+            <a:r>
+              <a:rPr kumimoji="1" lang="ja-JP" altLang="en-US" sz="1600" dirty="0">
+                <a:solidFill>
+                  <a:schemeClr val="tx1"/>
+                </a:solidFill>
+              </a:rPr>
+              <a:t>バージョンが表示</a:t>
+            </a:r>
+          </a:p>
+        </p:txBody>
+      </p:sp>
+    </p:spTree>
+    <p:extLst>
+      <p:ext uri="{BB962C8B-B14F-4D97-AF65-F5344CB8AC3E}">
+        <p14:creationId xmlns:p14="http://schemas.microsoft.com/office/powerpoint/2010/main" val="3360473473"/>
+      </p:ext>
+    </p:extLst>
+  </p:cSld>
+  <p:clrMapOvr>
+    <a:masterClrMapping/>
+  </p:clrMapOvr>
+</p:sld>
+</file>
+
+<file path=ppt/slides/slide17.xml><?xml version="1.0" encoding="utf-8"?>
+<p:sld xmlns:a="http://schemas.openxmlformats.org/drawingml/2006/main" xmlns:r="http://schemas.openxmlformats.org/officeDocument/2006/relationships" xmlns:p="http://schemas.openxmlformats.org/presentationml/2006/main">
+  <p:cSld>
+    <p:spTree>
+      <p:nvGrpSpPr>
+        <p:cNvPr id="1" name=""/>
+        <p:cNvGrpSpPr/>
+        <p:nvPr/>
+      </p:nvGrpSpPr>
+      <p:grpSpPr>
+        <a:xfrm>
+          <a:off x="0" y="0"/>
+          <a:ext cx="0" cy="0"/>
+          <a:chOff x="0" y="0"/>
+          <a:chExt cx="0" cy="0"/>
+        </a:xfrm>
+      </p:grpSpPr>
+      <p:sp>
+        <p:nvSpPr>
+          <p:cNvPr id="2" name="タイトル 1">
+            <a:extLst>
+              <a:ext uri="{FF2B5EF4-FFF2-40B4-BE49-F238E27FC236}">
+                <a16:creationId xmlns:a16="http://schemas.microsoft.com/office/drawing/2014/main" id="{6AFA4A1C-670C-A769-0ADC-8958CEEEF089}"/>
+              </a:ext>
+            </a:extLst>
+          </p:cNvPr>
+          <p:cNvSpPr>
+            <a:spLocks noGrp="1"/>
+          </p:cNvSpPr>
+          <p:nvPr>
+            <p:ph type="ctrTitle"/>
+          </p:nvPr>
+        </p:nvSpPr>
+        <p:spPr/>
+        <p:txBody>
+          <a:bodyPr/>
+          <a:lstStyle/>
+          <a:p>
+            <a:r>
+              <a:rPr kumimoji="1" lang="en-US" altLang="ja-JP" dirty="0"/>
+              <a:t>Arduino IDE</a:t>
+            </a:r>
+            <a:r>
+              <a:rPr kumimoji="1" lang="ja-JP" altLang="en-US" dirty="0"/>
+              <a:t>の動作確認</a:t>
+            </a:r>
+          </a:p>
+        </p:txBody>
+      </p:sp>
+      <p:sp>
+        <p:nvSpPr>
+          <p:cNvPr id="3" name="字幕 2">
+            <a:extLst>
+              <a:ext uri="{FF2B5EF4-FFF2-40B4-BE49-F238E27FC236}">
+                <a16:creationId xmlns:a16="http://schemas.microsoft.com/office/drawing/2014/main" id="{3A790018-BD87-A217-9DB6-C4BA29B4D32F}"/>
+              </a:ext>
+            </a:extLst>
+          </p:cNvPr>
+          <p:cNvSpPr>
+            <a:spLocks noGrp="1"/>
+          </p:cNvSpPr>
+          <p:nvPr>
+            <p:ph type="subTitle" idx="1"/>
+          </p:nvPr>
+        </p:nvSpPr>
+        <p:spPr/>
+        <p:txBody>
+          <a:bodyPr/>
+          <a:lstStyle/>
+          <a:p>
+            <a:endParaRPr kumimoji="1" lang="ja-JP" altLang="en-US" dirty="0"/>
+          </a:p>
+        </p:txBody>
+      </p:sp>
+    </p:spTree>
+    <p:extLst>
+      <p:ext uri="{BB962C8B-B14F-4D97-AF65-F5344CB8AC3E}">
+        <p14:creationId xmlns:p14="http://schemas.microsoft.com/office/powerpoint/2010/main" val="2072131316"/>
+      </p:ext>
+    </p:extLst>
+  </p:cSld>
+  <p:clrMapOvr>
+    <a:masterClrMapping/>
+  </p:clrMapOvr>
+</p:sld>
+</file>
+
+<file path=ppt/slides/slide18.xml><?xml version="1.0" encoding="utf-8"?>
+<p:sld xmlns:a="http://schemas.openxmlformats.org/drawingml/2006/main" xmlns:r="http://schemas.openxmlformats.org/officeDocument/2006/relationships" xmlns:p="http://schemas.openxmlformats.org/presentationml/2006/main">
+  <p:cSld>
+    <p:spTree>
+      <p:nvGrpSpPr>
+        <p:cNvPr id="1" name=""/>
+        <p:cNvGrpSpPr/>
+        <p:nvPr/>
+      </p:nvGrpSpPr>
+      <p:grpSpPr>
+        <a:xfrm>
+          <a:off x="0" y="0"/>
+          <a:ext cx="0" cy="0"/>
+          <a:chOff x="0" y="0"/>
+          <a:chExt cx="0" cy="0"/>
+        </a:xfrm>
+      </p:grpSpPr>
+      <p:sp>
+        <p:nvSpPr>
+          <p:cNvPr id="2" name="タイトル 1">
+            <a:extLst>
+              <a:ext uri="{FF2B5EF4-FFF2-40B4-BE49-F238E27FC236}">
+                <a16:creationId xmlns:a16="http://schemas.microsoft.com/office/drawing/2014/main" id="{61FF8729-1BAE-D169-F1CA-18D88F3EDF58}"/>
+              </a:ext>
+            </a:extLst>
+          </p:cNvPr>
+          <p:cNvSpPr>
+            <a:spLocks noGrp="1"/>
+          </p:cNvSpPr>
+          <p:nvPr>
+            <p:ph type="title"/>
+          </p:nvPr>
+        </p:nvSpPr>
+        <p:spPr/>
+        <p:txBody>
+          <a:bodyPr/>
+          <a:lstStyle/>
+          <a:p>
+            <a:r>
+              <a:rPr kumimoji="1" lang="ja-JP" altLang="en-US" dirty="0"/>
+              <a:t>動作確認用プログラム</a:t>
+            </a:r>
+          </a:p>
+        </p:txBody>
+      </p:sp>
+      <p:pic>
+        <p:nvPicPr>
+          <p:cNvPr id="3" name="図 2">
+            <a:extLst>
+              <a:ext uri="{FF2B5EF4-FFF2-40B4-BE49-F238E27FC236}">
+                <a16:creationId xmlns:a16="http://schemas.microsoft.com/office/drawing/2014/main" id="{3B784F4C-8F1C-49B0-DBCB-C4FAE51B8169}"/>
+              </a:ext>
+            </a:extLst>
+          </p:cNvPr>
+          <p:cNvPicPr>
+            <a:picLocks noChangeAspect="1"/>
+          </p:cNvPicPr>
+          <p:nvPr/>
+        </p:nvPicPr>
+        <p:blipFill rotWithShape="1">
+          <a:blip r:embed="rId3"/>
+          <a:srcRect l="25417" r="10209" b="27777"/>
+          <a:stretch/>
+        </p:blipFill>
+        <p:spPr>
+          <a:xfrm>
+            <a:off x="77130" y="1064612"/>
+            <a:ext cx="5886450" cy="2600307"/>
+          </a:xfrm>
+          <a:prstGeom prst="rect">
+            <a:avLst/>
+          </a:prstGeom>
+        </p:spPr>
+      </p:pic>
+      <p:sp>
+        <p:nvSpPr>
+          <p:cNvPr id="4" name="吹き出し: 四角形 3">
+            <a:extLst>
+              <a:ext uri="{FF2B5EF4-FFF2-40B4-BE49-F238E27FC236}">
+                <a16:creationId xmlns:a16="http://schemas.microsoft.com/office/drawing/2014/main" id="{03A2862E-43C0-CA98-9A78-7915E6579113}"/>
+              </a:ext>
+            </a:extLst>
+          </p:cNvPr>
+          <p:cNvSpPr/>
+          <p:nvPr/>
+        </p:nvSpPr>
+        <p:spPr>
+          <a:xfrm>
+            <a:off x="1467143" y="1149130"/>
+            <a:ext cx="6119812" cy="3292077"/>
+          </a:xfrm>
+          <a:prstGeom prst="wedgeRectCallout">
+            <a:avLst>
+              <a:gd name="adj1" fmla="val -59445"/>
+              <a:gd name="adj2" fmla="val 19030"/>
+            </a:avLst>
+          </a:prstGeom>
+          <a:solidFill>
+            <a:srgbClr val="FFFFE5"/>
+          </a:solidFill>
+          <a:ln>
+            <a:solidFill>
+              <a:schemeClr val="bg1">
+                <a:lumMod val="75000"/>
+              </a:schemeClr>
+            </a:solidFill>
+          </a:ln>
+        </p:spPr>
+        <p:style>
+          <a:lnRef idx="2">
+            <a:schemeClr val="accent1">
+              <a:shade val="50000"/>
+            </a:schemeClr>
+          </a:lnRef>
+          <a:fillRef idx="1">
+            <a:schemeClr val="accent1"/>
+          </a:fillRef>
+          <a:effectRef idx="0">
+            <a:schemeClr val="accent1"/>
+          </a:effectRef>
+          <a:fontRef idx="minor">
+            <a:schemeClr val="lt1"/>
+          </a:fontRef>
+        </p:style>
+        <p:txBody>
+          <a:bodyPr rtlCol="0" anchor="ctr"/>
+          <a:lstStyle/>
+          <a:p>
+            <a:pPr algn="ctr"/>
+            <a:endParaRPr kumimoji="1" lang="ja-JP" altLang="en-US" dirty="0" err="1">
+              <a:solidFill>
+                <a:schemeClr val="tx1"/>
+              </a:solidFill>
+            </a:endParaRPr>
+          </a:p>
+        </p:txBody>
+      </p:sp>
+      <p:pic>
+        <p:nvPicPr>
+          <p:cNvPr id="5" name="図 4">
+            <a:extLst>
+              <a:ext uri="{FF2B5EF4-FFF2-40B4-BE49-F238E27FC236}">
+                <a16:creationId xmlns:a16="http://schemas.microsoft.com/office/drawing/2014/main" id="{7190D13C-ADAD-A477-55B4-CED0C3C7FEC3}"/>
+              </a:ext>
+            </a:extLst>
+          </p:cNvPr>
+          <p:cNvPicPr>
+            <a:picLocks noChangeAspect="1"/>
+          </p:cNvPicPr>
+          <p:nvPr/>
+        </p:nvPicPr>
+        <p:blipFill rotWithShape="1">
+          <a:blip r:embed="rId4"/>
+          <a:srcRect l="27396" t="1058" r="11041" b="25793"/>
+          <a:stretch/>
+        </p:blipFill>
+        <p:spPr>
+          <a:xfrm>
+            <a:off x="1724317" y="1655144"/>
+            <a:ext cx="5629276" cy="2633663"/>
+          </a:xfrm>
+          <a:prstGeom prst="rect">
+            <a:avLst/>
+          </a:prstGeom>
+        </p:spPr>
+      </p:pic>
+      <p:sp>
+        <p:nvSpPr>
+          <p:cNvPr id="6" name="吹き出し: 四角形 5">
+            <a:extLst>
+              <a:ext uri="{FF2B5EF4-FFF2-40B4-BE49-F238E27FC236}">
+                <a16:creationId xmlns:a16="http://schemas.microsoft.com/office/drawing/2014/main" id="{60AB7898-1E5E-CF1E-89AD-91322F740D9D}"/>
+              </a:ext>
+            </a:extLst>
+          </p:cNvPr>
+          <p:cNvSpPr/>
+          <p:nvPr/>
+        </p:nvSpPr>
+        <p:spPr>
+          <a:xfrm>
+            <a:off x="3383359" y="1626135"/>
+            <a:ext cx="4320277" cy="3193447"/>
+          </a:xfrm>
+          <a:prstGeom prst="wedgeRectCallout">
+            <a:avLst>
+              <a:gd name="adj1" fmla="val -63393"/>
+              <a:gd name="adj2" fmla="val 16661"/>
+            </a:avLst>
+          </a:prstGeom>
+          <a:solidFill>
+            <a:srgbClr val="FFFFE5"/>
+          </a:solidFill>
+          <a:ln>
+            <a:solidFill>
+              <a:schemeClr val="bg1">
+                <a:lumMod val="75000"/>
+              </a:schemeClr>
+            </a:solidFill>
+          </a:ln>
+        </p:spPr>
+        <p:style>
+          <a:lnRef idx="2">
+            <a:schemeClr val="accent1">
+              <a:shade val="50000"/>
+            </a:schemeClr>
+          </a:lnRef>
+          <a:fillRef idx="1">
+            <a:schemeClr val="accent1"/>
+          </a:fillRef>
+          <a:effectRef idx="0">
+            <a:schemeClr val="accent1"/>
+          </a:effectRef>
+          <a:fontRef idx="minor">
+            <a:schemeClr val="lt1"/>
+          </a:fontRef>
+        </p:style>
+        <p:txBody>
+          <a:bodyPr rtlCol="0" anchor="ctr"/>
+          <a:lstStyle/>
+          <a:p>
+            <a:pPr algn="ctr"/>
+            <a:endParaRPr kumimoji="1" lang="ja-JP" altLang="en-US" dirty="0" err="1">
+              <a:solidFill>
+                <a:schemeClr val="tx1"/>
+              </a:solidFill>
+            </a:endParaRPr>
+          </a:p>
+        </p:txBody>
+      </p:sp>
+      <p:sp>
+        <p:nvSpPr>
+          <p:cNvPr id="8" name="テキスト ボックス 7">
+            <a:extLst>
+              <a:ext uri="{FF2B5EF4-FFF2-40B4-BE49-F238E27FC236}">
+                <a16:creationId xmlns:a16="http://schemas.microsoft.com/office/drawing/2014/main" id="{1AD91DF7-BE4F-8C2B-8F5B-67CA67603833}"/>
+              </a:ext>
+            </a:extLst>
+          </p:cNvPr>
+          <p:cNvSpPr txBox="1"/>
+          <p:nvPr/>
+        </p:nvSpPr>
+        <p:spPr>
+          <a:xfrm>
+            <a:off x="94562" y="749089"/>
+            <a:ext cx="3185487" cy="369332"/>
+          </a:xfrm>
+          <a:prstGeom prst="rect">
+            <a:avLst/>
+          </a:prstGeom>
+          <a:noFill/>
+        </p:spPr>
+        <p:txBody>
+          <a:bodyPr wrap="none" rtlCol="0">
+            <a:spAutoFit/>
+          </a:bodyPr>
+          <a:lstStyle/>
+          <a:p>
+            <a:pPr algn="l"/>
+            <a:r>
+              <a:rPr kumimoji="1" lang="ja-JP" altLang="en-US" dirty="0"/>
+              <a:t>配布物のトップディレクトリ</a:t>
+            </a:r>
+          </a:p>
+        </p:txBody>
+      </p:sp>
+      <p:sp>
+        <p:nvSpPr>
+          <p:cNvPr id="9" name="テキスト ボックス 8">
+            <a:extLst>
+              <a:ext uri="{FF2B5EF4-FFF2-40B4-BE49-F238E27FC236}">
+                <a16:creationId xmlns:a16="http://schemas.microsoft.com/office/drawing/2014/main" id="{B9F7D747-66D4-1E0A-3C64-2DAC5400E443}"/>
+              </a:ext>
+            </a:extLst>
+          </p:cNvPr>
+          <p:cNvSpPr txBox="1"/>
+          <p:nvPr/>
+        </p:nvSpPr>
+        <p:spPr>
+          <a:xfrm>
+            <a:off x="1669864" y="1256803"/>
+            <a:ext cx="2440092" cy="369332"/>
+          </a:xfrm>
+          <a:prstGeom prst="rect">
+            <a:avLst/>
+          </a:prstGeom>
+          <a:noFill/>
+        </p:spPr>
+        <p:txBody>
+          <a:bodyPr wrap="none" rtlCol="0">
+            <a:spAutoFit/>
+          </a:bodyPr>
+          <a:lstStyle/>
+          <a:p>
+            <a:pPr algn="l"/>
+            <a:r>
+              <a:rPr kumimoji="1" lang="ja-JP" altLang="en-US" dirty="0"/>
+              <a:t>「</a:t>
+            </a:r>
+            <a:r>
+              <a:rPr kumimoji="1" lang="en-US" altLang="ja-JP" dirty="0"/>
+              <a:t>IDE</a:t>
+            </a:r>
+            <a:r>
+              <a:rPr kumimoji="1" lang="ja-JP" altLang="en-US" dirty="0"/>
+              <a:t>」ディレクトリ</a:t>
+            </a:r>
+          </a:p>
+        </p:txBody>
+      </p:sp>
+      <p:sp>
+        <p:nvSpPr>
+          <p:cNvPr id="10" name="テキスト ボックス 9">
+            <a:extLst>
+              <a:ext uri="{FF2B5EF4-FFF2-40B4-BE49-F238E27FC236}">
+                <a16:creationId xmlns:a16="http://schemas.microsoft.com/office/drawing/2014/main" id="{E2C701FE-B5FD-28AE-3474-00466ACA9B21}"/>
+              </a:ext>
+            </a:extLst>
+          </p:cNvPr>
+          <p:cNvSpPr txBox="1"/>
+          <p:nvPr/>
+        </p:nvSpPr>
+        <p:spPr>
+          <a:xfrm>
+            <a:off x="3528925" y="1643427"/>
+            <a:ext cx="4150495" cy="369332"/>
+          </a:xfrm>
+          <a:prstGeom prst="rect">
+            <a:avLst/>
+          </a:prstGeom>
+          <a:noFill/>
+        </p:spPr>
+        <p:txBody>
+          <a:bodyPr wrap="none" rtlCol="0">
+            <a:spAutoFit/>
+          </a:bodyPr>
+          <a:lstStyle/>
+          <a:p>
+            <a:pPr algn="l"/>
+            <a:r>
+              <a:rPr kumimoji="1" lang="ja-JP" altLang="en-US" dirty="0"/>
+              <a:t>「</a:t>
+            </a:r>
+            <a:r>
+              <a:rPr kumimoji="1" lang="en-US" altLang="ja-JP" dirty="0"/>
+              <a:t>IDE\Arduino</a:t>
+            </a:r>
+            <a:r>
+              <a:rPr kumimoji="1" lang="ja-JP" altLang="en-US" dirty="0"/>
+              <a:t>練習用」ディレクトリ</a:t>
+            </a:r>
+          </a:p>
+        </p:txBody>
+      </p:sp>
+      <p:pic>
+        <p:nvPicPr>
+          <p:cNvPr id="12" name="図 11">
+            <a:extLst>
+              <a:ext uri="{FF2B5EF4-FFF2-40B4-BE49-F238E27FC236}">
+                <a16:creationId xmlns:a16="http://schemas.microsoft.com/office/drawing/2014/main" id="{570B7011-5DAE-1780-9EB5-DA888DC70956}"/>
+              </a:ext>
+            </a:extLst>
+          </p:cNvPr>
+          <p:cNvPicPr>
+            <a:picLocks noChangeAspect="1"/>
+          </p:cNvPicPr>
+          <p:nvPr/>
+        </p:nvPicPr>
+        <p:blipFill rotWithShape="1">
+          <a:blip r:embed="rId5"/>
+          <a:srcRect l="29628" t="793" r="29949" b="26072"/>
+          <a:stretch/>
+        </p:blipFill>
+        <p:spPr>
+          <a:xfrm>
+            <a:off x="3583605" y="2128126"/>
+            <a:ext cx="3542818" cy="2313081"/>
+          </a:xfrm>
+          <a:prstGeom prst="rect">
+            <a:avLst/>
+          </a:prstGeom>
+        </p:spPr>
+      </p:pic>
+      <p:sp>
+        <p:nvSpPr>
+          <p:cNvPr id="13" name="吹き出し: 四角形 12">
+            <a:extLst>
+              <a:ext uri="{FF2B5EF4-FFF2-40B4-BE49-F238E27FC236}">
+                <a16:creationId xmlns:a16="http://schemas.microsoft.com/office/drawing/2014/main" id="{5E006F3F-AF0D-063F-F430-6EB74D370AE0}"/>
+              </a:ext>
+            </a:extLst>
+          </p:cNvPr>
+          <p:cNvSpPr/>
+          <p:nvPr/>
+        </p:nvSpPr>
+        <p:spPr>
+          <a:xfrm>
+            <a:off x="5108241" y="2276375"/>
+            <a:ext cx="3958629" cy="2455964"/>
+          </a:xfrm>
+          <a:prstGeom prst="wedgeRectCallout">
+            <a:avLst>
+              <a:gd name="adj1" fmla="val -61842"/>
+              <a:gd name="adj2" fmla="val 30755"/>
+            </a:avLst>
+          </a:prstGeom>
+          <a:solidFill>
+            <a:srgbClr val="FFFFE5"/>
+          </a:solidFill>
+          <a:ln>
+            <a:solidFill>
+              <a:schemeClr val="bg1">
+                <a:lumMod val="75000"/>
+              </a:schemeClr>
+            </a:solidFill>
+          </a:ln>
+        </p:spPr>
+        <p:style>
+          <a:lnRef idx="2">
+            <a:schemeClr val="accent1">
+              <a:shade val="50000"/>
+            </a:schemeClr>
+          </a:lnRef>
+          <a:fillRef idx="1">
+            <a:schemeClr val="accent1"/>
+          </a:fillRef>
+          <a:effectRef idx="0">
+            <a:schemeClr val="accent1"/>
+          </a:effectRef>
+          <a:fontRef idx="minor">
+            <a:schemeClr val="lt1"/>
+          </a:fontRef>
+        </p:style>
+        <p:txBody>
+          <a:bodyPr rtlCol="0" anchor="ctr"/>
+          <a:lstStyle/>
+          <a:p>
+            <a:pPr algn="ctr"/>
+            <a:endParaRPr kumimoji="1" lang="ja-JP" altLang="en-US" dirty="0" err="1">
+              <a:solidFill>
+                <a:schemeClr val="tx1"/>
+              </a:solidFill>
+            </a:endParaRPr>
+          </a:p>
+        </p:txBody>
+      </p:sp>
+      <p:pic>
+        <p:nvPicPr>
+          <p:cNvPr id="14" name="図 13">
+            <a:extLst>
+              <a:ext uri="{FF2B5EF4-FFF2-40B4-BE49-F238E27FC236}">
+                <a16:creationId xmlns:a16="http://schemas.microsoft.com/office/drawing/2014/main" id="{E20C8CA2-07FF-8AA0-9BDA-9CB54C014E8D}"/>
+              </a:ext>
+            </a:extLst>
+          </p:cNvPr>
+          <p:cNvPicPr>
+            <a:picLocks noChangeAspect="1"/>
+          </p:cNvPicPr>
+          <p:nvPr/>
+        </p:nvPicPr>
+        <p:blipFill rotWithShape="1">
+          <a:blip r:embed="rId6"/>
+          <a:srcRect l="30341" r="39567" b="17950"/>
+          <a:stretch/>
+        </p:blipFill>
+        <p:spPr>
+          <a:xfrm>
+            <a:off x="5543497" y="2902225"/>
+            <a:ext cx="1846131" cy="1816520"/>
+          </a:xfrm>
+          <a:prstGeom prst="rect">
+            <a:avLst/>
+          </a:prstGeom>
+        </p:spPr>
+      </p:pic>
+      <p:sp>
+        <p:nvSpPr>
+          <p:cNvPr id="15" name="テキスト ボックス 14">
+            <a:extLst>
+              <a:ext uri="{FF2B5EF4-FFF2-40B4-BE49-F238E27FC236}">
+                <a16:creationId xmlns:a16="http://schemas.microsoft.com/office/drawing/2014/main" id="{3CEC34C4-3ED6-8C30-341F-6F972DE1F819}"/>
+              </a:ext>
+            </a:extLst>
+          </p:cNvPr>
+          <p:cNvSpPr txBox="1"/>
+          <p:nvPr/>
+        </p:nvSpPr>
+        <p:spPr>
+          <a:xfrm>
+            <a:off x="5102512" y="2325644"/>
+            <a:ext cx="4121834" cy="646331"/>
+          </a:xfrm>
+          <a:prstGeom prst="rect">
+            <a:avLst/>
+          </a:prstGeom>
+          <a:noFill/>
+        </p:spPr>
+        <p:txBody>
+          <a:bodyPr wrap="none" rtlCol="0">
+            <a:spAutoFit/>
+          </a:bodyPr>
+          <a:lstStyle/>
+          <a:p>
+            <a:pPr algn="l"/>
+            <a:r>
+              <a:rPr kumimoji="1" lang="ja-JP" altLang="en-US" dirty="0"/>
+              <a:t>「</a:t>
+            </a:r>
+            <a:r>
+              <a:rPr kumimoji="1" lang="en-US" altLang="ja-JP" dirty="0"/>
+              <a:t>IDE\Arduino</a:t>
+            </a:r>
+            <a:r>
+              <a:rPr kumimoji="1" lang="ja-JP" altLang="en-US" dirty="0"/>
+              <a:t>練習用</a:t>
+            </a:r>
+            <a:r>
+              <a:rPr kumimoji="1" lang="en-US" altLang="ja-JP" dirty="0"/>
+              <a:t>\HelloWorld</a:t>
+            </a:r>
+            <a:r>
+              <a:rPr kumimoji="1" lang="ja-JP" altLang="en-US" dirty="0"/>
+              <a:t>」</a:t>
+            </a:r>
+            <a:endParaRPr kumimoji="1" lang="en-US" altLang="ja-JP" dirty="0"/>
+          </a:p>
+          <a:p>
+            <a:pPr algn="l"/>
+            <a:r>
+              <a:rPr kumimoji="1" lang="ja-JP" altLang="en-US" dirty="0"/>
+              <a:t>   ディレクトリ</a:t>
+            </a:r>
+          </a:p>
+        </p:txBody>
+      </p:sp>
+    </p:spTree>
+    <p:extLst>
+      <p:ext uri="{BB962C8B-B14F-4D97-AF65-F5344CB8AC3E}">
+        <p14:creationId xmlns:p14="http://schemas.microsoft.com/office/powerpoint/2010/main" val="3592530665"/>
+      </p:ext>
+    </p:extLst>
+  </p:cSld>
+  <p:clrMapOvr>
+    <a:masterClrMapping/>
+  </p:clrMapOvr>
+</p:sld>
+</file>
+
+<file path=ppt/slides/slide19.xml><?xml version="1.0" encoding="utf-8"?>
+<p:sld xmlns:a="http://schemas.openxmlformats.org/drawingml/2006/main" xmlns:r="http://schemas.openxmlformats.org/officeDocument/2006/relationships" xmlns:p="http://schemas.openxmlformats.org/presentationml/2006/main">
+  <p:cSld>
+    <p:spTree>
+      <p:nvGrpSpPr>
+        <p:cNvPr id="1" name=""/>
+        <p:cNvGrpSpPr/>
+        <p:nvPr/>
+      </p:nvGrpSpPr>
+      <p:grpSpPr>
+        <a:xfrm>
+          <a:off x="0" y="0"/>
+          <a:ext cx="0" cy="0"/>
+          <a:chOff x="0" y="0"/>
+          <a:chExt cx="0" cy="0"/>
+        </a:xfrm>
+      </p:grpSpPr>
+      <p:sp>
+        <p:nvSpPr>
+          <p:cNvPr id="2" name="タイトル 1">
+            <a:extLst>
+              <a:ext uri="{FF2B5EF4-FFF2-40B4-BE49-F238E27FC236}">
+                <a16:creationId xmlns:a16="http://schemas.microsoft.com/office/drawing/2014/main" id="{1EF8D01E-4A1A-836B-34E0-C61FAFEB768C}"/>
+              </a:ext>
+            </a:extLst>
+          </p:cNvPr>
+          <p:cNvSpPr>
+            <a:spLocks noGrp="1"/>
+          </p:cNvSpPr>
+          <p:nvPr>
+            <p:ph type="title"/>
+          </p:nvPr>
+        </p:nvSpPr>
+        <p:spPr/>
+        <p:txBody>
+          <a:bodyPr/>
+          <a:lstStyle/>
+          <a:p>
+            <a:r>
+              <a:rPr kumimoji="1" lang="en-US" altLang="ja-JP" dirty="0"/>
+              <a:t>Arduino IDE</a:t>
+            </a:r>
+            <a:r>
               <a:rPr kumimoji="1" lang="ja-JP" altLang="en-US" dirty="0"/>
               <a:t>の動作確認</a:t>
             </a:r>
@@ -14367,7 +16733,7 @@
     </p:spTree>
     <p:extLst>
       <p:ext uri="{BB962C8B-B14F-4D97-AF65-F5344CB8AC3E}">
-        <p14:creationId xmlns:p14="http://schemas.microsoft.com/office/powerpoint/2010/main" val="2136661841"/>
+        <p14:creationId xmlns:p14="http://schemas.microsoft.com/office/powerpoint/2010/main" val="994112391"/>
       </p:ext>
     </p:extLst>
   </p:cSld>
@@ -14377,7 +16743,95 @@
 </p:sld>
 </file>
 
-<file path=ppt/slides/slide13.xml><?xml version="1.0" encoding="utf-8"?>
+<file path=ppt/slides/slide2.xml><?xml version="1.0" encoding="utf-8"?>
+<p:sld xmlns:a="http://schemas.openxmlformats.org/drawingml/2006/main" xmlns:r="http://schemas.openxmlformats.org/officeDocument/2006/relationships" xmlns:p="http://schemas.openxmlformats.org/presentationml/2006/main">
+  <p:cSld>
+    <p:spTree>
+      <p:nvGrpSpPr>
+        <p:cNvPr id="1" name=""/>
+        <p:cNvGrpSpPr/>
+        <p:nvPr/>
+      </p:nvGrpSpPr>
+      <p:grpSpPr>
+        <a:xfrm>
+          <a:off x="0" y="0"/>
+          <a:ext cx="0" cy="0"/>
+          <a:chOff x="0" y="0"/>
+          <a:chExt cx="0" cy="0"/>
+        </a:xfrm>
+      </p:grpSpPr>
+      <p:sp>
+        <p:nvSpPr>
+          <p:cNvPr id="2" name="タイトル 1">
+            <a:extLst>
+              <a:ext uri="{FF2B5EF4-FFF2-40B4-BE49-F238E27FC236}">
+                <a16:creationId xmlns:a16="http://schemas.microsoft.com/office/drawing/2014/main" id="{B6BE0B27-245E-F2EE-C741-9A8220CFCD52}"/>
+              </a:ext>
+            </a:extLst>
+          </p:cNvPr>
+          <p:cNvSpPr>
+            <a:spLocks noGrp="1"/>
+          </p:cNvSpPr>
+          <p:nvPr>
+            <p:ph type="ctrTitle"/>
+          </p:nvPr>
+        </p:nvSpPr>
+        <p:spPr/>
+        <p:txBody>
+          <a:bodyPr/>
+          <a:lstStyle/>
+          <a:p>
+            <a:r>
+              <a:rPr kumimoji="1" lang="ja-JP" altLang="en-US"/>
+              <a:t>マークダウン</a:t>
+            </a:r>
+            <a:r>
+              <a:rPr lang="ja-JP" altLang="en-US"/>
+              <a:t>が見られることの確認</a:t>
+            </a:r>
+            <a:endParaRPr kumimoji="1" lang="ja-JP" altLang="en-US" dirty="0"/>
+          </a:p>
+        </p:txBody>
+      </p:sp>
+      <p:sp>
+        <p:nvSpPr>
+          <p:cNvPr id="3" name="字幕 2">
+            <a:extLst>
+              <a:ext uri="{FF2B5EF4-FFF2-40B4-BE49-F238E27FC236}">
+                <a16:creationId xmlns:a16="http://schemas.microsoft.com/office/drawing/2014/main" id="{3483BDB9-E4E1-E382-0FBA-071C907F950B}"/>
+              </a:ext>
+            </a:extLst>
+          </p:cNvPr>
+          <p:cNvSpPr>
+            <a:spLocks noGrp="1"/>
+          </p:cNvSpPr>
+          <p:nvPr>
+            <p:ph type="subTitle" idx="1"/>
+          </p:nvPr>
+        </p:nvSpPr>
+        <p:spPr/>
+        <p:txBody>
+          <a:bodyPr/>
+          <a:lstStyle/>
+          <a:p>
+            <a:endParaRPr kumimoji="1" lang="ja-JP" altLang="en-US" dirty="0"/>
+          </a:p>
+        </p:txBody>
+      </p:sp>
+    </p:spTree>
+    <p:extLst>
+      <p:ext uri="{BB962C8B-B14F-4D97-AF65-F5344CB8AC3E}">
+        <p14:creationId xmlns:p14="http://schemas.microsoft.com/office/powerpoint/2010/main" val="631608752"/>
+      </p:ext>
+    </p:extLst>
+  </p:cSld>
+  <p:clrMapOvr>
+    <a:masterClrMapping/>
+  </p:clrMapOvr>
+</p:sld>
+</file>
+
+<file path=ppt/slides/slide20.xml><?xml version="1.0" encoding="utf-8"?>
 <p:sld xmlns:a="http://schemas.openxmlformats.org/drawingml/2006/main" xmlns:r="http://schemas.openxmlformats.org/officeDocument/2006/relationships" xmlns:p="http://schemas.openxmlformats.org/presentationml/2006/main">
   <p:cSld>
     <p:spTree>
@@ -14517,12 +16971,36 @@
           <a:p>
             <a:pPr algn="ctr"/>
             <a:r>
+              <a:rPr kumimoji="1" lang="en-US" altLang="ja-JP" dirty="0">
+                <a:solidFill>
+                  <a:schemeClr val="tx1"/>
+                </a:solidFill>
+              </a:rPr>
+              <a:t>USB</a:t>
+            </a:r>
+            <a:r>
               <a:rPr kumimoji="1" lang="ja-JP" altLang="en-US" dirty="0">
                 <a:solidFill>
                   <a:schemeClr val="tx1"/>
                 </a:solidFill>
               </a:rPr>
-              <a:t>対象機種を選択</a:t>
+              <a:t>で接続している</a:t>
+            </a:r>
+            <a:endParaRPr kumimoji="1" lang="en-US" altLang="ja-JP" dirty="0">
+              <a:solidFill>
+                <a:schemeClr val="tx1"/>
+              </a:solidFill>
+            </a:endParaRPr>
+          </a:p>
+          <a:p>
+            <a:pPr algn="ctr"/>
+            <a:r>
+              <a:rPr kumimoji="1" lang="ja-JP" altLang="en-US" dirty="0">
+                <a:solidFill>
+                  <a:schemeClr val="tx1"/>
+                </a:solidFill>
+              </a:rPr>
+              <a:t>機種名が出るので選択</a:t>
             </a:r>
           </a:p>
         </p:txBody>
@@ -14540,7 +17018,7 @@
 </p:sld>
 </file>
 
-<file path=ppt/slides/slide14.xml><?xml version="1.0" encoding="utf-8"?>
+<file path=ppt/slides/slide21.xml><?xml version="1.0" encoding="utf-8"?>
 <p:sld xmlns:a="http://schemas.openxmlformats.org/drawingml/2006/main" xmlns:r="http://schemas.openxmlformats.org/officeDocument/2006/relationships" xmlns:p="http://schemas.openxmlformats.org/presentationml/2006/main">
   <p:cSld>
     <p:spTree>
@@ -14703,7 +17181,7 @@
 </p:sld>
 </file>
 
-<file path=ppt/slides/slide15.xml><?xml version="1.0" encoding="utf-8"?>
+<file path=ppt/slides/slide22.xml><?xml version="1.0" encoding="utf-8"?>
 <p:sld xmlns:a="http://schemas.openxmlformats.org/drawingml/2006/main" xmlns:r="http://schemas.openxmlformats.org/officeDocument/2006/relationships" xmlns:p="http://schemas.openxmlformats.org/presentationml/2006/main">
   <p:cSld>
     <p:spTree>
@@ -14828,7 +17306,7 @@
 </p:sld>
 </file>
 
-<file path=ppt/slides/slide16.xml><?xml version="1.0" encoding="utf-8"?>
+<file path=ppt/slides/slide23.xml><?xml version="1.0" encoding="utf-8"?>
 <p:sld xmlns:a="http://schemas.openxmlformats.org/drawingml/2006/main" xmlns:r="http://schemas.openxmlformats.org/officeDocument/2006/relationships" xmlns:p="http://schemas.openxmlformats.org/presentationml/2006/main">
   <p:cSld>
     <p:spTree>
@@ -14958,7 +17436,7 @@
 </p:sld>
 </file>
 
-<file path=ppt/slides/slide17.xml><?xml version="1.0" encoding="utf-8"?>
+<file path=ppt/slides/slide24.xml><?xml version="1.0" encoding="utf-8"?>
 <p:sld xmlns:a="http://schemas.openxmlformats.org/drawingml/2006/main" xmlns:r="http://schemas.openxmlformats.org/officeDocument/2006/relationships" xmlns:p="http://schemas.openxmlformats.org/presentationml/2006/main">
   <p:cSld>
     <p:spTree>
@@ -15187,7 +17665,7 @@
 </p:sld>
 </file>
 
-<file path=ppt/slides/slide18.xml><?xml version="1.0" encoding="utf-8"?>
+<file path=ppt/slides/slide25.xml><?xml version="1.0" encoding="utf-8"?>
 <p:sld xmlns:a="http://schemas.openxmlformats.org/drawingml/2006/main" xmlns:r="http://schemas.openxmlformats.org/officeDocument/2006/relationships" xmlns:p="http://schemas.openxmlformats.org/presentationml/2006/main">
   <p:cSld>
     <p:spTree>
@@ -15387,7 +17865,7 @@
 </p:sld>
 </file>
 
-<file path=ppt/slides/slide19.xml><?xml version="1.0" encoding="utf-8"?>
+<file path=ppt/slides/slide26.xml><?xml version="1.0" encoding="utf-8"?>
 <p:sld xmlns:a="http://schemas.openxmlformats.org/drawingml/2006/main" xmlns:r="http://schemas.openxmlformats.org/officeDocument/2006/relationships" xmlns:p="http://schemas.openxmlformats.org/presentationml/2006/main">
   <p:cSld>
     <p:spTree>
@@ -15490,95 +17968,7 @@
 </p:sld>
 </file>
 
-<file path=ppt/slides/slide2.xml><?xml version="1.0" encoding="utf-8"?>
-<p:sld xmlns:a="http://schemas.openxmlformats.org/drawingml/2006/main" xmlns:r="http://schemas.openxmlformats.org/officeDocument/2006/relationships" xmlns:p="http://schemas.openxmlformats.org/presentationml/2006/main">
-  <p:cSld>
-    <p:spTree>
-      <p:nvGrpSpPr>
-        <p:cNvPr id="1" name=""/>
-        <p:cNvGrpSpPr/>
-        <p:nvPr/>
-      </p:nvGrpSpPr>
-      <p:grpSpPr>
-        <a:xfrm>
-          <a:off x="0" y="0"/>
-          <a:ext cx="0" cy="0"/>
-          <a:chOff x="0" y="0"/>
-          <a:chExt cx="0" cy="0"/>
-        </a:xfrm>
-      </p:grpSpPr>
-      <p:sp>
-        <p:nvSpPr>
-          <p:cNvPr id="2" name="タイトル 1">
-            <a:extLst>
-              <a:ext uri="{FF2B5EF4-FFF2-40B4-BE49-F238E27FC236}">
-                <a16:creationId xmlns:a16="http://schemas.microsoft.com/office/drawing/2014/main" id="{B6BE0B27-245E-F2EE-C741-9A8220CFCD52}"/>
-              </a:ext>
-            </a:extLst>
-          </p:cNvPr>
-          <p:cNvSpPr>
-            <a:spLocks noGrp="1"/>
-          </p:cNvSpPr>
-          <p:nvPr>
-            <p:ph type="ctrTitle"/>
-          </p:nvPr>
-        </p:nvSpPr>
-        <p:spPr/>
-        <p:txBody>
-          <a:bodyPr/>
-          <a:lstStyle/>
-          <a:p>
-            <a:r>
-              <a:rPr kumimoji="1" lang="ja-JP" altLang="en-US"/>
-              <a:t>マークダウン</a:t>
-            </a:r>
-            <a:r>
-              <a:rPr lang="ja-JP" altLang="en-US"/>
-              <a:t>が見られることの確認</a:t>
-            </a:r>
-            <a:endParaRPr kumimoji="1" lang="ja-JP" altLang="en-US" dirty="0"/>
-          </a:p>
-        </p:txBody>
-      </p:sp>
-      <p:sp>
-        <p:nvSpPr>
-          <p:cNvPr id="3" name="字幕 2">
-            <a:extLst>
-              <a:ext uri="{FF2B5EF4-FFF2-40B4-BE49-F238E27FC236}">
-                <a16:creationId xmlns:a16="http://schemas.microsoft.com/office/drawing/2014/main" id="{3483BDB9-E4E1-E382-0FBA-071C907F950B}"/>
-              </a:ext>
-            </a:extLst>
-          </p:cNvPr>
-          <p:cNvSpPr>
-            <a:spLocks noGrp="1"/>
-          </p:cNvSpPr>
-          <p:nvPr>
-            <p:ph type="subTitle" idx="1"/>
-          </p:nvPr>
-        </p:nvSpPr>
-        <p:spPr/>
-        <p:txBody>
-          <a:bodyPr/>
-          <a:lstStyle/>
-          <a:p>
-            <a:endParaRPr kumimoji="1" lang="ja-JP" altLang="en-US" dirty="0"/>
-          </a:p>
-        </p:txBody>
-      </p:sp>
-    </p:spTree>
-    <p:extLst>
-      <p:ext uri="{BB962C8B-B14F-4D97-AF65-F5344CB8AC3E}">
-        <p14:creationId xmlns:p14="http://schemas.microsoft.com/office/powerpoint/2010/main" val="631608752"/>
-      </p:ext>
-    </p:extLst>
-  </p:cSld>
-  <p:clrMapOvr>
-    <a:masterClrMapping/>
-  </p:clrMapOvr>
-</p:sld>
-</file>
-
-<file path=ppt/slides/slide20.xml><?xml version="1.0" encoding="utf-8"?>
+<file path=ppt/slides/slide27.xml><?xml version="1.0" encoding="utf-8"?>
 <p:sld xmlns:a="http://schemas.openxmlformats.org/drawingml/2006/main" xmlns:r="http://schemas.openxmlformats.org/officeDocument/2006/relationships" xmlns:p="http://schemas.openxmlformats.org/presentationml/2006/main">
   <p:cSld>
     <p:spTree>
@@ -15882,7 +18272,7 @@
 </p:sld>
 </file>
 
-<file path=ppt/slides/slide21.xml><?xml version="1.0" encoding="utf-8"?>
+<file path=ppt/slides/slide28.xml><?xml version="1.0" encoding="utf-8"?>
 <p:sld xmlns:a="http://schemas.openxmlformats.org/drawingml/2006/main" xmlns:r="http://schemas.openxmlformats.org/officeDocument/2006/relationships" xmlns:p="http://schemas.openxmlformats.org/presentationml/2006/main">
   <p:cSld>
     <p:spTree>
@@ -16196,7 +18586,7 @@
 </p:sld>
 </file>
 
-<file path=ppt/slides/slide22.xml><?xml version="1.0" encoding="utf-8"?>
+<file path=ppt/slides/slide29.xml><?xml version="1.0" encoding="utf-8"?>
 <p:sld xmlns:a="http://schemas.openxmlformats.org/drawingml/2006/main" xmlns:r="http://schemas.openxmlformats.org/officeDocument/2006/relationships" xmlns:p="http://schemas.openxmlformats.org/presentationml/2006/main">
   <p:cSld>
     <p:spTree>
@@ -16341,7 +18731,330 @@
 </p:sld>
 </file>
 
-<file path=ppt/slides/slide23.xml><?xml version="1.0" encoding="utf-8"?>
+<file path=ppt/slides/slide3.xml><?xml version="1.0" encoding="utf-8"?>
+<p:sld xmlns:a="http://schemas.openxmlformats.org/drawingml/2006/main" xmlns:r="http://schemas.openxmlformats.org/officeDocument/2006/relationships" xmlns:p="http://schemas.openxmlformats.org/presentationml/2006/main">
+  <p:cSld>
+    <p:spTree>
+      <p:nvGrpSpPr>
+        <p:cNvPr id="1" name=""/>
+        <p:cNvGrpSpPr/>
+        <p:nvPr/>
+      </p:nvGrpSpPr>
+      <p:grpSpPr>
+        <a:xfrm>
+          <a:off x="0" y="0"/>
+          <a:ext cx="0" cy="0"/>
+          <a:chOff x="0" y="0"/>
+          <a:chExt cx="0" cy="0"/>
+        </a:xfrm>
+      </p:grpSpPr>
+      <p:sp>
+        <p:nvSpPr>
+          <p:cNvPr id="2" name="タイトル 1">
+            <a:extLst>
+              <a:ext uri="{FF2B5EF4-FFF2-40B4-BE49-F238E27FC236}">
+                <a16:creationId xmlns:a16="http://schemas.microsoft.com/office/drawing/2014/main" id="{78E60858-9E00-1E44-A524-75B63E98EEF7}"/>
+              </a:ext>
+            </a:extLst>
+          </p:cNvPr>
+          <p:cNvSpPr>
+            <a:spLocks noGrp="1"/>
+          </p:cNvSpPr>
+          <p:nvPr>
+            <p:ph type="title"/>
+          </p:nvPr>
+        </p:nvSpPr>
+        <p:spPr/>
+        <p:txBody>
+          <a:bodyPr/>
+          <a:lstStyle/>
+          <a:p>
+            <a:r>
+              <a:rPr kumimoji="1" lang="ja-JP" altLang="en-US" dirty="0"/>
+              <a:t>マニュアルの場所</a:t>
+            </a:r>
+          </a:p>
+        </p:txBody>
+      </p:sp>
+      <p:pic>
+        <p:nvPicPr>
+          <p:cNvPr id="4" name="図 3">
+            <a:extLst>
+              <a:ext uri="{FF2B5EF4-FFF2-40B4-BE49-F238E27FC236}">
+                <a16:creationId xmlns:a16="http://schemas.microsoft.com/office/drawing/2014/main" id="{AEEFD9F2-5E54-E7F9-DB26-4965969CDA62}"/>
+              </a:ext>
+            </a:extLst>
+          </p:cNvPr>
+          <p:cNvPicPr>
+            <a:picLocks noChangeAspect="1"/>
+          </p:cNvPicPr>
+          <p:nvPr/>
+        </p:nvPicPr>
+        <p:blipFill>
+          <a:blip r:embed="rId3"/>
+          <a:stretch>
+            <a:fillRect/>
+          </a:stretch>
+        </p:blipFill>
+        <p:spPr>
+          <a:xfrm>
+            <a:off x="43313" y="1088966"/>
+            <a:ext cx="5740376" cy="2188007"/>
+          </a:xfrm>
+          <a:prstGeom prst="rect">
+            <a:avLst/>
+          </a:prstGeom>
+        </p:spPr>
+      </p:pic>
+      <p:sp>
+        <p:nvSpPr>
+          <p:cNvPr id="7" name="吹き出し: 四角形 6">
+            <a:extLst>
+              <a:ext uri="{FF2B5EF4-FFF2-40B4-BE49-F238E27FC236}">
+                <a16:creationId xmlns:a16="http://schemas.microsoft.com/office/drawing/2014/main" id="{D513BE56-A44A-E948-F8C3-58CE0642DBB9}"/>
+              </a:ext>
+            </a:extLst>
+          </p:cNvPr>
+          <p:cNvSpPr/>
+          <p:nvPr/>
+        </p:nvSpPr>
+        <p:spPr>
+          <a:xfrm>
+            <a:off x="2460985" y="1530417"/>
+            <a:ext cx="6607744" cy="3229910"/>
+          </a:xfrm>
+          <a:prstGeom prst="wedgeRectCallout">
+            <a:avLst>
+              <a:gd name="adj1" fmla="val -55356"/>
+              <a:gd name="adj2" fmla="val -31878"/>
+            </a:avLst>
+          </a:prstGeom>
+          <a:solidFill>
+            <a:srgbClr val="FFFFE5"/>
+          </a:solidFill>
+          <a:ln>
+            <a:solidFill>
+              <a:schemeClr val="bg1">
+                <a:lumMod val="75000"/>
+              </a:schemeClr>
+            </a:solidFill>
+          </a:ln>
+        </p:spPr>
+        <p:style>
+          <a:lnRef idx="2">
+            <a:schemeClr val="accent1">
+              <a:shade val="50000"/>
+            </a:schemeClr>
+          </a:lnRef>
+          <a:fillRef idx="1">
+            <a:schemeClr val="accent1"/>
+          </a:fillRef>
+          <a:effectRef idx="0">
+            <a:schemeClr val="accent1"/>
+          </a:effectRef>
+          <a:fontRef idx="minor">
+            <a:schemeClr val="lt1"/>
+          </a:fontRef>
+        </p:style>
+        <p:txBody>
+          <a:bodyPr rtlCol="0" anchor="ctr"/>
+          <a:lstStyle/>
+          <a:p>
+            <a:pPr algn="ctr"/>
+            <a:endParaRPr kumimoji="1" lang="ja-JP" altLang="en-US" dirty="0" err="1">
+              <a:solidFill>
+                <a:schemeClr val="tx1"/>
+              </a:solidFill>
+            </a:endParaRPr>
+          </a:p>
+        </p:txBody>
+      </p:sp>
+      <p:pic>
+        <p:nvPicPr>
+          <p:cNvPr id="6" name="図 5">
+            <a:extLst>
+              <a:ext uri="{FF2B5EF4-FFF2-40B4-BE49-F238E27FC236}">
+                <a16:creationId xmlns:a16="http://schemas.microsoft.com/office/drawing/2014/main" id="{CB3E1409-76C9-C536-0823-2D5CCB7B1A32}"/>
+              </a:ext>
+            </a:extLst>
+          </p:cNvPr>
+          <p:cNvPicPr>
+            <a:picLocks noChangeAspect="1"/>
+          </p:cNvPicPr>
+          <p:nvPr/>
+        </p:nvPicPr>
+        <p:blipFill>
+          <a:blip r:embed="rId4"/>
+          <a:stretch>
+            <a:fillRect/>
+          </a:stretch>
+        </p:blipFill>
+        <p:spPr>
+          <a:xfrm>
+            <a:off x="2641602" y="1963787"/>
+            <a:ext cx="6246510" cy="2646986"/>
+          </a:xfrm>
+          <a:prstGeom prst="rect">
+            <a:avLst/>
+          </a:prstGeom>
+        </p:spPr>
+      </p:pic>
+      <p:sp>
+        <p:nvSpPr>
+          <p:cNvPr id="8" name="テキスト ボックス 7">
+            <a:extLst>
+              <a:ext uri="{FF2B5EF4-FFF2-40B4-BE49-F238E27FC236}">
+                <a16:creationId xmlns:a16="http://schemas.microsoft.com/office/drawing/2014/main" id="{8511C636-99EA-0808-ADA3-1358C3CF8519}"/>
+              </a:ext>
+            </a:extLst>
+          </p:cNvPr>
+          <p:cNvSpPr txBox="1"/>
+          <p:nvPr/>
+        </p:nvSpPr>
+        <p:spPr>
+          <a:xfrm>
+            <a:off x="124667" y="733699"/>
+            <a:ext cx="3185487" cy="369332"/>
+          </a:xfrm>
+          <a:prstGeom prst="rect">
+            <a:avLst/>
+          </a:prstGeom>
+          <a:noFill/>
+        </p:spPr>
+        <p:txBody>
+          <a:bodyPr wrap="none" rtlCol="0">
+            <a:spAutoFit/>
+          </a:bodyPr>
+          <a:lstStyle/>
+          <a:p>
+            <a:pPr algn="l"/>
+            <a:r>
+              <a:rPr kumimoji="1" lang="ja-JP" altLang="en-US" dirty="0"/>
+              <a:t>配布物のトップディレクトリ</a:t>
+            </a:r>
+          </a:p>
+        </p:txBody>
+      </p:sp>
+      <p:sp>
+        <p:nvSpPr>
+          <p:cNvPr id="9" name="テキスト ボックス 8">
+            <a:extLst>
+              <a:ext uri="{FF2B5EF4-FFF2-40B4-BE49-F238E27FC236}">
+                <a16:creationId xmlns:a16="http://schemas.microsoft.com/office/drawing/2014/main" id="{5DCBC0E9-A3F7-02FA-E96C-894F183EDA23}"/>
+              </a:ext>
+            </a:extLst>
+          </p:cNvPr>
+          <p:cNvSpPr txBox="1"/>
+          <p:nvPr/>
+        </p:nvSpPr>
+        <p:spPr>
+          <a:xfrm>
+            <a:off x="3068393" y="1594455"/>
+            <a:ext cx="3658374" cy="369332"/>
+          </a:xfrm>
+          <a:prstGeom prst="rect">
+            <a:avLst/>
+          </a:prstGeom>
+          <a:noFill/>
+        </p:spPr>
+        <p:txBody>
+          <a:bodyPr wrap="none" rtlCol="0">
+            <a:spAutoFit/>
+          </a:bodyPr>
+          <a:lstStyle/>
+          <a:p>
+            <a:pPr algn="l"/>
+            <a:r>
+              <a:rPr kumimoji="1" lang="en-US" altLang="ja-JP" dirty="0" err="1"/>
+              <a:t>ArduinoSensorGen</a:t>
+            </a:r>
+            <a:r>
+              <a:rPr kumimoji="1" lang="ja-JP" altLang="en-US" dirty="0"/>
+              <a:t>ディレクトリ</a:t>
+            </a:r>
+          </a:p>
+        </p:txBody>
+      </p:sp>
+      <p:sp>
+        <p:nvSpPr>
+          <p:cNvPr id="10" name="吹き出し: 四角形 9">
+            <a:extLst>
+              <a:ext uri="{FF2B5EF4-FFF2-40B4-BE49-F238E27FC236}">
+                <a16:creationId xmlns:a16="http://schemas.microsoft.com/office/drawing/2014/main" id="{F0B30F1E-A422-2A40-F92A-205006BF5AD6}"/>
+              </a:ext>
+            </a:extLst>
+          </p:cNvPr>
+          <p:cNvSpPr/>
+          <p:nvPr/>
+        </p:nvSpPr>
+        <p:spPr>
+          <a:xfrm>
+            <a:off x="4653814" y="2842969"/>
+            <a:ext cx="1525605" cy="789271"/>
+          </a:xfrm>
+          <a:prstGeom prst="wedgeRectCallout">
+            <a:avLst>
+              <a:gd name="adj1" fmla="val -64366"/>
+              <a:gd name="adj2" fmla="val -32622"/>
+            </a:avLst>
+          </a:prstGeom>
+          <a:solidFill>
+            <a:srgbClr val="FFFFE5"/>
+          </a:solidFill>
+          <a:ln>
+            <a:solidFill>
+              <a:schemeClr val="bg1">
+                <a:lumMod val="75000"/>
+              </a:schemeClr>
+            </a:solidFill>
+          </a:ln>
+        </p:spPr>
+        <p:style>
+          <a:lnRef idx="2">
+            <a:schemeClr val="accent1">
+              <a:shade val="50000"/>
+            </a:schemeClr>
+          </a:lnRef>
+          <a:fillRef idx="1">
+            <a:schemeClr val="accent1"/>
+          </a:fillRef>
+          <a:effectRef idx="0">
+            <a:schemeClr val="accent1"/>
+          </a:effectRef>
+          <a:fontRef idx="minor">
+            <a:schemeClr val="lt1"/>
+          </a:fontRef>
+        </p:style>
+        <p:txBody>
+          <a:bodyPr rtlCol="0" anchor="ctr"/>
+          <a:lstStyle/>
+          <a:p>
+            <a:pPr algn="ctr"/>
+            <a:r>
+              <a:rPr kumimoji="1" lang="ja-JP" altLang="en-US" dirty="0">
+                <a:solidFill>
+                  <a:srgbClr val="FF0000"/>
+                </a:solidFill>
+              </a:rPr>
+              <a:t>マニュアル</a:t>
+            </a:r>
+          </a:p>
+        </p:txBody>
+      </p:sp>
+    </p:spTree>
+    <p:extLst>
+      <p:ext uri="{BB962C8B-B14F-4D97-AF65-F5344CB8AC3E}">
+        <p14:creationId xmlns:p14="http://schemas.microsoft.com/office/powerpoint/2010/main" val="457751850"/>
+      </p:ext>
+    </p:extLst>
+  </p:cSld>
+  <p:clrMapOvr>
+    <a:masterClrMapping/>
+  </p:clrMapOvr>
+</p:sld>
+</file>
+
+<file path=ppt/slides/slide30.xml><?xml version="1.0" encoding="utf-8"?>
 <p:sld xmlns:a="http://schemas.openxmlformats.org/drawingml/2006/main" xmlns:r="http://schemas.openxmlformats.org/officeDocument/2006/relationships" xmlns:p="http://schemas.openxmlformats.org/presentationml/2006/main">
   <p:cSld>
     <p:spTree>
@@ -16460,7 +19173,7 @@
 </p:sld>
 </file>
 
-<file path=ppt/slides/slide24.xml><?xml version="1.0" encoding="utf-8"?>
+<file path=ppt/slides/slide31.xml><?xml version="1.0" encoding="utf-8"?>
 <p:sld xmlns:a="http://schemas.openxmlformats.org/drawingml/2006/main" xmlns:r="http://schemas.openxmlformats.org/officeDocument/2006/relationships" xmlns:p="http://schemas.openxmlformats.org/presentationml/2006/main">
   <p:cSld>
     <p:spTree>
@@ -16896,7 +19609,7 @@
 </p:sld>
 </file>
 
-<file path=ppt/slides/slide25.xml><?xml version="1.0" encoding="utf-8"?>
+<file path=ppt/slides/slide32.xml><?xml version="1.0" encoding="utf-8"?>
 <p:sld xmlns:a="http://schemas.openxmlformats.org/drawingml/2006/main" xmlns:r="http://schemas.openxmlformats.org/officeDocument/2006/relationships" xmlns:p="http://schemas.openxmlformats.org/presentationml/2006/main">
   <p:cSld>
     <p:spTree>
@@ -17347,7 +20060,7 @@
 </p:sld>
 </file>
 
-<file path=ppt/slides/slide26.xml><?xml version="1.0" encoding="utf-8"?>
+<file path=ppt/slides/slide33.xml><?xml version="1.0" encoding="utf-8"?>
 <p:sld xmlns:a="http://schemas.openxmlformats.org/drawingml/2006/main" xmlns:r="http://schemas.openxmlformats.org/officeDocument/2006/relationships" xmlns:p="http://schemas.openxmlformats.org/presentationml/2006/main">
   <p:cSld>
     <p:spTree>
@@ -17453,7 +20166,7 @@
 </p:sld>
 </file>
 
-<file path=ppt/slides/slide27.xml><?xml version="1.0" encoding="utf-8"?>
+<file path=ppt/slides/slide34.xml><?xml version="1.0" encoding="utf-8"?>
 <p:sld xmlns:a="http://schemas.openxmlformats.org/drawingml/2006/main" xmlns:r="http://schemas.openxmlformats.org/officeDocument/2006/relationships" xmlns:p="http://schemas.openxmlformats.org/presentationml/2006/main">
   <p:cSld>
     <p:spTree>
@@ -18070,7 +20783,7 @@
 </p:sld>
 </file>
 
-<file path=ppt/slides/slide28.xml><?xml version="1.0" encoding="utf-8"?>
+<file path=ppt/slides/slide35.xml><?xml version="1.0" encoding="utf-8"?>
 <p:sld xmlns:a="http://schemas.openxmlformats.org/drawingml/2006/main" xmlns:r="http://schemas.openxmlformats.org/officeDocument/2006/relationships" xmlns:p="http://schemas.openxmlformats.org/presentationml/2006/main">
   <p:cSld>
     <p:spTree>
@@ -18481,7 +21194,7 @@
 </p:sld>
 </file>
 
-<file path=ppt/slides/slide29.xml><?xml version="1.0" encoding="utf-8"?>
+<file path=ppt/slides/slide36.xml><?xml version="1.0" encoding="utf-8"?>
 <p:sld xmlns:a="http://schemas.openxmlformats.org/drawingml/2006/main" xmlns:r="http://schemas.openxmlformats.org/officeDocument/2006/relationships" xmlns:p="http://schemas.openxmlformats.org/presentationml/2006/main">
   <p:cSld>
     <p:spTree>
@@ -18635,7 +21348,544 @@
 </p:sld>
 </file>
 
-<file path=ppt/slides/slide3.xml><?xml version="1.0" encoding="utf-8"?>
+<file path=ppt/slides/slide37.xml><?xml version="1.0" encoding="utf-8"?>
+<p:sld xmlns:a="http://schemas.openxmlformats.org/drawingml/2006/main" xmlns:r="http://schemas.openxmlformats.org/officeDocument/2006/relationships" xmlns:p="http://schemas.openxmlformats.org/presentationml/2006/main">
+  <p:cSld>
+    <p:spTree>
+      <p:nvGrpSpPr>
+        <p:cNvPr id="1" name=""/>
+        <p:cNvGrpSpPr/>
+        <p:nvPr/>
+      </p:nvGrpSpPr>
+      <p:grpSpPr>
+        <a:xfrm>
+          <a:off x="0" y="0"/>
+          <a:ext cx="0" cy="0"/>
+          <a:chOff x="0" y="0"/>
+          <a:chExt cx="0" cy="0"/>
+        </a:xfrm>
+      </p:grpSpPr>
+      <p:sp>
+        <p:nvSpPr>
+          <p:cNvPr id="2" name="タイトル 1">
+            <a:extLst>
+              <a:ext uri="{FF2B5EF4-FFF2-40B4-BE49-F238E27FC236}">
+                <a16:creationId xmlns:a16="http://schemas.microsoft.com/office/drawing/2014/main" id="{E6095BE4-4BC0-11B4-F327-54DF0890DC2E}"/>
+              </a:ext>
+            </a:extLst>
+          </p:cNvPr>
+          <p:cNvSpPr>
+            <a:spLocks noGrp="1"/>
+          </p:cNvSpPr>
+          <p:nvPr>
+            <p:ph type="title"/>
+          </p:nvPr>
+        </p:nvSpPr>
+        <p:spPr/>
+        <p:txBody>
+          <a:bodyPr/>
+          <a:lstStyle/>
+          <a:p>
+            <a:r>
+              <a:rPr kumimoji="1" lang="ja-JP" altLang="en-US" dirty="0"/>
+              <a:t>結果確認</a:t>
+            </a:r>
+          </a:p>
+        </p:txBody>
+      </p:sp>
+      <p:pic>
+        <p:nvPicPr>
+          <p:cNvPr id="4" name="図 3">
+            <a:extLst>
+              <a:ext uri="{FF2B5EF4-FFF2-40B4-BE49-F238E27FC236}">
+                <a16:creationId xmlns:a16="http://schemas.microsoft.com/office/drawing/2014/main" id="{B72BEF95-D25B-12C3-E6AA-B962538D01FE}"/>
+              </a:ext>
+            </a:extLst>
+          </p:cNvPr>
+          <p:cNvPicPr>
+            <a:picLocks noChangeAspect="1"/>
+          </p:cNvPicPr>
+          <p:nvPr/>
+        </p:nvPicPr>
+        <p:blipFill>
+          <a:blip r:embed="rId3"/>
+          <a:stretch>
+            <a:fillRect/>
+          </a:stretch>
+        </p:blipFill>
+        <p:spPr>
+          <a:xfrm>
+            <a:off x="392129" y="777766"/>
+            <a:ext cx="5744377" cy="4089653"/>
+          </a:xfrm>
+          <a:prstGeom prst="rect">
+            <a:avLst/>
+          </a:prstGeom>
+        </p:spPr>
+      </p:pic>
+      <p:sp>
+        <p:nvSpPr>
+          <p:cNvPr id="5" name="吹き出し: 四角形 4">
+            <a:extLst>
+              <a:ext uri="{FF2B5EF4-FFF2-40B4-BE49-F238E27FC236}">
+                <a16:creationId xmlns:a16="http://schemas.microsoft.com/office/drawing/2014/main" id="{5DE5C7E2-9F48-28B0-91A5-BD683EAE4AEC}"/>
+              </a:ext>
+            </a:extLst>
+          </p:cNvPr>
+          <p:cNvSpPr/>
+          <p:nvPr/>
+        </p:nvSpPr>
+        <p:spPr>
+          <a:xfrm>
+            <a:off x="4933721" y="2351840"/>
+            <a:ext cx="3012100" cy="941503"/>
+          </a:xfrm>
+          <a:prstGeom prst="wedgeRectCallout">
+            <a:avLst>
+              <a:gd name="adj1" fmla="val -61433"/>
+              <a:gd name="adj2" fmla="val 46132"/>
+            </a:avLst>
+          </a:prstGeom>
+          <a:solidFill>
+            <a:srgbClr val="FFFFE5"/>
+          </a:solidFill>
+          <a:ln>
+            <a:solidFill>
+              <a:schemeClr val="bg1">
+                <a:lumMod val="75000"/>
+              </a:schemeClr>
+            </a:solidFill>
+          </a:ln>
+        </p:spPr>
+        <p:style>
+          <a:lnRef idx="2">
+            <a:schemeClr val="accent1">
+              <a:shade val="50000"/>
+            </a:schemeClr>
+          </a:lnRef>
+          <a:fillRef idx="1">
+            <a:schemeClr val="accent1"/>
+          </a:fillRef>
+          <a:effectRef idx="0">
+            <a:schemeClr val="accent1"/>
+          </a:effectRef>
+          <a:fontRef idx="minor">
+            <a:schemeClr val="lt1"/>
+          </a:fontRef>
+        </p:style>
+        <p:txBody>
+          <a:bodyPr rtlCol="0" anchor="ctr"/>
+          <a:lstStyle/>
+          <a:p>
+            <a:pPr algn="ctr"/>
+            <a:r>
+              <a:rPr kumimoji="1" lang="ja-JP" altLang="en-US" sz="1400" dirty="0">
+                <a:solidFill>
+                  <a:schemeClr val="tx1"/>
+                </a:solidFill>
+              </a:rPr>
+              <a:t>エラー無しにコンパイルできれば</a:t>
+            </a:r>
+            <a:endParaRPr kumimoji="1" lang="en-US" altLang="ja-JP" sz="1400" dirty="0">
+              <a:solidFill>
+                <a:schemeClr val="tx1"/>
+              </a:solidFill>
+            </a:endParaRPr>
+          </a:p>
+          <a:p>
+            <a:pPr algn="ctr"/>
+            <a:r>
+              <a:rPr kumimoji="1" lang="en-US" altLang="ja-JP" sz="1400" dirty="0">
+                <a:solidFill>
+                  <a:schemeClr val="tx1"/>
+                </a:solidFill>
+              </a:rPr>
+              <a:t>IDE</a:t>
+            </a:r>
+            <a:r>
+              <a:rPr kumimoji="1" lang="ja-JP" altLang="en-US" sz="1400" dirty="0">
+                <a:solidFill>
+                  <a:schemeClr val="tx1"/>
+                </a:solidFill>
+              </a:rPr>
+              <a:t>やライブラリのインストール</a:t>
+            </a:r>
+            <a:endParaRPr kumimoji="1" lang="en-US" altLang="ja-JP" sz="1400" dirty="0">
+              <a:solidFill>
+                <a:schemeClr val="tx1"/>
+              </a:solidFill>
+            </a:endParaRPr>
+          </a:p>
+          <a:p>
+            <a:pPr algn="ctr"/>
+            <a:r>
+              <a:rPr kumimoji="1" lang="ja-JP" altLang="en-US" sz="1400" dirty="0">
+                <a:solidFill>
+                  <a:schemeClr val="tx1"/>
+                </a:solidFill>
+              </a:rPr>
+              <a:t>状況は正常</a:t>
+            </a:r>
+          </a:p>
+        </p:txBody>
+      </p:sp>
+    </p:spTree>
+    <p:extLst>
+      <p:ext uri="{BB962C8B-B14F-4D97-AF65-F5344CB8AC3E}">
+        <p14:creationId xmlns:p14="http://schemas.microsoft.com/office/powerpoint/2010/main" val="4177559764"/>
+      </p:ext>
+    </p:extLst>
+  </p:cSld>
+  <p:clrMapOvr>
+    <a:masterClrMapping/>
+  </p:clrMapOvr>
+</p:sld>
+</file>
+
+<file path=ppt/slides/slide38.xml><?xml version="1.0" encoding="utf-8"?>
+<p:sld xmlns:a="http://schemas.openxmlformats.org/drawingml/2006/main" xmlns:r="http://schemas.openxmlformats.org/officeDocument/2006/relationships" xmlns:p="http://schemas.openxmlformats.org/presentationml/2006/main">
+  <p:cSld>
+    <p:spTree>
+      <p:nvGrpSpPr>
+        <p:cNvPr id="1" name=""/>
+        <p:cNvGrpSpPr/>
+        <p:nvPr/>
+      </p:nvGrpSpPr>
+      <p:grpSpPr>
+        <a:xfrm>
+          <a:off x="0" y="0"/>
+          <a:ext cx="0" cy="0"/>
+          <a:chOff x="0" y="0"/>
+          <a:chExt cx="0" cy="0"/>
+        </a:xfrm>
+      </p:grpSpPr>
+    </p:spTree>
+    <p:extLst>
+      <p:ext uri="{BB962C8B-B14F-4D97-AF65-F5344CB8AC3E}">
+        <p14:creationId xmlns:p14="http://schemas.microsoft.com/office/powerpoint/2010/main" val="1993734482"/>
+      </p:ext>
+    </p:extLst>
+  </p:cSld>
+  <p:clrMapOvr>
+    <a:masterClrMapping/>
+  </p:clrMapOvr>
+</p:sld>
+</file>
+
+<file path=ppt/slides/slide4.xml><?xml version="1.0" encoding="utf-8"?>
+<p:sld xmlns:a="http://schemas.openxmlformats.org/drawingml/2006/main" xmlns:r="http://schemas.openxmlformats.org/officeDocument/2006/relationships" xmlns:p="http://schemas.openxmlformats.org/presentationml/2006/main">
+  <p:cSld>
+    <p:spTree>
+      <p:nvGrpSpPr>
+        <p:cNvPr id="1" name=""/>
+        <p:cNvGrpSpPr/>
+        <p:nvPr/>
+      </p:nvGrpSpPr>
+      <p:grpSpPr>
+        <a:xfrm>
+          <a:off x="0" y="0"/>
+          <a:ext cx="0" cy="0"/>
+          <a:chOff x="0" y="0"/>
+          <a:chExt cx="0" cy="0"/>
+        </a:xfrm>
+      </p:grpSpPr>
+      <p:sp>
+        <p:nvSpPr>
+          <p:cNvPr id="2" name="タイトル 1">
+            <a:extLst>
+              <a:ext uri="{FF2B5EF4-FFF2-40B4-BE49-F238E27FC236}">
+                <a16:creationId xmlns:a16="http://schemas.microsoft.com/office/drawing/2014/main" id="{500E1C82-9CDC-C8D4-8C27-15F8F99BACFB}"/>
+              </a:ext>
+            </a:extLst>
+          </p:cNvPr>
+          <p:cNvSpPr>
+            <a:spLocks noGrp="1"/>
+          </p:cNvSpPr>
+          <p:nvPr>
+            <p:ph type="title"/>
+          </p:nvPr>
+        </p:nvSpPr>
+        <p:spPr/>
+        <p:txBody>
+          <a:bodyPr/>
+          <a:lstStyle/>
+          <a:p>
+            <a:r>
+              <a:rPr kumimoji="1" lang="ja-JP" altLang="en-US" dirty="0"/>
+              <a:t>マニュアルへのアクセス</a:t>
+            </a:r>
+          </a:p>
+        </p:txBody>
+      </p:sp>
+      <p:sp>
+        <p:nvSpPr>
+          <p:cNvPr id="3" name="コンテンツ プレースホルダー 2">
+            <a:extLst>
+              <a:ext uri="{FF2B5EF4-FFF2-40B4-BE49-F238E27FC236}">
+                <a16:creationId xmlns:a16="http://schemas.microsoft.com/office/drawing/2014/main" id="{E889E278-2CC6-DD95-A68A-9B9027EC735B}"/>
+              </a:ext>
+            </a:extLst>
+          </p:cNvPr>
+          <p:cNvSpPr>
+            <a:spLocks noGrp="1"/>
+          </p:cNvSpPr>
+          <p:nvPr>
+            <p:ph idx="1"/>
+          </p:nvPr>
+        </p:nvSpPr>
+        <p:spPr/>
+        <p:txBody>
+          <a:bodyPr/>
+          <a:lstStyle/>
+          <a:p>
+            <a:r>
+              <a:rPr lang="ja-JP" altLang="en-US" dirty="0"/>
+              <a:t>参照方法</a:t>
+            </a:r>
+            <a:endParaRPr lang="en-US" altLang="ja-JP" dirty="0"/>
+          </a:p>
+          <a:p>
+            <a:pPr lvl="1"/>
+            <a:r>
+              <a:rPr kumimoji="1" lang="en-US" altLang="ja-JP" dirty="0"/>
+              <a:t>chrome</a:t>
+            </a:r>
+            <a:r>
+              <a:rPr kumimoji="1" lang="ja-JP" altLang="en-US" dirty="0"/>
+              <a:t>で</a:t>
+            </a:r>
+            <a:r>
+              <a:rPr lang="ja-JP" altLang="en-US" dirty="0"/>
+              <a:t>マニュアルディレクトリ内の</a:t>
+            </a:r>
+            <a:r>
+              <a:rPr kumimoji="1" lang="ja-JP" altLang="en-US" dirty="0"/>
+              <a:t>「</a:t>
+            </a:r>
+            <a:r>
+              <a:rPr kumimoji="1" lang="en-US" altLang="ja-JP" dirty="0"/>
+              <a:t>README.md</a:t>
+            </a:r>
+            <a:r>
+              <a:rPr kumimoji="1" lang="ja-JP" altLang="en-US" dirty="0"/>
+              <a:t>」を開く</a:t>
+            </a:r>
+            <a:endParaRPr kumimoji="1" lang="en-US" altLang="ja-JP" dirty="0"/>
+          </a:p>
+          <a:p>
+            <a:pPr lvl="1"/>
+            <a:endParaRPr lang="en-US" altLang="ja-JP" dirty="0"/>
+          </a:p>
+          <a:p>
+            <a:r>
+              <a:rPr kumimoji="1" lang="ja-JP" altLang="en-US" dirty="0"/>
+              <a:t>ドキュメント内のオペレーション</a:t>
+            </a:r>
+            <a:endParaRPr kumimoji="1" lang="en-US" altLang="ja-JP" dirty="0"/>
+          </a:p>
+          <a:p>
+            <a:pPr lvl="1"/>
+            <a:r>
+              <a:rPr lang="ja-JP" altLang="en-US" dirty="0"/>
+              <a:t>リンクを辿ることで，ブラウザ内で操作が完了</a:t>
+            </a:r>
+            <a:endParaRPr kumimoji="1" lang="en-US" altLang="ja-JP" dirty="0"/>
+          </a:p>
+          <a:p>
+            <a:pPr lvl="1"/>
+            <a:endParaRPr lang="en-US" altLang="ja-JP" dirty="0"/>
+          </a:p>
+        </p:txBody>
+      </p:sp>
+      <p:sp>
+        <p:nvSpPr>
+          <p:cNvPr id="4" name="吹き出し: 四角形 3">
+            <a:extLst>
+              <a:ext uri="{FF2B5EF4-FFF2-40B4-BE49-F238E27FC236}">
+                <a16:creationId xmlns:a16="http://schemas.microsoft.com/office/drawing/2014/main" id="{DEDD5D76-6873-7CA3-4525-AAB64007FDE4}"/>
+              </a:ext>
+            </a:extLst>
+          </p:cNvPr>
+          <p:cNvSpPr/>
+          <p:nvPr/>
+        </p:nvSpPr>
+        <p:spPr>
+          <a:xfrm>
+            <a:off x="5887039" y="282805"/>
+            <a:ext cx="2417975" cy="886119"/>
+          </a:xfrm>
+          <a:prstGeom prst="wedgeRectCallout">
+            <a:avLst/>
+          </a:prstGeom>
+          <a:solidFill>
+            <a:srgbClr val="FFFFE5"/>
+          </a:solidFill>
+          <a:ln>
+            <a:solidFill>
+              <a:schemeClr val="bg1">
+                <a:lumMod val="75000"/>
+              </a:schemeClr>
+            </a:solidFill>
+          </a:ln>
+        </p:spPr>
+        <p:style>
+          <a:lnRef idx="2">
+            <a:schemeClr val="accent1">
+              <a:shade val="50000"/>
+            </a:schemeClr>
+          </a:lnRef>
+          <a:fillRef idx="1">
+            <a:schemeClr val="accent1"/>
+          </a:fillRef>
+          <a:effectRef idx="0">
+            <a:schemeClr val="accent1"/>
+          </a:effectRef>
+          <a:fontRef idx="minor">
+            <a:schemeClr val="lt1"/>
+          </a:fontRef>
+        </p:style>
+        <p:txBody>
+          <a:bodyPr rtlCol="0" anchor="ctr"/>
+          <a:lstStyle/>
+          <a:p>
+            <a:pPr algn="ctr"/>
+            <a:r>
+              <a:rPr kumimoji="1" lang="ja-JP" altLang="en-US" dirty="0">
+                <a:solidFill>
+                  <a:schemeClr val="tx1"/>
+                </a:solidFill>
+              </a:rPr>
+              <a:t>整形して表示されて</a:t>
+            </a:r>
+            <a:endParaRPr kumimoji="1" lang="en-US" altLang="ja-JP" dirty="0">
+              <a:solidFill>
+                <a:schemeClr val="tx1"/>
+              </a:solidFill>
+            </a:endParaRPr>
+          </a:p>
+          <a:p>
+            <a:pPr algn="ctr"/>
+            <a:r>
+              <a:rPr kumimoji="1" lang="ja-JP" altLang="en-US" dirty="0">
+                <a:solidFill>
+                  <a:schemeClr val="tx1"/>
+                </a:solidFill>
+              </a:rPr>
+              <a:t>いれば</a:t>
+            </a:r>
+            <a:r>
+              <a:rPr kumimoji="1" lang="en-US" altLang="ja-JP" dirty="0">
+                <a:solidFill>
+                  <a:schemeClr val="tx1"/>
+                </a:solidFill>
+              </a:rPr>
+              <a:t>OK</a:t>
+            </a:r>
+            <a:endParaRPr kumimoji="1" lang="ja-JP" altLang="en-US" dirty="0" err="1">
+              <a:solidFill>
+                <a:schemeClr val="tx1"/>
+              </a:solidFill>
+            </a:endParaRPr>
+          </a:p>
+        </p:txBody>
+      </p:sp>
+    </p:spTree>
+    <p:extLst>
+      <p:ext uri="{BB962C8B-B14F-4D97-AF65-F5344CB8AC3E}">
+        <p14:creationId xmlns:p14="http://schemas.microsoft.com/office/powerpoint/2010/main" val="2116195040"/>
+      </p:ext>
+    </p:extLst>
+  </p:cSld>
+  <p:clrMapOvr>
+    <a:masterClrMapping/>
+  </p:clrMapOvr>
+</p:sld>
+</file>
+
+<file path=ppt/slides/slide5.xml><?xml version="1.0" encoding="utf-8"?>
+<p:sld xmlns:a="http://schemas.openxmlformats.org/drawingml/2006/main" xmlns:r="http://schemas.openxmlformats.org/officeDocument/2006/relationships" xmlns:p="http://schemas.openxmlformats.org/presentationml/2006/main">
+  <p:cSld>
+    <p:spTree>
+      <p:nvGrpSpPr>
+        <p:cNvPr id="1" name=""/>
+        <p:cNvGrpSpPr/>
+        <p:nvPr/>
+      </p:nvGrpSpPr>
+      <p:grpSpPr>
+        <a:xfrm>
+          <a:off x="0" y="0"/>
+          <a:ext cx="0" cy="0"/>
+          <a:chOff x="0" y="0"/>
+          <a:chExt cx="0" cy="0"/>
+        </a:xfrm>
+      </p:grpSpPr>
+      <p:sp>
+        <p:nvSpPr>
+          <p:cNvPr id="2" name="タイトル 1">
+            <a:extLst>
+              <a:ext uri="{FF2B5EF4-FFF2-40B4-BE49-F238E27FC236}">
+                <a16:creationId xmlns:a16="http://schemas.microsoft.com/office/drawing/2014/main" id="{99E54E40-4D2A-85E8-D94C-56DCAFD1F27C}"/>
+              </a:ext>
+            </a:extLst>
+          </p:cNvPr>
+          <p:cNvSpPr>
+            <a:spLocks noGrp="1"/>
+          </p:cNvSpPr>
+          <p:nvPr>
+            <p:ph type="ctrTitle"/>
+          </p:nvPr>
+        </p:nvSpPr>
+        <p:spPr/>
+        <p:txBody>
+          <a:bodyPr/>
+          <a:lstStyle/>
+          <a:p>
+            <a:r>
+              <a:rPr kumimoji="1" lang="ja-JP" altLang="en-US" dirty="0"/>
+              <a:t>プログラム生成環境</a:t>
+            </a:r>
+          </a:p>
+        </p:txBody>
+      </p:sp>
+      <p:sp>
+        <p:nvSpPr>
+          <p:cNvPr id="3" name="字幕 2">
+            <a:extLst>
+              <a:ext uri="{FF2B5EF4-FFF2-40B4-BE49-F238E27FC236}">
+                <a16:creationId xmlns:a16="http://schemas.microsoft.com/office/drawing/2014/main" id="{0D38631D-73EC-D232-BCD1-75EDDE0022F5}"/>
+              </a:ext>
+            </a:extLst>
+          </p:cNvPr>
+          <p:cNvSpPr>
+            <a:spLocks noGrp="1"/>
+          </p:cNvSpPr>
+          <p:nvPr>
+            <p:ph type="subTitle" idx="1"/>
+          </p:nvPr>
+        </p:nvSpPr>
+        <p:spPr/>
+        <p:txBody>
+          <a:bodyPr/>
+          <a:lstStyle/>
+          <a:p>
+            <a:endParaRPr kumimoji="1" lang="ja-JP" altLang="en-US"/>
+          </a:p>
+        </p:txBody>
+      </p:sp>
+    </p:spTree>
+    <p:extLst>
+      <p:ext uri="{BB962C8B-B14F-4D97-AF65-F5344CB8AC3E}">
+        <p14:creationId xmlns:p14="http://schemas.microsoft.com/office/powerpoint/2010/main" val="1276253810"/>
+      </p:ext>
+    </p:extLst>
+  </p:cSld>
+  <p:clrMapOvr>
+    <a:masterClrMapping/>
+  </p:clrMapOvr>
+</p:sld>
+</file>
+
+<file path=ppt/slides/slide6.xml><?xml version="1.0" encoding="utf-8"?>
 <p:sld xmlns:a="http://schemas.openxmlformats.org/drawingml/2006/main" xmlns:r="http://schemas.openxmlformats.org/officeDocument/2006/relationships" xmlns:p="http://schemas.openxmlformats.org/presentationml/2006/main">
   <p:cSld>
     <p:spTree>
@@ -18675,8 +21925,13 @@
           <a:p>
             <a:r>
               <a:rPr kumimoji="1" lang="ja-JP" altLang="en-US" dirty="0"/>
-              <a:t>マニュアルの場所</a:t>
-            </a:r>
+              <a:t>プログラム生成環境</a:t>
+            </a:r>
+            <a:r>
+              <a:rPr lang="ja-JP" altLang="en-US" dirty="0"/>
+              <a:t>の各プログラム</a:t>
+            </a:r>
+            <a:endParaRPr kumimoji="1" lang="ja-JP" altLang="en-US" dirty="0"/>
           </a:p>
         </p:txBody>
       </p:sp>
@@ -18881,871 +22136,6 @@
       </p:sp>
       <p:sp>
         <p:nvSpPr>
-          <p:cNvPr id="10" name="吹き出し: 四角形 9">
-            <a:extLst>
-              <a:ext uri="{FF2B5EF4-FFF2-40B4-BE49-F238E27FC236}">
-                <a16:creationId xmlns:a16="http://schemas.microsoft.com/office/drawing/2014/main" id="{F0B30F1E-A422-2A40-F92A-205006BF5AD6}"/>
-              </a:ext>
-            </a:extLst>
-          </p:cNvPr>
-          <p:cNvSpPr/>
-          <p:nvPr/>
-        </p:nvSpPr>
-        <p:spPr>
-          <a:xfrm>
-            <a:off x="4653814" y="2842969"/>
-            <a:ext cx="1525605" cy="789271"/>
-          </a:xfrm>
-          <a:prstGeom prst="wedgeRectCallout">
-            <a:avLst>
-              <a:gd name="adj1" fmla="val -64366"/>
-              <a:gd name="adj2" fmla="val -32622"/>
-            </a:avLst>
-          </a:prstGeom>
-          <a:solidFill>
-            <a:srgbClr val="FFFFE5"/>
-          </a:solidFill>
-          <a:ln>
-            <a:solidFill>
-              <a:schemeClr val="bg1">
-                <a:lumMod val="75000"/>
-              </a:schemeClr>
-            </a:solidFill>
-          </a:ln>
-        </p:spPr>
-        <p:style>
-          <a:lnRef idx="2">
-            <a:schemeClr val="accent1">
-              <a:shade val="50000"/>
-            </a:schemeClr>
-          </a:lnRef>
-          <a:fillRef idx="1">
-            <a:schemeClr val="accent1"/>
-          </a:fillRef>
-          <a:effectRef idx="0">
-            <a:schemeClr val="accent1"/>
-          </a:effectRef>
-          <a:fontRef idx="minor">
-            <a:schemeClr val="lt1"/>
-          </a:fontRef>
-        </p:style>
-        <p:txBody>
-          <a:bodyPr rtlCol="0" anchor="ctr"/>
-          <a:lstStyle/>
-          <a:p>
-            <a:pPr algn="ctr"/>
-            <a:r>
-              <a:rPr kumimoji="1" lang="ja-JP" altLang="en-US" dirty="0">
-                <a:solidFill>
-                  <a:srgbClr val="FF0000"/>
-                </a:solidFill>
-              </a:rPr>
-              <a:t>マニュアル</a:t>
-            </a:r>
-          </a:p>
-        </p:txBody>
-      </p:sp>
-    </p:spTree>
-    <p:extLst>
-      <p:ext uri="{BB962C8B-B14F-4D97-AF65-F5344CB8AC3E}">
-        <p14:creationId xmlns:p14="http://schemas.microsoft.com/office/powerpoint/2010/main" val="457751850"/>
-      </p:ext>
-    </p:extLst>
-  </p:cSld>
-  <p:clrMapOvr>
-    <a:masterClrMapping/>
-  </p:clrMapOvr>
-</p:sld>
-</file>
-
-<file path=ppt/slides/slide30.xml><?xml version="1.0" encoding="utf-8"?>
-<p:sld xmlns:a="http://schemas.openxmlformats.org/drawingml/2006/main" xmlns:r="http://schemas.openxmlformats.org/officeDocument/2006/relationships" xmlns:p="http://schemas.openxmlformats.org/presentationml/2006/main">
-  <p:cSld>
-    <p:spTree>
-      <p:nvGrpSpPr>
-        <p:cNvPr id="1" name=""/>
-        <p:cNvGrpSpPr/>
-        <p:nvPr/>
-      </p:nvGrpSpPr>
-      <p:grpSpPr>
-        <a:xfrm>
-          <a:off x="0" y="0"/>
-          <a:ext cx="0" cy="0"/>
-          <a:chOff x="0" y="0"/>
-          <a:chExt cx="0" cy="0"/>
-        </a:xfrm>
-      </p:grpSpPr>
-      <p:sp>
-        <p:nvSpPr>
-          <p:cNvPr id="2" name="タイトル 1">
-            <a:extLst>
-              <a:ext uri="{FF2B5EF4-FFF2-40B4-BE49-F238E27FC236}">
-                <a16:creationId xmlns:a16="http://schemas.microsoft.com/office/drawing/2014/main" id="{E6095BE4-4BC0-11B4-F327-54DF0890DC2E}"/>
-              </a:ext>
-            </a:extLst>
-          </p:cNvPr>
-          <p:cNvSpPr>
-            <a:spLocks noGrp="1"/>
-          </p:cNvSpPr>
-          <p:nvPr>
-            <p:ph type="title"/>
-          </p:nvPr>
-        </p:nvSpPr>
-        <p:spPr/>
-        <p:txBody>
-          <a:bodyPr/>
-          <a:lstStyle/>
-          <a:p>
-            <a:r>
-              <a:rPr kumimoji="1" lang="ja-JP" altLang="en-US" dirty="0"/>
-              <a:t>結果確認</a:t>
-            </a:r>
-          </a:p>
-        </p:txBody>
-      </p:sp>
-      <p:pic>
-        <p:nvPicPr>
-          <p:cNvPr id="4" name="図 3">
-            <a:extLst>
-              <a:ext uri="{FF2B5EF4-FFF2-40B4-BE49-F238E27FC236}">
-                <a16:creationId xmlns:a16="http://schemas.microsoft.com/office/drawing/2014/main" id="{B72BEF95-D25B-12C3-E6AA-B962538D01FE}"/>
-              </a:ext>
-            </a:extLst>
-          </p:cNvPr>
-          <p:cNvPicPr>
-            <a:picLocks noChangeAspect="1"/>
-          </p:cNvPicPr>
-          <p:nvPr/>
-        </p:nvPicPr>
-        <p:blipFill>
-          <a:blip r:embed="rId3"/>
-          <a:stretch>
-            <a:fillRect/>
-          </a:stretch>
-        </p:blipFill>
-        <p:spPr>
-          <a:xfrm>
-            <a:off x="392129" y="777766"/>
-            <a:ext cx="5744377" cy="4089653"/>
-          </a:xfrm>
-          <a:prstGeom prst="rect">
-            <a:avLst/>
-          </a:prstGeom>
-        </p:spPr>
-      </p:pic>
-      <p:sp>
-        <p:nvSpPr>
-          <p:cNvPr id="5" name="吹き出し: 四角形 4">
-            <a:extLst>
-              <a:ext uri="{FF2B5EF4-FFF2-40B4-BE49-F238E27FC236}">
-                <a16:creationId xmlns:a16="http://schemas.microsoft.com/office/drawing/2014/main" id="{5DE5C7E2-9F48-28B0-91A5-BD683EAE4AEC}"/>
-              </a:ext>
-            </a:extLst>
-          </p:cNvPr>
-          <p:cNvSpPr/>
-          <p:nvPr/>
-        </p:nvSpPr>
-        <p:spPr>
-          <a:xfrm>
-            <a:off x="4933721" y="2351840"/>
-            <a:ext cx="3012100" cy="941503"/>
-          </a:xfrm>
-          <a:prstGeom prst="wedgeRectCallout">
-            <a:avLst>
-              <a:gd name="adj1" fmla="val -61433"/>
-              <a:gd name="adj2" fmla="val 46132"/>
-            </a:avLst>
-          </a:prstGeom>
-          <a:solidFill>
-            <a:srgbClr val="FFFFE5"/>
-          </a:solidFill>
-          <a:ln>
-            <a:solidFill>
-              <a:schemeClr val="bg1">
-                <a:lumMod val="75000"/>
-              </a:schemeClr>
-            </a:solidFill>
-          </a:ln>
-        </p:spPr>
-        <p:style>
-          <a:lnRef idx="2">
-            <a:schemeClr val="accent1">
-              <a:shade val="50000"/>
-            </a:schemeClr>
-          </a:lnRef>
-          <a:fillRef idx="1">
-            <a:schemeClr val="accent1"/>
-          </a:fillRef>
-          <a:effectRef idx="0">
-            <a:schemeClr val="accent1"/>
-          </a:effectRef>
-          <a:fontRef idx="minor">
-            <a:schemeClr val="lt1"/>
-          </a:fontRef>
-        </p:style>
-        <p:txBody>
-          <a:bodyPr rtlCol="0" anchor="ctr"/>
-          <a:lstStyle/>
-          <a:p>
-            <a:pPr algn="ctr"/>
-            <a:r>
-              <a:rPr kumimoji="1" lang="ja-JP" altLang="en-US" sz="1400" dirty="0">
-                <a:solidFill>
-                  <a:schemeClr val="tx1"/>
-                </a:solidFill>
-              </a:rPr>
-              <a:t>エラー無しにコンパイルできれば</a:t>
-            </a:r>
-            <a:endParaRPr kumimoji="1" lang="en-US" altLang="ja-JP" sz="1400" dirty="0">
-              <a:solidFill>
-                <a:schemeClr val="tx1"/>
-              </a:solidFill>
-            </a:endParaRPr>
-          </a:p>
-          <a:p>
-            <a:pPr algn="ctr"/>
-            <a:r>
-              <a:rPr kumimoji="1" lang="en-US" altLang="ja-JP" sz="1400" dirty="0">
-                <a:solidFill>
-                  <a:schemeClr val="tx1"/>
-                </a:solidFill>
-              </a:rPr>
-              <a:t>IDE</a:t>
-            </a:r>
-            <a:r>
-              <a:rPr kumimoji="1" lang="ja-JP" altLang="en-US" sz="1400" dirty="0">
-                <a:solidFill>
-                  <a:schemeClr val="tx1"/>
-                </a:solidFill>
-              </a:rPr>
-              <a:t>やライブラリのインストール</a:t>
-            </a:r>
-            <a:endParaRPr kumimoji="1" lang="en-US" altLang="ja-JP" sz="1400" dirty="0">
-              <a:solidFill>
-                <a:schemeClr val="tx1"/>
-              </a:solidFill>
-            </a:endParaRPr>
-          </a:p>
-          <a:p>
-            <a:pPr algn="ctr"/>
-            <a:r>
-              <a:rPr kumimoji="1" lang="ja-JP" altLang="en-US" sz="1400" dirty="0">
-                <a:solidFill>
-                  <a:schemeClr val="tx1"/>
-                </a:solidFill>
-              </a:rPr>
-              <a:t>状況は正常</a:t>
-            </a:r>
-          </a:p>
-        </p:txBody>
-      </p:sp>
-    </p:spTree>
-    <p:extLst>
-      <p:ext uri="{BB962C8B-B14F-4D97-AF65-F5344CB8AC3E}">
-        <p14:creationId xmlns:p14="http://schemas.microsoft.com/office/powerpoint/2010/main" val="4177559764"/>
-      </p:ext>
-    </p:extLst>
-  </p:cSld>
-  <p:clrMapOvr>
-    <a:masterClrMapping/>
-  </p:clrMapOvr>
-</p:sld>
-</file>
-
-<file path=ppt/slides/slide31.xml><?xml version="1.0" encoding="utf-8"?>
-<p:sld xmlns:a="http://schemas.openxmlformats.org/drawingml/2006/main" xmlns:r="http://schemas.openxmlformats.org/officeDocument/2006/relationships" xmlns:p="http://schemas.openxmlformats.org/presentationml/2006/main">
-  <p:cSld>
-    <p:spTree>
-      <p:nvGrpSpPr>
-        <p:cNvPr id="1" name=""/>
-        <p:cNvGrpSpPr/>
-        <p:nvPr/>
-      </p:nvGrpSpPr>
-      <p:grpSpPr>
-        <a:xfrm>
-          <a:off x="0" y="0"/>
-          <a:ext cx="0" cy="0"/>
-          <a:chOff x="0" y="0"/>
-          <a:chExt cx="0" cy="0"/>
-        </a:xfrm>
-      </p:grpSpPr>
-    </p:spTree>
-    <p:extLst>
-      <p:ext uri="{BB962C8B-B14F-4D97-AF65-F5344CB8AC3E}">
-        <p14:creationId xmlns:p14="http://schemas.microsoft.com/office/powerpoint/2010/main" val="1993734482"/>
-      </p:ext>
-    </p:extLst>
-  </p:cSld>
-  <p:clrMapOvr>
-    <a:masterClrMapping/>
-  </p:clrMapOvr>
-</p:sld>
-</file>
-
-<file path=ppt/slides/slide4.xml><?xml version="1.0" encoding="utf-8"?>
-<p:sld xmlns:a="http://schemas.openxmlformats.org/drawingml/2006/main" xmlns:r="http://schemas.openxmlformats.org/officeDocument/2006/relationships" xmlns:p="http://schemas.openxmlformats.org/presentationml/2006/main">
-  <p:cSld>
-    <p:spTree>
-      <p:nvGrpSpPr>
-        <p:cNvPr id="1" name=""/>
-        <p:cNvGrpSpPr/>
-        <p:nvPr/>
-      </p:nvGrpSpPr>
-      <p:grpSpPr>
-        <a:xfrm>
-          <a:off x="0" y="0"/>
-          <a:ext cx="0" cy="0"/>
-          <a:chOff x="0" y="0"/>
-          <a:chExt cx="0" cy="0"/>
-        </a:xfrm>
-      </p:grpSpPr>
-      <p:sp>
-        <p:nvSpPr>
-          <p:cNvPr id="2" name="タイトル 1">
-            <a:extLst>
-              <a:ext uri="{FF2B5EF4-FFF2-40B4-BE49-F238E27FC236}">
-                <a16:creationId xmlns:a16="http://schemas.microsoft.com/office/drawing/2014/main" id="{500E1C82-9CDC-C8D4-8C27-15F8F99BACFB}"/>
-              </a:ext>
-            </a:extLst>
-          </p:cNvPr>
-          <p:cNvSpPr>
-            <a:spLocks noGrp="1"/>
-          </p:cNvSpPr>
-          <p:nvPr>
-            <p:ph type="title"/>
-          </p:nvPr>
-        </p:nvSpPr>
-        <p:spPr/>
-        <p:txBody>
-          <a:bodyPr/>
-          <a:lstStyle/>
-          <a:p>
-            <a:r>
-              <a:rPr kumimoji="1" lang="ja-JP" altLang="en-US" dirty="0"/>
-              <a:t>マニュアルへのアクセス</a:t>
-            </a:r>
-          </a:p>
-        </p:txBody>
-      </p:sp>
-      <p:sp>
-        <p:nvSpPr>
-          <p:cNvPr id="3" name="コンテンツ プレースホルダー 2">
-            <a:extLst>
-              <a:ext uri="{FF2B5EF4-FFF2-40B4-BE49-F238E27FC236}">
-                <a16:creationId xmlns:a16="http://schemas.microsoft.com/office/drawing/2014/main" id="{E889E278-2CC6-DD95-A68A-9B9027EC735B}"/>
-              </a:ext>
-            </a:extLst>
-          </p:cNvPr>
-          <p:cNvSpPr>
-            <a:spLocks noGrp="1"/>
-          </p:cNvSpPr>
-          <p:nvPr>
-            <p:ph idx="1"/>
-          </p:nvPr>
-        </p:nvSpPr>
-        <p:spPr/>
-        <p:txBody>
-          <a:bodyPr/>
-          <a:lstStyle/>
-          <a:p>
-            <a:r>
-              <a:rPr lang="ja-JP" altLang="en-US" dirty="0"/>
-              <a:t>参照方法</a:t>
-            </a:r>
-            <a:endParaRPr lang="en-US" altLang="ja-JP" dirty="0"/>
-          </a:p>
-          <a:p>
-            <a:pPr lvl="1"/>
-            <a:r>
-              <a:rPr kumimoji="1" lang="en-US" altLang="ja-JP" dirty="0"/>
-              <a:t>chrome</a:t>
-            </a:r>
-            <a:r>
-              <a:rPr kumimoji="1" lang="ja-JP" altLang="en-US" dirty="0"/>
-              <a:t>で</a:t>
-            </a:r>
-            <a:r>
-              <a:rPr lang="ja-JP" altLang="en-US" dirty="0"/>
-              <a:t>マニュアルディレクトリ内の</a:t>
-            </a:r>
-            <a:r>
-              <a:rPr kumimoji="1" lang="ja-JP" altLang="en-US" dirty="0"/>
-              <a:t>「</a:t>
-            </a:r>
-            <a:r>
-              <a:rPr kumimoji="1" lang="en-US" altLang="ja-JP" dirty="0"/>
-              <a:t>README.md</a:t>
-            </a:r>
-            <a:r>
-              <a:rPr kumimoji="1" lang="ja-JP" altLang="en-US" dirty="0"/>
-              <a:t>」を開く</a:t>
-            </a:r>
-            <a:endParaRPr kumimoji="1" lang="en-US" altLang="ja-JP" dirty="0"/>
-          </a:p>
-          <a:p>
-            <a:pPr lvl="1"/>
-            <a:endParaRPr lang="en-US" altLang="ja-JP" dirty="0"/>
-          </a:p>
-          <a:p>
-            <a:r>
-              <a:rPr kumimoji="1" lang="ja-JP" altLang="en-US" dirty="0"/>
-              <a:t>ドキュメント内のオペレーション</a:t>
-            </a:r>
-            <a:endParaRPr kumimoji="1" lang="en-US" altLang="ja-JP" dirty="0"/>
-          </a:p>
-          <a:p>
-            <a:pPr lvl="1"/>
-            <a:r>
-              <a:rPr lang="ja-JP" altLang="en-US" dirty="0"/>
-              <a:t>リンクを辿ることで，ブラウザ内で操作が完了</a:t>
-            </a:r>
-            <a:endParaRPr kumimoji="1" lang="en-US" altLang="ja-JP" dirty="0"/>
-          </a:p>
-          <a:p>
-            <a:pPr lvl="1"/>
-            <a:endParaRPr lang="en-US" altLang="ja-JP" dirty="0"/>
-          </a:p>
-        </p:txBody>
-      </p:sp>
-      <p:sp>
-        <p:nvSpPr>
-          <p:cNvPr id="4" name="吹き出し: 四角形 3">
-            <a:extLst>
-              <a:ext uri="{FF2B5EF4-FFF2-40B4-BE49-F238E27FC236}">
-                <a16:creationId xmlns:a16="http://schemas.microsoft.com/office/drawing/2014/main" id="{DEDD5D76-6873-7CA3-4525-AAB64007FDE4}"/>
-              </a:ext>
-            </a:extLst>
-          </p:cNvPr>
-          <p:cNvSpPr/>
-          <p:nvPr/>
-        </p:nvSpPr>
-        <p:spPr>
-          <a:xfrm>
-            <a:off x="5887039" y="282805"/>
-            <a:ext cx="2417975" cy="886119"/>
-          </a:xfrm>
-          <a:prstGeom prst="wedgeRectCallout">
-            <a:avLst/>
-          </a:prstGeom>
-          <a:solidFill>
-            <a:srgbClr val="FFFFE5"/>
-          </a:solidFill>
-          <a:ln>
-            <a:solidFill>
-              <a:schemeClr val="bg1">
-                <a:lumMod val="75000"/>
-              </a:schemeClr>
-            </a:solidFill>
-          </a:ln>
-        </p:spPr>
-        <p:style>
-          <a:lnRef idx="2">
-            <a:schemeClr val="accent1">
-              <a:shade val="50000"/>
-            </a:schemeClr>
-          </a:lnRef>
-          <a:fillRef idx="1">
-            <a:schemeClr val="accent1"/>
-          </a:fillRef>
-          <a:effectRef idx="0">
-            <a:schemeClr val="accent1"/>
-          </a:effectRef>
-          <a:fontRef idx="minor">
-            <a:schemeClr val="lt1"/>
-          </a:fontRef>
-        </p:style>
-        <p:txBody>
-          <a:bodyPr rtlCol="0" anchor="ctr"/>
-          <a:lstStyle/>
-          <a:p>
-            <a:pPr algn="ctr"/>
-            <a:r>
-              <a:rPr kumimoji="1" lang="ja-JP" altLang="en-US" dirty="0">
-                <a:solidFill>
-                  <a:schemeClr val="tx1"/>
-                </a:solidFill>
-              </a:rPr>
-              <a:t>整形して表示されて</a:t>
-            </a:r>
-            <a:endParaRPr kumimoji="1" lang="en-US" altLang="ja-JP" dirty="0">
-              <a:solidFill>
-                <a:schemeClr val="tx1"/>
-              </a:solidFill>
-            </a:endParaRPr>
-          </a:p>
-          <a:p>
-            <a:pPr algn="ctr"/>
-            <a:r>
-              <a:rPr kumimoji="1" lang="ja-JP" altLang="en-US" dirty="0">
-                <a:solidFill>
-                  <a:schemeClr val="tx1"/>
-                </a:solidFill>
-              </a:rPr>
-              <a:t>いれば</a:t>
-            </a:r>
-            <a:r>
-              <a:rPr kumimoji="1" lang="en-US" altLang="ja-JP" dirty="0">
-                <a:solidFill>
-                  <a:schemeClr val="tx1"/>
-                </a:solidFill>
-              </a:rPr>
-              <a:t>OK</a:t>
-            </a:r>
-            <a:endParaRPr kumimoji="1" lang="ja-JP" altLang="en-US" dirty="0" err="1">
-              <a:solidFill>
-                <a:schemeClr val="tx1"/>
-              </a:solidFill>
-            </a:endParaRPr>
-          </a:p>
-        </p:txBody>
-      </p:sp>
-    </p:spTree>
-    <p:extLst>
-      <p:ext uri="{BB962C8B-B14F-4D97-AF65-F5344CB8AC3E}">
-        <p14:creationId xmlns:p14="http://schemas.microsoft.com/office/powerpoint/2010/main" val="2116195040"/>
-      </p:ext>
-    </p:extLst>
-  </p:cSld>
-  <p:clrMapOvr>
-    <a:masterClrMapping/>
-  </p:clrMapOvr>
-</p:sld>
-</file>
-
-<file path=ppt/slides/slide5.xml><?xml version="1.0" encoding="utf-8"?>
-<p:sld xmlns:a="http://schemas.openxmlformats.org/drawingml/2006/main" xmlns:r="http://schemas.openxmlformats.org/officeDocument/2006/relationships" xmlns:p="http://schemas.openxmlformats.org/presentationml/2006/main">
-  <p:cSld>
-    <p:spTree>
-      <p:nvGrpSpPr>
-        <p:cNvPr id="1" name=""/>
-        <p:cNvGrpSpPr/>
-        <p:nvPr/>
-      </p:nvGrpSpPr>
-      <p:grpSpPr>
-        <a:xfrm>
-          <a:off x="0" y="0"/>
-          <a:ext cx="0" cy="0"/>
-          <a:chOff x="0" y="0"/>
-          <a:chExt cx="0" cy="0"/>
-        </a:xfrm>
-      </p:grpSpPr>
-      <p:sp>
-        <p:nvSpPr>
-          <p:cNvPr id="2" name="タイトル 1">
-            <a:extLst>
-              <a:ext uri="{FF2B5EF4-FFF2-40B4-BE49-F238E27FC236}">
-                <a16:creationId xmlns:a16="http://schemas.microsoft.com/office/drawing/2014/main" id="{99E54E40-4D2A-85E8-D94C-56DCAFD1F27C}"/>
-              </a:ext>
-            </a:extLst>
-          </p:cNvPr>
-          <p:cNvSpPr>
-            <a:spLocks noGrp="1"/>
-          </p:cNvSpPr>
-          <p:nvPr>
-            <p:ph type="ctrTitle"/>
-          </p:nvPr>
-        </p:nvSpPr>
-        <p:spPr/>
-        <p:txBody>
-          <a:bodyPr/>
-          <a:lstStyle/>
-          <a:p>
-            <a:r>
-              <a:rPr kumimoji="1" lang="ja-JP" altLang="en-US" dirty="0"/>
-              <a:t>プログラム生成環境</a:t>
-            </a:r>
-          </a:p>
-        </p:txBody>
-      </p:sp>
-      <p:sp>
-        <p:nvSpPr>
-          <p:cNvPr id="3" name="字幕 2">
-            <a:extLst>
-              <a:ext uri="{FF2B5EF4-FFF2-40B4-BE49-F238E27FC236}">
-                <a16:creationId xmlns:a16="http://schemas.microsoft.com/office/drawing/2014/main" id="{0D38631D-73EC-D232-BCD1-75EDDE0022F5}"/>
-              </a:ext>
-            </a:extLst>
-          </p:cNvPr>
-          <p:cNvSpPr>
-            <a:spLocks noGrp="1"/>
-          </p:cNvSpPr>
-          <p:nvPr>
-            <p:ph type="subTitle" idx="1"/>
-          </p:nvPr>
-        </p:nvSpPr>
-        <p:spPr/>
-        <p:txBody>
-          <a:bodyPr/>
-          <a:lstStyle/>
-          <a:p>
-            <a:endParaRPr kumimoji="1" lang="ja-JP" altLang="en-US"/>
-          </a:p>
-        </p:txBody>
-      </p:sp>
-    </p:spTree>
-    <p:extLst>
-      <p:ext uri="{BB962C8B-B14F-4D97-AF65-F5344CB8AC3E}">
-        <p14:creationId xmlns:p14="http://schemas.microsoft.com/office/powerpoint/2010/main" val="1276253810"/>
-      </p:ext>
-    </p:extLst>
-  </p:cSld>
-  <p:clrMapOvr>
-    <a:masterClrMapping/>
-  </p:clrMapOvr>
-</p:sld>
-</file>
-
-<file path=ppt/slides/slide6.xml><?xml version="1.0" encoding="utf-8"?>
-<p:sld xmlns:a="http://schemas.openxmlformats.org/drawingml/2006/main" xmlns:r="http://schemas.openxmlformats.org/officeDocument/2006/relationships" xmlns:p="http://schemas.openxmlformats.org/presentationml/2006/main">
-  <p:cSld>
-    <p:spTree>
-      <p:nvGrpSpPr>
-        <p:cNvPr id="1" name=""/>
-        <p:cNvGrpSpPr/>
-        <p:nvPr/>
-      </p:nvGrpSpPr>
-      <p:grpSpPr>
-        <a:xfrm>
-          <a:off x="0" y="0"/>
-          <a:ext cx="0" cy="0"/>
-          <a:chOff x="0" y="0"/>
-          <a:chExt cx="0" cy="0"/>
-        </a:xfrm>
-      </p:grpSpPr>
-      <p:sp>
-        <p:nvSpPr>
-          <p:cNvPr id="2" name="タイトル 1">
-            <a:extLst>
-              <a:ext uri="{FF2B5EF4-FFF2-40B4-BE49-F238E27FC236}">
-                <a16:creationId xmlns:a16="http://schemas.microsoft.com/office/drawing/2014/main" id="{78E60858-9E00-1E44-A524-75B63E98EEF7}"/>
-              </a:ext>
-            </a:extLst>
-          </p:cNvPr>
-          <p:cNvSpPr>
-            <a:spLocks noGrp="1"/>
-          </p:cNvSpPr>
-          <p:nvPr>
-            <p:ph type="title"/>
-          </p:nvPr>
-        </p:nvSpPr>
-        <p:spPr/>
-        <p:txBody>
-          <a:bodyPr/>
-          <a:lstStyle/>
-          <a:p>
-            <a:r>
-              <a:rPr kumimoji="1" lang="ja-JP" altLang="en-US" dirty="0"/>
-              <a:t>プログラム生成環境</a:t>
-            </a:r>
-            <a:r>
-              <a:rPr lang="ja-JP" altLang="en-US" dirty="0"/>
-              <a:t>の各プログラム</a:t>
-            </a:r>
-            <a:endParaRPr kumimoji="1" lang="ja-JP" altLang="en-US" dirty="0"/>
-          </a:p>
-        </p:txBody>
-      </p:sp>
-      <p:pic>
-        <p:nvPicPr>
-          <p:cNvPr id="4" name="図 3">
-            <a:extLst>
-              <a:ext uri="{FF2B5EF4-FFF2-40B4-BE49-F238E27FC236}">
-                <a16:creationId xmlns:a16="http://schemas.microsoft.com/office/drawing/2014/main" id="{AEEFD9F2-5E54-E7F9-DB26-4965969CDA62}"/>
-              </a:ext>
-            </a:extLst>
-          </p:cNvPr>
-          <p:cNvPicPr>
-            <a:picLocks noChangeAspect="1"/>
-          </p:cNvPicPr>
-          <p:nvPr/>
-        </p:nvPicPr>
-        <p:blipFill>
-          <a:blip r:embed="rId3"/>
-          <a:stretch>
-            <a:fillRect/>
-          </a:stretch>
-        </p:blipFill>
-        <p:spPr>
-          <a:xfrm>
-            <a:off x="43313" y="1088966"/>
-            <a:ext cx="5740376" cy="2188007"/>
-          </a:xfrm>
-          <a:prstGeom prst="rect">
-            <a:avLst/>
-          </a:prstGeom>
-        </p:spPr>
-      </p:pic>
-      <p:sp>
-        <p:nvSpPr>
-          <p:cNvPr id="7" name="吹き出し: 四角形 6">
-            <a:extLst>
-              <a:ext uri="{FF2B5EF4-FFF2-40B4-BE49-F238E27FC236}">
-                <a16:creationId xmlns:a16="http://schemas.microsoft.com/office/drawing/2014/main" id="{D513BE56-A44A-E948-F8C3-58CE0642DBB9}"/>
-              </a:ext>
-            </a:extLst>
-          </p:cNvPr>
-          <p:cNvSpPr/>
-          <p:nvPr/>
-        </p:nvSpPr>
-        <p:spPr>
-          <a:xfrm>
-            <a:off x="2460985" y="1530417"/>
-            <a:ext cx="6607744" cy="3229910"/>
-          </a:xfrm>
-          <a:prstGeom prst="wedgeRectCallout">
-            <a:avLst>
-              <a:gd name="adj1" fmla="val -55356"/>
-              <a:gd name="adj2" fmla="val -31878"/>
-            </a:avLst>
-          </a:prstGeom>
-          <a:solidFill>
-            <a:srgbClr val="FFFFE5"/>
-          </a:solidFill>
-          <a:ln>
-            <a:solidFill>
-              <a:schemeClr val="bg1">
-                <a:lumMod val="75000"/>
-              </a:schemeClr>
-            </a:solidFill>
-          </a:ln>
-        </p:spPr>
-        <p:style>
-          <a:lnRef idx="2">
-            <a:schemeClr val="accent1">
-              <a:shade val="50000"/>
-            </a:schemeClr>
-          </a:lnRef>
-          <a:fillRef idx="1">
-            <a:schemeClr val="accent1"/>
-          </a:fillRef>
-          <a:effectRef idx="0">
-            <a:schemeClr val="accent1"/>
-          </a:effectRef>
-          <a:fontRef idx="minor">
-            <a:schemeClr val="lt1"/>
-          </a:fontRef>
-        </p:style>
-        <p:txBody>
-          <a:bodyPr rtlCol="0" anchor="ctr"/>
-          <a:lstStyle/>
-          <a:p>
-            <a:pPr algn="ctr"/>
-            <a:endParaRPr kumimoji="1" lang="ja-JP" altLang="en-US" dirty="0" err="1">
-              <a:solidFill>
-                <a:schemeClr val="tx1"/>
-              </a:solidFill>
-            </a:endParaRPr>
-          </a:p>
-        </p:txBody>
-      </p:sp>
-      <p:pic>
-        <p:nvPicPr>
-          <p:cNvPr id="6" name="図 5">
-            <a:extLst>
-              <a:ext uri="{FF2B5EF4-FFF2-40B4-BE49-F238E27FC236}">
-                <a16:creationId xmlns:a16="http://schemas.microsoft.com/office/drawing/2014/main" id="{CB3E1409-76C9-C536-0823-2D5CCB7B1A32}"/>
-              </a:ext>
-            </a:extLst>
-          </p:cNvPr>
-          <p:cNvPicPr>
-            <a:picLocks noChangeAspect="1"/>
-          </p:cNvPicPr>
-          <p:nvPr/>
-        </p:nvPicPr>
-        <p:blipFill>
-          <a:blip r:embed="rId4"/>
-          <a:stretch>
-            <a:fillRect/>
-          </a:stretch>
-        </p:blipFill>
-        <p:spPr>
-          <a:xfrm>
-            <a:off x="2641602" y="1963787"/>
-            <a:ext cx="6246510" cy="2646986"/>
-          </a:xfrm>
-          <a:prstGeom prst="rect">
-            <a:avLst/>
-          </a:prstGeom>
-        </p:spPr>
-      </p:pic>
-      <p:sp>
-        <p:nvSpPr>
-          <p:cNvPr id="8" name="テキスト ボックス 7">
-            <a:extLst>
-              <a:ext uri="{FF2B5EF4-FFF2-40B4-BE49-F238E27FC236}">
-                <a16:creationId xmlns:a16="http://schemas.microsoft.com/office/drawing/2014/main" id="{8511C636-99EA-0808-ADA3-1358C3CF8519}"/>
-              </a:ext>
-            </a:extLst>
-          </p:cNvPr>
-          <p:cNvSpPr txBox="1"/>
-          <p:nvPr/>
-        </p:nvSpPr>
-        <p:spPr>
-          <a:xfrm>
-            <a:off x="124667" y="733699"/>
-            <a:ext cx="3185487" cy="369332"/>
-          </a:xfrm>
-          <a:prstGeom prst="rect">
-            <a:avLst/>
-          </a:prstGeom>
-          <a:noFill/>
-        </p:spPr>
-        <p:txBody>
-          <a:bodyPr wrap="none" rtlCol="0">
-            <a:spAutoFit/>
-          </a:bodyPr>
-          <a:lstStyle/>
-          <a:p>
-            <a:pPr algn="l"/>
-            <a:r>
-              <a:rPr kumimoji="1" lang="ja-JP" altLang="en-US" dirty="0"/>
-              <a:t>配布物のトップディレクトリ</a:t>
-            </a:r>
-          </a:p>
-        </p:txBody>
-      </p:sp>
-      <p:sp>
-        <p:nvSpPr>
-          <p:cNvPr id="9" name="テキスト ボックス 8">
-            <a:extLst>
-              <a:ext uri="{FF2B5EF4-FFF2-40B4-BE49-F238E27FC236}">
-                <a16:creationId xmlns:a16="http://schemas.microsoft.com/office/drawing/2014/main" id="{5DCBC0E9-A3F7-02FA-E96C-894F183EDA23}"/>
-              </a:ext>
-            </a:extLst>
-          </p:cNvPr>
-          <p:cNvSpPr txBox="1"/>
-          <p:nvPr/>
-        </p:nvSpPr>
-        <p:spPr>
-          <a:xfrm>
-            <a:off x="3068393" y="1594455"/>
-            <a:ext cx="3658374" cy="369332"/>
-          </a:xfrm>
-          <a:prstGeom prst="rect">
-            <a:avLst/>
-          </a:prstGeom>
-          <a:noFill/>
-        </p:spPr>
-        <p:txBody>
-          <a:bodyPr wrap="none" rtlCol="0">
-            <a:spAutoFit/>
-          </a:bodyPr>
-          <a:lstStyle/>
-          <a:p>
-            <a:pPr algn="l"/>
-            <a:r>
-              <a:rPr kumimoji="1" lang="en-US" altLang="ja-JP" dirty="0" err="1"/>
-              <a:t>ArduinoSensorGen</a:t>
-            </a:r>
-            <a:r>
-              <a:rPr kumimoji="1" lang="ja-JP" altLang="en-US" dirty="0"/>
-              <a:t>ディレクトリ</a:t>
-            </a:r>
-          </a:p>
-        </p:txBody>
-      </p:sp>
-      <p:sp>
-        <p:nvSpPr>
           <p:cNvPr id="3" name="四角形: 角を丸くする 2">
             <a:extLst>
               <a:ext uri="{FF2B5EF4-FFF2-40B4-BE49-F238E27FC236}">
@@ -20664,7 +23054,7 @@
             </a:r>
             <a:r>
               <a:rPr kumimoji="1" lang="ja-JP" altLang="en-US" dirty="0"/>
-              <a:t>のセットアップと動作確認</a:t>
+              <a:t>のセットアップ</a:t>
             </a:r>
           </a:p>
         </p:txBody>

</xml_diff>